<commit_message>
implemented paralleling for computing distances
</commit_message>
<xml_diff>
--- a/my_ppt.pptx
+++ b/my_ppt.pptx
@@ -5,15 +5,22 @@
     <p:sldMasterId id="2147483648" r:id="rId1"/>
   </p:sldMasterIdLst>
   <p:notesMasterIdLst>
-    <p:notesMasterId r:id="rId8"/>
+    <p:notesMasterId r:id="rId15"/>
   </p:notesMasterIdLst>
   <p:sldIdLst>
     <p:sldId id="256" r:id="rId2"/>
-    <p:sldId id="257" r:id="rId3"/>
-    <p:sldId id="258" r:id="rId4"/>
-    <p:sldId id="259" r:id="rId5"/>
-    <p:sldId id="260" r:id="rId6"/>
-    <p:sldId id="261" r:id="rId7"/>
+    <p:sldId id="262" r:id="rId3"/>
+    <p:sldId id="263" r:id="rId4"/>
+    <p:sldId id="269" r:id="rId5"/>
+    <p:sldId id="270" r:id="rId6"/>
+    <p:sldId id="271" r:id="rId7"/>
+    <p:sldId id="264" r:id="rId8"/>
+    <p:sldId id="265" r:id="rId9"/>
+    <p:sldId id="266" r:id="rId10"/>
+    <p:sldId id="267" r:id="rId11"/>
+    <p:sldId id="268" r:id="rId12"/>
+    <p:sldId id="272" r:id="rId13"/>
+    <p:sldId id="261" r:id="rId14"/>
   </p:sldIdLst>
   <p:sldSz cx="12192000" cy="6858000"/>
   <p:notesSz cx="6858000" cy="9144000"/>
@@ -3378,7 +3385,7 @@
 </p:sld>
 </file>
 
-<file path=ppt/slides/slide2.xml><?xml version="1.0" encoding="utf-8"?>
+<file path=ppt/slides/slide10.xml><?xml version="1.0" encoding="utf-8"?>
 <p:sld xmlns:a="http://schemas.openxmlformats.org/drawingml/2006/main" xmlns:r="http://schemas.openxmlformats.org/officeDocument/2006/relationships" xmlns:p="http://schemas.openxmlformats.org/presentationml/2006/main">
   <p:cSld>
     <p:spTree>
@@ -3410,7 +3417,26 @@
           <a:bodyPr/>
           <a:lstStyle/>
           <a:p>
-            <a:endParaRPr lang="ru-RU"/>
+            <a:endParaRPr lang="en-US"/>
+          </a:p>
+        </p:txBody>
+      </p:sp>
+      <p:sp>
+        <p:nvSpPr>
+          <p:cNvPr id="3" name="Content Placeholder 2"/>
+          <p:cNvSpPr>
+            <a:spLocks noGrp="1"/>
+          </p:cNvSpPr>
+          <p:nvPr>
+            <p:ph idx="1"/>
+          </p:nvPr>
+        </p:nvSpPr>
+        <p:spPr/>
+        <p:txBody>
+          <a:bodyPr/>
+          <a:lstStyle/>
+          <a:p>
+            <a:endParaRPr lang="en-US"/>
           </a:p>
         </p:txBody>
       </p:sp>
@@ -3430,8 +3456,8 @@
         </p:blipFill>
         <p:spPr>
           <a:xfrm>
-            <a:off x="2222501" y="1939812"/>
-            <a:ext cx="6159500" cy="4577874"/>
+            <a:off x="1084241" y="1476932"/>
+            <a:ext cx="9977084" cy="5030746"/>
           </a:xfrm>
           <a:prstGeom prst="rect">
             <a:avLst/>
@@ -3441,7 +3467,7 @@
     </p:spTree>
     <p:extLst>
       <p:ext uri="{BB962C8B-B14F-4D97-AF65-F5344CB8AC3E}">
-        <p14:creationId xmlns:p14="http://schemas.microsoft.com/office/powerpoint/2010/main" val="209659765"/>
+        <p14:creationId xmlns:p14="http://schemas.microsoft.com/office/powerpoint/2010/main" val="1555388984"/>
       </p:ext>
     </p:extLst>
   </p:cSld>
@@ -3451,7 +3477,7 @@
 </p:sld>
 </file>
 
-<file path=ppt/slides/slide3.xml><?xml version="1.0" encoding="utf-8"?>
+<file path=ppt/slides/slide11.xml><?xml version="1.0" encoding="utf-8"?>
 <p:sld xmlns:a="http://schemas.openxmlformats.org/drawingml/2006/main" xmlns:r="http://schemas.openxmlformats.org/officeDocument/2006/relationships" xmlns:p="http://schemas.openxmlformats.org/presentationml/2006/main">
   <p:cSld>
     <p:spTree>
@@ -3503,8 +3529,8 @@
         </p:blipFill>
         <p:spPr>
           <a:xfrm>
-            <a:off x="1893867" y="1690688"/>
-            <a:ext cx="7535141" cy="4862102"/>
+            <a:off x="838200" y="1416442"/>
+            <a:ext cx="9791144" cy="4941247"/>
           </a:xfrm>
           <a:prstGeom prst="rect">
             <a:avLst/>
@@ -3514,7 +3540,7 @@
     </p:spTree>
     <p:extLst>
       <p:ext uri="{BB962C8B-B14F-4D97-AF65-F5344CB8AC3E}">
-        <p14:creationId xmlns:p14="http://schemas.microsoft.com/office/powerpoint/2010/main" val="2781048363"/>
+        <p14:creationId xmlns:p14="http://schemas.microsoft.com/office/powerpoint/2010/main" val="3456961081"/>
       </p:ext>
     </p:extLst>
   </p:cSld>
@@ -3524,7 +3550,7 @@
 </p:sld>
 </file>
 
-<file path=ppt/slides/slide4.xml><?xml version="1.0" encoding="utf-8"?>
+<file path=ppt/slides/slide12.xml><?xml version="1.0" encoding="utf-8"?>
 <p:sld xmlns:a="http://schemas.openxmlformats.org/drawingml/2006/main" xmlns:r="http://schemas.openxmlformats.org/officeDocument/2006/relationships" xmlns:p="http://schemas.openxmlformats.org/presentationml/2006/main">
   <p:cSld>
     <p:spTree>
@@ -3595,8 +3621,8 @@
         </p:blipFill>
         <p:spPr>
           <a:xfrm>
-            <a:off x="941800" y="1568756"/>
-            <a:ext cx="9591614" cy="4865075"/>
+            <a:off x="1053379" y="1577707"/>
+            <a:ext cx="9588796" cy="4847173"/>
           </a:xfrm>
           <a:prstGeom prst="rect">
             <a:avLst/>
@@ -3606,7 +3632,7 @@
     </p:spTree>
     <p:extLst>
       <p:ext uri="{BB962C8B-B14F-4D97-AF65-F5344CB8AC3E}">
-        <p14:creationId xmlns:p14="http://schemas.microsoft.com/office/powerpoint/2010/main" val="2736146873"/>
+        <p14:creationId xmlns:p14="http://schemas.microsoft.com/office/powerpoint/2010/main" val="1642550565"/>
       </p:ext>
     </p:extLst>
   </p:cSld>
@@ -3616,80 +3642,7 @@
 </p:sld>
 </file>
 
-<file path=ppt/slides/slide5.xml><?xml version="1.0" encoding="utf-8"?>
-<p:sld xmlns:a="http://schemas.openxmlformats.org/drawingml/2006/main" xmlns:r="http://schemas.openxmlformats.org/officeDocument/2006/relationships" xmlns:p="http://schemas.openxmlformats.org/presentationml/2006/main">
-  <p:cSld>
-    <p:spTree>
-      <p:nvGrpSpPr>
-        <p:cNvPr id="1" name=""/>
-        <p:cNvGrpSpPr/>
-        <p:nvPr/>
-      </p:nvGrpSpPr>
-      <p:grpSpPr>
-        <a:xfrm>
-          <a:off x="0" y="0"/>
-          <a:ext cx="0" cy="0"/>
-          <a:chOff x="0" y="0"/>
-          <a:chExt cx="0" cy="0"/>
-        </a:xfrm>
-      </p:grpSpPr>
-      <p:sp>
-        <p:nvSpPr>
-          <p:cNvPr id="2" name="Title 1"/>
-          <p:cNvSpPr>
-            <a:spLocks noGrp="1"/>
-          </p:cNvSpPr>
-          <p:nvPr>
-            <p:ph type="title"/>
-          </p:nvPr>
-        </p:nvSpPr>
-        <p:spPr/>
-        <p:txBody>
-          <a:bodyPr/>
-          <a:lstStyle/>
-          <a:p>
-            <a:endParaRPr lang="en-US"/>
-          </a:p>
-        </p:txBody>
-      </p:sp>
-      <p:pic>
-        <p:nvPicPr>
-          <p:cNvPr id="4" name="Picture 3"/>
-          <p:cNvPicPr>
-            <a:picLocks noChangeAspect="1"/>
-          </p:cNvPicPr>
-          <p:nvPr/>
-        </p:nvPicPr>
-        <p:blipFill>
-          <a:blip r:embed="rId2"/>
-          <a:stretch>
-            <a:fillRect/>
-          </a:stretch>
-        </p:blipFill>
-        <p:spPr>
-          <a:xfrm>
-            <a:off x="1119868" y="1690688"/>
-            <a:ext cx="9306667" cy="4590344"/>
-          </a:xfrm>
-          <a:prstGeom prst="rect">
-            <a:avLst/>
-          </a:prstGeom>
-        </p:spPr>
-      </p:pic>
-    </p:spTree>
-    <p:extLst>
-      <p:ext uri="{BB962C8B-B14F-4D97-AF65-F5344CB8AC3E}">
-        <p14:creationId xmlns:p14="http://schemas.microsoft.com/office/powerpoint/2010/main" val="2900200862"/>
-      </p:ext>
-    </p:extLst>
-  </p:cSld>
-  <p:clrMapOvr>
-    <a:masterClrMapping/>
-  </p:clrMapOvr>
-</p:sld>
-</file>
-
-<file path=ppt/slides/slide6.xml><?xml version="1.0" encoding="utf-8"?>
+<file path=ppt/slides/slide13.xml><?xml version="1.0" encoding="utf-8"?>
 <p:sld xmlns:a="http://schemas.openxmlformats.org/drawingml/2006/main" xmlns:r="http://schemas.openxmlformats.org/officeDocument/2006/relationships" xmlns:p="http://schemas.openxmlformats.org/presentationml/2006/main">
   <p:cSld>
     <p:spTree>
@@ -3769,7 +3722,7 @@
         </p:blipFill>
         <p:spPr>
           <a:xfrm>
-            <a:off x="6379775" y="1981559"/>
+            <a:off x="6332275" y="1981559"/>
             <a:ext cx="5657850" cy="3895725"/>
           </a:xfrm>
           <a:prstGeom prst="rect">
@@ -3965,7 +3918,7 @@
         </p:nvCxnSpPr>
         <p:spPr>
           <a:xfrm>
-            <a:off x="9237025" y="3158009"/>
+            <a:off x="9189525" y="3158009"/>
             <a:ext cx="866898" cy="1277587"/>
           </a:xfrm>
           <a:prstGeom prst="line">
@@ -3995,7 +3948,7 @@
         </p:nvCxnSpPr>
         <p:spPr>
           <a:xfrm>
-            <a:off x="9213275" y="3158009"/>
+            <a:off x="9165775" y="3158009"/>
             <a:ext cx="1318159" cy="734958"/>
           </a:xfrm>
           <a:prstGeom prst="line">
@@ -4025,7 +3978,7 @@
         </p:nvCxnSpPr>
         <p:spPr>
           <a:xfrm flipV="1">
-            <a:off x="10103923" y="3929421"/>
+            <a:off x="10056423" y="3929421"/>
             <a:ext cx="427511" cy="506176"/>
           </a:xfrm>
           <a:prstGeom prst="line">
@@ -4055,7 +4008,7 @@
         </p:nvCxnSpPr>
         <p:spPr>
           <a:xfrm>
-            <a:off x="6917164" y="2802577"/>
+            <a:off x="6869664" y="2802577"/>
             <a:ext cx="2106880" cy="2636322"/>
           </a:xfrm>
           <a:prstGeom prst="line">
@@ -4085,7 +4038,7 @@
         </p:nvCxnSpPr>
         <p:spPr>
           <a:xfrm flipV="1">
-            <a:off x="6917164" y="2185060"/>
+            <a:off x="6869664" y="2185060"/>
             <a:ext cx="3194462" cy="617517"/>
           </a:xfrm>
           <a:prstGeom prst="line">
@@ -4115,7 +4068,7 @@
         </p:nvCxnSpPr>
         <p:spPr>
           <a:xfrm flipH="1">
-            <a:off x="9024044" y="2185060"/>
+            <a:off x="8976544" y="2185060"/>
             <a:ext cx="1087582" cy="3253839"/>
           </a:xfrm>
           <a:prstGeom prst="line">
@@ -4141,6 +4094,652 @@
     <p:extLst>
       <p:ext uri="{BB962C8B-B14F-4D97-AF65-F5344CB8AC3E}">
         <p14:creationId xmlns:p14="http://schemas.microsoft.com/office/powerpoint/2010/main" val="3549977756"/>
+      </p:ext>
+    </p:extLst>
+  </p:cSld>
+  <p:clrMapOvr>
+    <a:masterClrMapping/>
+  </p:clrMapOvr>
+</p:sld>
+</file>
+
+<file path=ppt/slides/slide2.xml><?xml version="1.0" encoding="utf-8"?>
+<p:sld xmlns:a="http://schemas.openxmlformats.org/drawingml/2006/main" xmlns:r="http://schemas.openxmlformats.org/officeDocument/2006/relationships" xmlns:p="http://schemas.openxmlformats.org/presentationml/2006/main">
+  <p:cSld>
+    <p:spTree>
+      <p:nvGrpSpPr>
+        <p:cNvPr id="1" name=""/>
+        <p:cNvGrpSpPr/>
+        <p:nvPr/>
+      </p:nvGrpSpPr>
+      <p:grpSpPr>
+        <a:xfrm>
+          <a:off x="0" y="0"/>
+          <a:ext cx="0" cy="0"/>
+          <a:chOff x="0" y="0"/>
+          <a:chExt cx="0" cy="0"/>
+        </a:xfrm>
+      </p:grpSpPr>
+      <p:sp>
+        <p:nvSpPr>
+          <p:cNvPr id="2" name="Title 1"/>
+          <p:cNvSpPr>
+            <a:spLocks noGrp="1"/>
+          </p:cNvSpPr>
+          <p:nvPr>
+            <p:ph type="title"/>
+          </p:nvPr>
+        </p:nvSpPr>
+        <p:spPr/>
+        <p:txBody>
+          <a:bodyPr/>
+          <a:lstStyle/>
+          <a:p>
+            <a:endParaRPr lang="en-US"/>
+          </a:p>
+        </p:txBody>
+      </p:sp>
+      <p:pic>
+        <p:nvPicPr>
+          <p:cNvPr id="4" name="Content Placeholder 3"/>
+          <p:cNvPicPr>
+            <a:picLocks noGrp="1" noChangeAspect="1"/>
+          </p:cNvPicPr>
+          <p:nvPr>
+            <p:ph idx="1"/>
+          </p:nvPr>
+        </p:nvPicPr>
+        <p:blipFill>
+          <a:blip r:embed="rId2" cstate="print">
+            <a:extLst>
+              <a:ext uri="{28A0092B-C50C-407E-A947-70E740481C1C}">
+                <a14:useLocalDpi xmlns:a14="http://schemas.microsoft.com/office/drawing/2010/main" val="0"/>
+              </a:ext>
+            </a:extLst>
+          </a:blip>
+          <a:stretch>
+            <a:fillRect/>
+          </a:stretch>
+        </p:blipFill>
+        <p:spPr>
+          <a:xfrm>
+            <a:off x="2334758" y="1833192"/>
+            <a:ext cx="6609978" cy="4626985"/>
+          </a:xfrm>
+        </p:spPr>
+      </p:pic>
+    </p:spTree>
+    <p:extLst>
+      <p:ext uri="{BB962C8B-B14F-4D97-AF65-F5344CB8AC3E}">
+        <p14:creationId xmlns:p14="http://schemas.microsoft.com/office/powerpoint/2010/main" val="3886272665"/>
+      </p:ext>
+    </p:extLst>
+  </p:cSld>
+  <p:clrMapOvr>
+    <a:masterClrMapping/>
+  </p:clrMapOvr>
+</p:sld>
+</file>
+
+<file path=ppt/slides/slide3.xml><?xml version="1.0" encoding="utf-8"?>
+<p:sld xmlns:a="http://schemas.openxmlformats.org/drawingml/2006/main" xmlns:r="http://schemas.openxmlformats.org/officeDocument/2006/relationships" xmlns:p="http://schemas.openxmlformats.org/presentationml/2006/main">
+  <p:cSld>
+    <p:spTree>
+      <p:nvGrpSpPr>
+        <p:cNvPr id="1" name=""/>
+        <p:cNvGrpSpPr/>
+        <p:nvPr/>
+      </p:nvGrpSpPr>
+      <p:grpSpPr>
+        <a:xfrm>
+          <a:off x="0" y="0"/>
+          <a:ext cx="0" cy="0"/>
+          <a:chOff x="0" y="0"/>
+          <a:chExt cx="0" cy="0"/>
+        </a:xfrm>
+      </p:grpSpPr>
+      <p:sp>
+        <p:nvSpPr>
+          <p:cNvPr id="2" name="Title 1"/>
+          <p:cNvSpPr>
+            <a:spLocks noGrp="1"/>
+          </p:cNvSpPr>
+          <p:nvPr>
+            <p:ph type="title"/>
+          </p:nvPr>
+        </p:nvSpPr>
+        <p:spPr/>
+        <p:txBody>
+          <a:bodyPr/>
+          <a:lstStyle/>
+          <a:p>
+            <a:endParaRPr lang="en-US"/>
+          </a:p>
+        </p:txBody>
+      </p:sp>
+      <p:pic>
+        <p:nvPicPr>
+          <p:cNvPr id="4" name="Picture 3"/>
+          <p:cNvPicPr>
+            <a:picLocks noChangeAspect="1"/>
+          </p:cNvPicPr>
+          <p:nvPr/>
+        </p:nvPicPr>
+        <p:blipFill>
+          <a:blip r:embed="rId2"/>
+          <a:stretch>
+            <a:fillRect/>
+          </a:stretch>
+        </p:blipFill>
+        <p:spPr>
+          <a:xfrm>
+            <a:off x="956025" y="1615714"/>
+            <a:ext cx="9438249" cy="4771159"/>
+          </a:xfrm>
+          <a:prstGeom prst="rect">
+            <a:avLst/>
+          </a:prstGeom>
+        </p:spPr>
+      </p:pic>
+    </p:spTree>
+    <p:extLst>
+      <p:ext uri="{BB962C8B-B14F-4D97-AF65-F5344CB8AC3E}">
+        <p14:creationId xmlns:p14="http://schemas.microsoft.com/office/powerpoint/2010/main" val="2116526745"/>
+      </p:ext>
+    </p:extLst>
+  </p:cSld>
+  <p:clrMapOvr>
+    <a:masterClrMapping/>
+  </p:clrMapOvr>
+</p:sld>
+</file>
+
+<file path=ppt/slides/slide4.xml><?xml version="1.0" encoding="utf-8"?>
+<p:sld xmlns:a="http://schemas.openxmlformats.org/drawingml/2006/main" xmlns:r="http://schemas.openxmlformats.org/officeDocument/2006/relationships" xmlns:p="http://schemas.openxmlformats.org/presentationml/2006/main">
+  <p:cSld>
+    <p:spTree>
+      <p:nvGrpSpPr>
+        <p:cNvPr id="1" name=""/>
+        <p:cNvGrpSpPr/>
+        <p:nvPr/>
+      </p:nvGrpSpPr>
+      <p:grpSpPr>
+        <a:xfrm>
+          <a:off x="0" y="0"/>
+          <a:ext cx="0" cy="0"/>
+          <a:chOff x="0" y="0"/>
+          <a:chExt cx="0" cy="0"/>
+        </a:xfrm>
+      </p:grpSpPr>
+      <p:sp>
+        <p:nvSpPr>
+          <p:cNvPr id="2" name="Title 1"/>
+          <p:cNvSpPr>
+            <a:spLocks noGrp="1"/>
+          </p:cNvSpPr>
+          <p:nvPr>
+            <p:ph type="title"/>
+          </p:nvPr>
+        </p:nvSpPr>
+        <p:spPr/>
+        <p:txBody>
+          <a:bodyPr/>
+          <a:lstStyle/>
+          <a:p>
+            <a:endParaRPr lang="en-US"/>
+          </a:p>
+        </p:txBody>
+      </p:sp>
+      <p:sp>
+        <p:nvSpPr>
+          <p:cNvPr id="3" name="Content Placeholder 2"/>
+          <p:cNvSpPr>
+            <a:spLocks noGrp="1"/>
+          </p:cNvSpPr>
+          <p:nvPr>
+            <p:ph idx="1"/>
+          </p:nvPr>
+        </p:nvSpPr>
+        <p:spPr/>
+        <p:txBody>
+          <a:bodyPr/>
+          <a:lstStyle/>
+          <a:p>
+            <a:endParaRPr lang="en-US"/>
+          </a:p>
+        </p:txBody>
+      </p:sp>
+      <p:pic>
+        <p:nvPicPr>
+          <p:cNvPr id="4" name="Picture 3"/>
+          <p:cNvPicPr>
+            <a:picLocks noChangeAspect="1"/>
+          </p:cNvPicPr>
+          <p:nvPr/>
+        </p:nvPicPr>
+        <p:blipFill>
+          <a:blip r:embed="rId2"/>
+          <a:stretch>
+            <a:fillRect/>
+          </a:stretch>
+        </p:blipFill>
+        <p:spPr>
+          <a:xfrm>
+            <a:off x="1530973" y="1690688"/>
+            <a:ext cx="8629667" cy="4351338"/>
+          </a:xfrm>
+          <a:prstGeom prst="rect">
+            <a:avLst/>
+          </a:prstGeom>
+        </p:spPr>
+      </p:pic>
+    </p:spTree>
+    <p:extLst>
+      <p:ext uri="{BB962C8B-B14F-4D97-AF65-F5344CB8AC3E}">
+        <p14:creationId xmlns:p14="http://schemas.microsoft.com/office/powerpoint/2010/main" val="3355218638"/>
+      </p:ext>
+    </p:extLst>
+  </p:cSld>
+  <p:clrMapOvr>
+    <a:masterClrMapping/>
+  </p:clrMapOvr>
+</p:sld>
+</file>
+
+<file path=ppt/slides/slide5.xml><?xml version="1.0" encoding="utf-8"?>
+<p:sld xmlns:a="http://schemas.openxmlformats.org/drawingml/2006/main" xmlns:r="http://schemas.openxmlformats.org/officeDocument/2006/relationships" xmlns:p="http://schemas.openxmlformats.org/presentationml/2006/main">
+  <p:cSld>
+    <p:spTree>
+      <p:nvGrpSpPr>
+        <p:cNvPr id="1" name=""/>
+        <p:cNvGrpSpPr/>
+        <p:nvPr/>
+      </p:nvGrpSpPr>
+      <p:grpSpPr>
+        <a:xfrm>
+          <a:off x="0" y="0"/>
+          <a:ext cx="0" cy="0"/>
+          <a:chOff x="0" y="0"/>
+          <a:chExt cx="0" cy="0"/>
+        </a:xfrm>
+      </p:grpSpPr>
+      <p:sp>
+        <p:nvSpPr>
+          <p:cNvPr id="2" name="Title 1"/>
+          <p:cNvSpPr>
+            <a:spLocks noGrp="1"/>
+          </p:cNvSpPr>
+          <p:nvPr>
+            <p:ph type="title"/>
+          </p:nvPr>
+        </p:nvSpPr>
+        <p:spPr/>
+        <p:txBody>
+          <a:bodyPr/>
+          <a:lstStyle/>
+          <a:p>
+            <a:endParaRPr lang="en-US"/>
+          </a:p>
+        </p:txBody>
+      </p:sp>
+      <p:sp>
+        <p:nvSpPr>
+          <p:cNvPr id="3" name="Content Placeholder 2"/>
+          <p:cNvSpPr>
+            <a:spLocks noGrp="1"/>
+          </p:cNvSpPr>
+          <p:nvPr>
+            <p:ph idx="1"/>
+          </p:nvPr>
+        </p:nvSpPr>
+        <p:spPr/>
+        <p:txBody>
+          <a:bodyPr/>
+          <a:lstStyle/>
+          <a:p>
+            <a:endParaRPr lang="en-US"/>
+          </a:p>
+        </p:txBody>
+      </p:sp>
+      <p:pic>
+        <p:nvPicPr>
+          <p:cNvPr id="4" name="Picture 3"/>
+          <p:cNvPicPr>
+            <a:picLocks noChangeAspect="1"/>
+          </p:cNvPicPr>
+          <p:nvPr/>
+        </p:nvPicPr>
+        <p:blipFill>
+          <a:blip r:embed="rId2"/>
+          <a:stretch>
+            <a:fillRect/>
+          </a:stretch>
+        </p:blipFill>
+        <p:spPr>
+          <a:xfrm>
+            <a:off x="1155494" y="1430431"/>
+            <a:ext cx="9461046" cy="4746532"/>
+          </a:xfrm>
+          <a:prstGeom prst="rect">
+            <a:avLst/>
+          </a:prstGeom>
+        </p:spPr>
+      </p:pic>
+    </p:spTree>
+    <p:extLst>
+      <p:ext uri="{BB962C8B-B14F-4D97-AF65-F5344CB8AC3E}">
+        <p14:creationId xmlns:p14="http://schemas.microsoft.com/office/powerpoint/2010/main" val="1263844640"/>
+      </p:ext>
+    </p:extLst>
+  </p:cSld>
+  <p:clrMapOvr>
+    <a:masterClrMapping/>
+  </p:clrMapOvr>
+</p:sld>
+</file>
+
+<file path=ppt/slides/slide6.xml><?xml version="1.0" encoding="utf-8"?>
+<p:sld xmlns:a="http://schemas.openxmlformats.org/drawingml/2006/main" xmlns:r="http://schemas.openxmlformats.org/officeDocument/2006/relationships" xmlns:p="http://schemas.openxmlformats.org/presentationml/2006/main">
+  <p:cSld>
+    <p:spTree>
+      <p:nvGrpSpPr>
+        <p:cNvPr id="1" name=""/>
+        <p:cNvGrpSpPr/>
+        <p:nvPr/>
+      </p:nvGrpSpPr>
+      <p:grpSpPr>
+        <a:xfrm>
+          <a:off x="0" y="0"/>
+          <a:ext cx="0" cy="0"/>
+          <a:chOff x="0" y="0"/>
+          <a:chExt cx="0" cy="0"/>
+        </a:xfrm>
+      </p:grpSpPr>
+      <p:sp>
+        <p:nvSpPr>
+          <p:cNvPr id="2" name="Title 1"/>
+          <p:cNvSpPr>
+            <a:spLocks noGrp="1"/>
+          </p:cNvSpPr>
+          <p:nvPr>
+            <p:ph type="title"/>
+          </p:nvPr>
+        </p:nvSpPr>
+        <p:spPr/>
+        <p:txBody>
+          <a:bodyPr/>
+          <a:lstStyle/>
+          <a:p>
+            <a:endParaRPr lang="en-US"/>
+          </a:p>
+        </p:txBody>
+      </p:sp>
+      <p:sp>
+        <p:nvSpPr>
+          <p:cNvPr id="3" name="Content Placeholder 2"/>
+          <p:cNvSpPr>
+            <a:spLocks noGrp="1"/>
+          </p:cNvSpPr>
+          <p:nvPr>
+            <p:ph idx="1"/>
+          </p:nvPr>
+        </p:nvSpPr>
+        <p:spPr/>
+        <p:txBody>
+          <a:bodyPr/>
+          <a:lstStyle/>
+          <a:p>
+            <a:endParaRPr lang="en-US"/>
+          </a:p>
+        </p:txBody>
+      </p:sp>
+      <p:pic>
+        <p:nvPicPr>
+          <p:cNvPr id="4" name="Picture 3"/>
+          <p:cNvPicPr>
+            <a:picLocks noChangeAspect="1"/>
+          </p:cNvPicPr>
+          <p:nvPr/>
+        </p:nvPicPr>
+        <p:blipFill>
+          <a:blip r:embed="rId2"/>
+          <a:stretch>
+            <a:fillRect/>
+          </a:stretch>
+        </p:blipFill>
+        <p:spPr>
+          <a:xfrm>
+            <a:off x="1271897" y="1690688"/>
+            <a:ext cx="9325389" cy="4710112"/>
+          </a:xfrm>
+          <a:prstGeom prst="rect">
+            <a:avLst/>
+          </a:prstGeom>
+        </p:spPr>
+      </p:pic>
+    </p:spTree>
+    <p:extLst>
+      <p:ext uri="{BB962C8B-B14F-4D97-AF65-F5344CB8AC3E}">
+        <p14:creationId xmlns:p14="http://schemas.microsoft.com/office/powerpoint/2010/main" val="4272212951"/>
+      </p:ext>
+    </p:extLst>
+  </p:cSld>
+  <p:clrMapOvr>
+    <a:masterClrMapping/>
+  </p:clrMapOvr>
+</p:sld>
+</file>
+
+<file path=ppt/slides/slide7.xml><?xml version="1.0" encoding="utf-8"?>
+<p:sld xmlns:a="http://schemas.openxmlformats.org/drawingml/2006/main" xmlns:r="http://schemas.openxmlformats.org/officeDocument/2006/relationships" xmlns:p="http://schemas.openxmlformats.org/presentationml/2006/main">
+  <p:cSld>
+    <p:spTree>
+      <p:nvGrpSpPr>
+        <p:cNvPr id="1" name=""/>
+        <p:cNvGrpSpPr/>
+        <p:nvPr/>
+      </p:nvGrpSpPr>
+      <p:grpSpPr>
+        <a:xfrm>
+          <a:off x="0" y="0"/>
+          <a:ext cx="0" cy="0"/>
+          <a:chOff x="0" y="0"/>
+          <a:chExt cx="0" cy="0"/>
+        </a:xfrm>
+      </p:grpSpPr>
+      <p:sp>
+        <p:nvSpPr>
+          <p:cNvPr id="2" name="Title 1"/>
+          <p:cNvSpPr>
+            <a:spLocks noGrp="1"/>
+          </p:cNvSpPr>
+          <p:nvPr>
+            <p:ph type="title"/>
+          </p:nvPr>
+        </p:nvSpPr>
+        <p:spPr/>
+        <p:txBody>
+          <a:bodyPr/>
+          <a:lstStyle/>
+          <a:p>
+            <a:endParaRPr lang="en-US"/>
+          </a:p>
+        </p:txBody>
+      </p:sp>
+      <p:pic>
+        <p:nvPicPr>
+          <p:cNvPr id="4" name="Picture 3"/>
+          <p:cNvPicPr>
+            <a:picLocks noChangeAspect="1"/>
+          </p:cNvPicPr>
+          <p:nvPr/>
+        </p:nvPicPr>
+        <p:blipFill>
+          <a:blip r:embed="rId2"/>
+          <a:stretch>
+            <a:fillRect/>
+          </a:stretch>
+        </p:blipFill>
+        <p:spPr>
+          <a:xfrm>
+            <a:off x="1112755" y="1666772"/>
+            <a:ext cx="9236415" cy="4669043"/>
+          </a:xfrm>
+          <a:prstGeom prst="rect">
+            <a:avLst/>
+          </a:prstGeom>
+        </p:spPr>
+      </p:pic>
+    </p:spTree>
+    <p:extLst>
+      <p:ext uri="{BB962C8B-B14F-4D97-AF65-F5344CB8AC3E}">
+        <p14:creationId xmlns:p14="http://schemas.microsoft.com/office/powerpoint/2010/main" val="4161484074"/>
+      </p:ext>
+    </p:extLst>
+  </p:cSld>
+  <p:clrMapOvr>
+    <a:masterClrMapping/>
+  </p:clrMapOvr>
+</p:sld>
+</file>
+
+<file path=ppt/slides/slide8.xml><?xml version="1.0" encoding="utf-8"?>
+<p:sld xmlns:a="http://schemas.openxmlformats.org/drawingml/2006/main" xmlns:r="http://schemas.openxmlformats.org/officeDocument/2006/relationships" xmlns:p="http://schemas.openxmlformats.org/presentationml/2006/main">
+  <p:cSld>
+    <p:spTree>
+      <p:nvGrpSpPr>
+        <p:cNvPr id="1" name=""/>
+        <p:cNvGrpSpPr/>
+        <p:nvPr/>
+      </p:nvGrpSpPr>
+      <p:grpSpPr>
+        <a:xfrm>
+          <a:off x="0" y="0"/>
+          <a:ext cx="0" cy="0"/>
+          <a:chOff x="0" y="0"/>
+          <a:chExt cx="0" cy="0"/>
+        </a:xfrm>
+      </p:grpSpPr>
+      <p:sp>
+        <p:nvSpPr>
+          <p:cNvPr id="2" name="Title 1"/>
+          <p:cNvSpPr>
+            <a:spLocks noGrp="1"/>
+          </p:cNvSpPr>
+          <p:nvPr>
+            <p:ph type="title"/>
+          </p:nvPr>
+        </p:nvSpPr>
+        <p:spPr/>
+        <p:txBody>
+          <a:bodyPr/>
+          <a:lstStyle/>
+          <a:p>
+            <a:endParaRPr lang="en-US"/>
+          </a:p>
+        </p:txBody>
+      </p:sp>
+      <p:pic>
+        <p:nvPicPr>
+          <p:cNvPr id="4" name="Picture 3"/>
+          <p:cNvPicPr>
+            <a:picLocks noChangeAspect="1"/>
+          </p:cNvPicPr>
+          <p:nvPr/>
+        </p:nvPicPr>
+        <p:blipFill>
+          <a:blip r:embed="rId2"/>
+          <a:stretch>
+            <a:fillRect/>
+          </a:stretch>
+        </p:blipFill>
+        <p:spPr>
+          <a:xfrm>
+            <a:off x="960726" y="1329790"/>
+            <a:ext cx="9605035" cy="4847173"/>
+          </a:xfrm>
+          <a:prstGeom prst="rect">
+            <a:avLst/>
+          </a:prstGeom>
+        </p:spPr>
+      </p:pic>
+    </p:spTree>
+    <p:extLst>
+      <p:ext uri="{BB962C8B-B14F-4D97-AF65-F5344CB8AC3E}">
+        <p14:creationId xmlns:p14="http://schemas.microsoft.com/office/powerpoint/2010/main" val="1011074328"/>
+      </p:ext>
+    </p:extLst>
+  </p:cSld>
+  <p:clrMapOvr>
+    <a:masterClrMapping/>
+  </p:clrMapOvr>
+</p:sld>
+</file>
+
+<file path=ppt/slides/slide9.xml><?xml version="1.0" encoding="utf-8"?>
+<p:sld xmlns:a="http://schemas.openxmlformats.org/drawingml/2006/main" xmlns:r="http://schemas.openxmlformats.org/officeDocument/2006/relationships" xmlns:p="http://schemas.openxmlformats.org/presentationml/2006/main">
+  <p:cSld>
+    <p:spTree>
+      <p:nvGrpSpPr>
+        <p:cNvPr id="1" name=""/>
+        <p:cNvGrpSpPr/>
+        <p:nvPr/>
+      </p:nvGrpSpPr>
+      <p:grpSpPr>
+        <a:xfrm>
+          <a:off x="0" y="0"/>
+          <a:ext cx="0" cy="0"/>
+          <a:chOff x="0" y="0"/>
+          <a:chExt cx="0" cy="0"/>
+        </a:xfrm>
+      </p:grpSpPr>
+      <p:sp>
+        <p:nvSpPr>
+          <p:cNvPr id="2" name="Title 1"/>
+          <p:cNvSpPr>
+            <a:spLocks noGrp="1"/>
+          </p:cNvSpPr>
+          <p:nvPr>
+            <p:ph type="title"/>
+          </p:nvPr>
+        </p:nvSpPr>
+        <p:spPr/>
+        <p:txBody>
+          <a:bodyPr/>
+          <a:lstStyle/>
+          <a:p>
+            <a:endParaRPr lang="en-US"/>
+          </a:p>
+        </p:txBody>
+      </p:sp>
+      <p:pic>
+        <p:nvPicPr>
+          <p:cNvPr id="4" name="Picture 3"/>
+          <p:cNvPicPr>
+            <a:picLocks noChangeAspect="1"/>
+          </p:cNvPicPr>
+          <p:nvPr/>
+        </p:nvPicPr>
+        <p:blipFill>
+          <a:blip r:embed="rId2"/>
+          <a:stretch>
+            <a:fillRect/>
+          </a:stretch>
+        </p:blipFill>
+        <p:spPr>
+          <a:xfrm>
+            <a:off x="1207695" y="1659659"/>
+            <a:ext cx="9335054" cy="4683269"/>
+          </a:xfrm>
+          <a:prstGeom prst="rect">
+            <a:avLst/>
+          </a:prstGeom>
+        </p:spPr>
+      </p:pic>
+    </p:spTree>
+    <p:extLst>
+      <p:ext uri="{BB962C8B-B14F-4D97-AF65-F5344CB8AC3E}">
+        <p14:creationId xmlns:p14="http://schemas.microsoft.com/office/powerpoint/2010/main" val="1194380634"/>
       </p:ext>
     </p:extLst>
   </p:cSld>

</xml_diff>

<commit_message>
added random forest parameter tuning
</commit_message>
<xml_diff>
--- a/my_ppt.pptx
+++ b/my_ppt.pptx
@@ -2,29 +2,27 @@
 <file path=ppt/presentation.xml><?xml version="1.0" encoding="utf-8"?>
 <p:presentation xmlns:a="http://schemas.openxmlformats.org/drawingml/2006/main" xmlns:r="http://schemas.openxmlformats.org/officeDocument/2006/relationships" xmlns:p="http://schemas.openxmlformats.org/presentationml/2006/main" saveSubsetFonts="1">
   <p:sldMasterIdLst>
-    <p:sldMasterId id="2147483648" r:id="rId1"/>
+    <p:sldMasterId id="2147483707" r:id="rId1"/>
   </p:sldMasterIdLst>
   <p:notesMasterIdLst>
-    <p:notesMasterId r:id="rId19"/>
+    <p:notesMasterId r:id="rId17"/>
   </p:notesMasterIdLst>
   <p:sldIdLst>
     <p:sldId id="256" r:id="rId2"/>
     <p:sldId id="262" r:id="rId3"/>
-    <p:sldId id="263" r:id="rId4"/>
-    <p:sldId id="269" r:id="rId5"/>
-    <p:sldId id="270" r:id="rId6"/>
-    <p:sldId id="271" r:id="rId7"/>
-    <p:sldId id="264" r:id="rId8"/>
-    <p:sldId id="265" r:id="rId9"/>
-    <p:sldId id="266" r:id="rId10"/>
-    <p:sldId id="267" r:id="rId11"/>
-    <p:sldId id="268" r:id="rId12"/>
-    <p:sldId id="272" r:id="rId13"/>
-    <p:sldId id="261" r:id="rId14"/>
-    <p:sldId id="276" r:id="rId15"/>
-    <p:sldId id="273" r:id="rId16"/>
-    <p:sldId id="274" r:id="rId17"/>
-    <p:sldId id="275" r:id="rId18"/>
+    <p:sldId id="277" r:id="rId4"/>
+    <p:sldId id="280" r:id="rId5"/>
+    <p:sldId id="281" r:id="rId6"/>
+    <p:sldId id="278" r:id="rId7"/>
+    <p:sldId id="284" r:id="rId8"/>
+    <p:sldId id="283" r:id="rId9"/>
+    <p:sldId id="285" r:id="rId10"/>
+    <p:sldId id="261" r:id="rId11"/>
+    <p:sldId id="276" r:id="rId12"/>
+    <p:sldId id="286" r:id="rId13"/>
+    <p:sldId id="287" r:id="rId14"/>
+    <p:sldId id="288" r:id="rId15"/>
+    <p:sldId id="279" r:id="rId16"/>
   </p:sldIdLst>
   <p:sldSz cx="12192000" cy="6858000"/>
   <p:notesSz cx="6858000" cy="9144000"/>
@@ -213,7 +211,7 @@
           <a:p>
             <a:fld id="{287E1A8F-7719-4622-A7FC-B09120ECE8B8}" type="datetimeFigureOut">
               <a:rPr lang="ru-RU" smtClean="0"/>
-              <a:t>08.02.2016</a:t>
+              <a:t>10.02.2016</a:t>
             </a:fld>
             <a:endParaRPr lang="ru-RU"/>
           </a:p>
@@ -481,6 +479,174 @@
 </p:notesMaster>
 </file>
 
+<file path=ppt/notesSlides/notesSlide1.xml><?xml version="1.0" encoding="utf-8"?>
+<p:notes xmlns:a="http://schemas.openxmlformats.org/drawingml/2006/main" xmlns:r="http://schemas.openxmlformats.org/officeDocument/2006/relationships" xmlns:p="http://schemas.openxmlformats.org/presentationml/2006/main">
+  <p:cSld>
+    <p:spTree>
+      <p:nvGrpSpPr>
+        <p:cNvPr id="1" name=""/>
+        <p:cNvGrpSpPr/>
+        <p:nvPr/>
+      </p:nvGrpSpPr>
+      <p:grpSpPr>
+        <a:xfrm>
+          <a:off x="0" y="0"/>
+          <a:ext cx="0" cy="0"/>
+          <a:chOff x="0" y="0"/>
+          <a:chExt cx="0" cy="0"/>
+        </a:xfrm>
+      </p:grpSpPr>
+      <p:sp>
+        <p:nvSpPr>
+          <p:cNvPr id="2" name="Slide Image Placeholder 1"/>
+          <p:cNvSpPr>
+            <a:spLocks noGrp="1" noRot="1" noChangeAspect="1"/>
+          </p:cNvSpPr>
+          <p:nvPr>
+            <p:ph type="sldImg"/>
+          </p:nvPr>
+        </p:nvSpPr>
+        <p:spPr/>
+      </p:sp>
+      <p:sp>
+        <p:nvSpPr>
+          <p:cNvPr id="3" name="Notes Placeholder 2"/>
+          <p:cNvSpPr>
+            <a:spLocks noGrp="1"/>
+          </p:cNvSpPr>
+          <p:nvPr>
+            <p:ph type="body" idx="1"/>
+          </p:nvPr>
+        </p:nvSpPr>
+        <p:spPr/>
+        <p:txBody>
+          <a:bodyPr/>
+          <a:lstStyle/>
+          <a:p>
+            <a:endParaRPr lang="ru-RU" dirty="0"/>
+          </a:p>
+        </p:txBody>
+      </p:sp>
+      <p:sp>
+        <p:nvSpPr>
+          <p:cNvPr id="4" name="Slide Number Placeholder 3"/>
+          <p:cNvSpPr>
+            <a:spLocks noGrp="1"/>
+          </p:cNvSpPr>
+          <p:nvPr>
+            <p:ph type="sldNum" sz="quarter" idx="10"/>
+          </p:nvPr>
+        </p:nvSpPr>
+        <p:spPr/>
+        <p:txBody>
+          <a:bodyPr/>
+          <a:lstStyle/>
+          <a:p>
+            <a:fld id="{825496EB-9F4E-476C-BD38-C0EF3F8D0FD0}" type="slidenum">
+              <a:rPr lang="ru-RU" smtClean="0"/>
+              <a:t>10</a:t>
+            </a:fld>
+            <a:endParaRPr lang="ru-RU"/>
+          </a:p>
+        </p:txBody>
+      </p:sp>
+    </p:spTree>
+    <p:extLst>
+      <p:ext uri="{BB962C8B-B14F-4D97-AF65-F5344CB8AC3E}">
+        <p14:creationId xmlns:p14="http://schemas.microsoft.com/office/powerpoint/2010/main" val="2234303303"/>
+      </p:ext>
+    </p:extLst>
+  </p:cSld>
+  <p:clrMapOvr>
+    <a:masterClrMapping/>
+  </p:clrMapOvr>
+</p:notes>
+</file>
+
+<file path=ppt/notesSlides/notesSlide2.xml><?xml version="1.0" encoding="utf-8"?>
+<p:notes xmlns:a="http://schemas.openxmlformats.org/drawingml/2006/main" xmlns:r="http://schemas.openxmlformats.org/officeDocument/2006/relationships" xmlns:p="http://schemas.openxmlformats.org/presentationml/2006/main">
+  <p:cSld>
+    <p:spTree>
+      <p:nvGrpSpPr>
+        <p:cNvPr id="1" name=""/>
+        <p:cNvGrpSpPr/>
+        <p:nvPr/>
+      </p:nvGrpSpPr>
+      <p:grpSpPr>
+        <a:xfrm>
+          <a:off x="0" y="0"/>
+          <a:ext cx="0" cy="0"/>
+          <a:chOff x="0" y="0"/>
+          <a:chExt cx="0" cy="0"/>
+        </a:xfrm>
+      </p:grpSpPr>
+      <p:sp>
+        <p:nvSpPr>
+          <p:cNvPr id="2" name="Slide Image Placeholder 1"/>
+          <p:cNvSpPr>
+            <a:spLocks noGrp="1" noRot="1" noChangeAspect="1"/>
+          </p:cNvSpPr>
+          <p:nvPr>
+            <p:ph type="sldImg"/>
+          </p:nvPr>
+        </p:nvSpPr>
+        <p:spPr/>
+      </p:sp>
+      <p:sp>
+        <p:nvSpPr>
+          <p:cNvPr id="3" name="Notes Placeholder 2"/>
+          <p:cNvSpPr>
+            <a:spLocks noGrp="1"/>
+          </p:cNvSpPr>
+          <p:nvPr>
+            <p:ph type="body" idx="1"/>
+          </p:nvPr>
+        </p:nvSpPr>
+        <p:spPr/>
+        <p:txBody>
+          <a:bodyPr/>
+          <a:lstStyle/>
+          <a:p>
+            <a:endParaRPr lang="ru-RU" dirty="0"/>
+          </a:p>
+        </p:txBody>
+      </p:sp>
+      <p:sp>
+        <p:nvSpPr>
+          <p:cNvPr id="4" name="Slide Number Placeholder 3"/>
+          <p:cNvSpPr>
+            <a:spLocks noGrp="1"/>
+          </p:cNvSpPr>
+          <p:nvPr>
+            <p:ph type="sldNum" sz="quarter" idx="10"/>
+          </p:nvPr>
+        </p:nvSpPr>
+        <p:spPr/>
+        <p:txBody>
+          <a:bodyPr/>
+          <a:lstStyle/>
+          <a:p>
+            <a:fld id="{825496EB-9F4E-476C-BD38-C0EF3F8D0FD0}" type="slidenum">
+              <a:rPr lang="ru-RU" smtClean="0"/>
+              <a:t>14</a:t>
+            </a:fld>
+            <a:endParaRPr lang="ru-RU"/>
+          </a:p>
+        </p:txBody>
+      </p:sp>
+    </p:spTree>
+    <p:extLst>
+      <p:ext uri="{BB962C8B-B14F-4D97-AF65-F5344CB8AC3E}">
+        <p14:creationId xmlns:p14="http://schemas.microsoft.com/office/powerpoint/2010/main" val="34923926"/>
+      </p:ext>
+    </p:extLst>
+  </p:cSld>
+  <p:clrMapOvr>
+    <a:masterClrMapping/>
+  </p:clrMapOvr>
+</p:notes>
+</file>
+
 <file path=ppt/slideLayouts/slideLayout1.xml><?xml version="1.0" encoding="utf-8"?>
 <p:sldLayout xmlns:a="http://schemas.openxmlformats.org/drawingml/2006/main" xmlns:r="http://schemas.openxmlformats.org/officeDocument/2006/relationships" xmlns:p="http://schemas.openxmlformats.org/presentationml/2006/main" type="title" preserve="1">
   <p:cSld name="Title Slide">
@@ -612,7 +778,7 @@
           <a:p>
             <a:fld id="{1C14A076-ED6C-40E7-8314-F402E5703C6E}" type="datetimeFigureOut">
               <a:rPr lang="ru-RU" smtClean="0"/>
-              <a:t>08.02.2016</a:t>
+              <a:t>10.02.2016</a:t>
             </a:fld>
             <a:endParaRPr lang="ru-RU"/>
           </a:p>
@@ -663,7 +829,7 @@
     </p:spTree>
     <p:extLst>
       <p:ext uri="{BB962C8B-B14F-4D97-AF65-F5344CB8AC3E}">
-        <p14:creationId xmlns:p14="http://schemas.microsoft.com/office/powerpoint/2010/main" val="4110706916"/>
+        <p14:creationId xmlns:p14="http://schemas.microsoft.com/office/powerpoint/2010/main" val="2681625295"/>
       </p:ext>
     </p:extLst>
   </p:cSld>
@@ -782,7 +948,7 @@
           <a:p>
             <a:fld id="{1C14A076-ED6C-40E7-8314-F402E5703C6E}" type="datetimeFigureOut">
               <a:rPr lang="ru-RU" smtClean="0"/>
-              <a:t>08.02.2016</a:t>
+              <a:t>10.02.2016</a:t>
             </a:fld>
             <a:endParaRPr lang="ru-RU"/>
           </a:p>
@@ -833,7 +999,7 @@
     </p:spTree>
     <p:extLst>
       <p:ext uri="{BB962C8B-B14F-4D97-AF65-F5344CB8AC3E}">
-        <p14:creationId xmlns:p14="http://schemas.microsoft.com/office/powerpoint/2010/main" val="602819284"/>
+        <p14:creationId xmlns:p14="http://schemas.microsoft.com/office/powerpoint/2010/main" val="940003117"/>
       </p:ext>
     </p:extLst>
   </p:cSld>
@@ -962,7 +1128,7 @@
           <a:p>
             <a:fld id="{1C14A076-ED6C-40E7-8314-F402E5703C6E}" type="datetimeFigureOut">
               <a:rPr lang="ru-RU" smtClean="0"/>
-              <a:t>08.02.2016</a:t>
+              <a:t>10.02.2016</a:t>
             </a:fld>
             <a:endParaRPr lang="ru-RU"/>
           </a:p>
@@ -1013,7 +1179,7 @@
     </p:spTree>
     <p:extLst>
       <p:ext uri="{BB962C8B-B14F-4D97-AF65-F5344CB8AC3E}">
-        <p14:creationId xmlns:p14="http://schemas.microsoft.com/office/powerpoint/2010/main" val="2190943448"/>
+        <p14:creationId xmlns:p14="http://schemas.microsoft.com/office/powerpoint/2010/main" val="3501723506"/>
       </p:ext>
     </p:extLst>
   </p:cSld>
@@ -1132,7 +1298,7 @@
           <a:p>
             <a:fld id="{1C14A076-ED6C-40E7-8314-F402E5703C6E}" type="datetimeFigureOut">
               <a:rPr lang="ru-RU" smtClean="0"/>
-              <a:t>08.02.2016</a:t>
+              <a:t>10.02.2016</a:t>
             </a:fld>
             <a:endParaRPr lang="ru-RU"/>
           </a:p>
@@ -1183,7 +1349,7 @@
     </p:spTree>
     <p:extLst>
       <p:ext uri="{BB962C8B-B14F-4D97-AF65-F5344CB8AC3E}">
-        <p14:creationId xmlns:p14="http://schemas.microsoft.com/office/powerpoint/2010/main" val="3181950381"/>
+        <p14:creationId xmlns:p14="http://schemas.microsoft.com/office/powerpoint/2010/main" val="1202658954"/>
       </p:ext>
     </p:extLst>
   </p:cSld>
@@ -1378,7 +1544,7 @@
           <a:p>
             <a:fld id="{1C14A076-ED6C-40E7-8314-F402E5703C6E}" type="datetimeFigureOut">
               <a:rPr lang="ru-RU" smtClean="0"/>
-              <a:t>08.02.2016</a:t>
+              <a:t>10.02.2016</a:t>
             </a:fld>
             <a:endParaRPr lang="ru-RU"/>
           </a:p>
@@ -1429,7 +1595,7 @@
     </p:spTree>
     <p:extLst>
       <p:ext uri="{BB962C8B-B14F-4D97-AF65-F5344CB8AC3E}">
-        <p14:creationId xmlns:p14="http://schemas.microsoft.com/office/powerpoint/2010/main" val="946715504"/>
+        <p14:creationId xmlns:p14="http://schemas.microsoft.com/office/powerpoint/2010/main" val="2069201150"/>
       </p:ext>
     </p:extLst>
   </p:cSld>
@@ -1610,7 +1776,7 @@
           <a:p>
             <a:fld id="{1C14A076-ED6C-40E7-8314-F402E5703C6E}" type="datetimeFigureOut">
               <a:rPr lang="ru-RU" smtClean="0"/>
-              <a:t>08.02.2016</a:t>
+              <a:t>10.02.2016</a:t>
             </a:fld>
             <a:endParaRPr lang="ru-RU"/>
           </a:p>
@@ -1661,7 +1827,7 @@
     </p:spTree>
     <p:extLst>
       <p:ext uri="{BB962C8B-B14F-4D97-AF65-F5344CB8AC3E}">
-        <p14:creationId xmlns:p14="http://schemas.microsoft.com/office/powerpoint/2010/main" val="4227106426"/>
+        <p14:creationId xmlns:p14="http://schemas.microsoft.com/office/powerpoint/2010/main" val="2723293853"/>
       </p:ext>
     </p:extLst>
   </p:cSld>
@@ -1977,7 +2143,7 @@
           <a:p>
             <a:fld id="{1C14A076-ED6C-40E7-8314-F402E5703C6E}" type="datetimeFigureOut">
               <a:rPr lang="ru-RU" smtClean="0"/>
-              <a:t>08.02.2016</a:t>
+              <a:t>10.02.2016</a:t>
             </a:fld>
             <a:endParaRPr lang="ru-RU"/>
           </a:p>
@@ -2028,7 +2194,7 @@
     </p:spTree>
     <p:extLst>
       <p:ext uri="{BB962C8B-B14F-4D97-AF65-F5344CB8AC3E}">
-        <p14:creationId xmlns:p14="http://schemas.microsoft.com/office/powerpoint/2010/main" val="2003843723"/>
+        <p14:creationId xmlns:p14="http://schemas.microsoft.com/office/powerpoint/2010/main" val="2343448709"/>
       </p:ext>
     </p:extLst>
   </p:cSld>
@@ -2095,7 +2261,7 @@
           <a:p>
             <a:fld id="{1C14A076-ED6C-40E7-8314-F402E5703C6E}" type="datetimeFigureOut">
               <a:rPr lang="ru-RU" smtClean="0"/>
-              <a:t>08.02.2016</a:t>
+              <a:t>10.02.2016</a:t>
             </a:fld>
             <a:endParaRPr lang="ru-RU"/>
           </a:p>
@@ -2146,7 +2312,7 @@
     </p:spTree>
     <p:extLst>
       <p:ext uri="{BB962C8B-B14F-4D97-AF65-F5344CB8AC3E}">
-        <p14:creationId xmlns:p14="http://schemas.microsoft.com/office/powerpoint/2010/main" val="1371693083"/>
+        <p14:creationId xmlns:p14="http://schemas.microsoft.com/office/powerpoint/2010/main" val="3037889613"/>
       </p:ext>
     </p:extLst>
   </p:cSld>
@@ -2190,7 +2356,7 @@
           <a:p>
             <a:fld id="{1C14A076-ED6C-40E7-8314-F402E5703C6E}" type="datetimeFigureOut">
               <a:rPr lang="ru-RU" smtClean="0"/>
-              <a:t>08.02.2016</a:t>
+              <a:t>10.02.2016</a:t>
             </a:fld>
             <a:endParaRPr lang="ru-RU"/>
           </a:p>
@@ -2241,7 +2407,7 @@
     </p:spTree>
     <p:extLst>
       <p:ext uri="{BB962C8B-B14F-4D97-AF65-F5344CB8AC3E}">
-        <p14:creationId xmlns:p14="http://schemas.microsoft.com/office/powerpoint/2010/main" val="2859905016"/>
+        <p14:creationId xmlns:p14="http://schemas.microsoft.com/office/powerpoint/2010/main" val="2161135393"/>
       </p:ext>
     </p:extLst>
   </p:cSld>
@@ -2467,7 +2633,7 @@
           <a:p>
             <a:fld id="{1C14A076-ED6C-40E7-8314-F402E5703C6E}" type="datetimeFigureOut">
               <a:rPr lang="ru-RU" smtClean="0"/>
-              <a:t>08.02.2016</a:t>
+              <a:t>10.02.2016</a:t>
             </a:fld>
             <a:endParaRPr lang="ru-RU"/>
           </a:p>
@@ -2518,7 +2684,7 @@
     </p:spTree>
     <p:extLst>
       <p:ext uri="{BB962C8B-B14F-4D97-AF65-F5344CB8AC3E}">
-        <p14:creationId xmlns:p14="http://schemas.microsoft.com/office/powerpoint/2010/main" val="1509728963"/>
+        <p14:creationId xmlns:p14="http://schemas.microsoft.com/office/powerpoint/2010/main" val="357722887"/>
       </p:ext>
     </p:extLst>
   </p:cSld>
@@ -2720,7 +2886,7 @@
           <a:p>
             <a:fld id="{1C14A076-ED6C-40E7-8314-F402E5703C6E}" type="datetimeFigureOut">
               <a:rPr lang="ru-RU" smtClean="0"/>
-              <a:t>08.02.2016</a:t>
+              <a:t>10.02.2016</a:t>
             </a:fld>
             <a:endParaRPr lang="ru-RU"/>
           </a:p>
@@ -2771,7 +2937,7 @@
     </p:spTree>
     <p:extLst>
       <p:ext uri="{BB962C8B-B14F-4D97-AF65-F5344CB8AC3E}">
-        <p14:creationId xmlns:p14="http://schemas.microsoft.com/office/powerpoint/2010/main" val="1886623860"/>
+        <p14:creationId xmlns:p14="http://schemas.microsoft.com/office/powerpoint/2010/main" val="3609024211"/>
       </p:ext>
     </p:extLst>
   </p:cSld>
@@ -2933,7 +3099,7 @@
           <a:p>
             <a:fld id="{1C14A076-ED6C-40E7-8314-F402E5703C6E}" type="datetimeFigureOut">
               <a:rPr lang="ru-RU" smtClean="0"/>
-              <a:t>08.02.2016</a:t>
+              <a:t>10.02.2016</a:t>
             </a:fld>
             <a:endParaRPr lang="ru-RU"/>
           </a:p>
@@ -3020,23 +3186,23 @@
     </p:spTree>
     <p:extLst>
       <p:ext uri="{BB962C8B-B14F-4D97-AF65-F5344CB8AC3E}">
-        <p14:creationId xmlns:p14="http://schemas.microsoft.com/office/powerpoint/2010/main" val="1663055709"/>
+        <p14:creationId xmlns:p14="http://schemas.microsoft.com/office/powerpoint/2010/main" val="1190189396"/>
       </p:ext>
     </p:extLst>
   </p:cSld>
   <p:clrMap bg1="lt1" tx1="dk1" bg2="lt2" tx2="dk2" accent1="accent1" accent2="accent2" accent3="accent3" accent4="accent4" accent5="accent5" accent6="accent6" hlink="hlink" folHlink="folHlink"/>
   <p:sldLayoutIdLst>
-    <p:sldLayoutId id="2147483649" r:id="rId1"/>
-    <p:sldLayoutId id="2147483650" r:id="rId2"/>
-    <p:sldLayoutId id="2147483651" r:id="rId3"/>
-    <p:sldLayoutId id="2147483652" r:id="rId4"/>
-    <p:sldLayoutId id="2147483653" r:id="rId5"/>
-    <p:sldLayoutId id="2147483654" r:id="rId6"/>
-    <p:sldLayoutId id="2147483655" r:id="rId7"/>
-    <p:sldLayoutId id="2147483656" r:id="rId8"/>
-    <p:sldLayoutId id="2147483657" r:id="rId9"/>
-    <p:sldLayoutId id="2147483658" r:id="rId10"/>
-    <p:sldLayoutId id="2147483659" r:id="rId11"/>
+    <p:sldLayoutId id="2147483708" r:id="rId1"/>
+    <p:sldLayoutId id="2147483709" r:id="rId2"/>
+    <p:sldLayoutId id="2147483710" r:id="rId3"/>
+    <p:sldLayoutId id="2147483711" r:id="rId4"/>
+    <p:sldLayoutId id="2147483712" r:id="rId5"/>
+    <p:sldLayoutId id="2147483713" r:id="rId6"/>
+    <p:sldLayoutId id="2147483714" r:id="rId7"/>
+    <p:sldLayoutId id="2147483715" r:id="rId8"/>
+    <p:sldLayoutId id="2147483716" r:id="rId9"/>
+    <p:sldLayoutId id="2147483717" r:id="rId10"/>
+    <p:sldLayoutId id="2147483718" r:id="rId11"/>
   </p:sldLayoutIdLst>
   <p:txStyles>
     <p:titleStyle>
@@ -3324,6 +3490,14 @@
 <file path=ppt/slides/slide1.xml><?xml version="1.0" encoding="utf-8"?>
 <p:sld xmlns:a="http://schemas.openxmlformats.org/drawingml/2006/main" xmlns:r="http://schemas.openxmlformats.org/officeDocument/2006/relationships" xmlns:p="http://schemas.openxmlformats.org/presentationml/2006/main">
   <p:cSld>
+    <p:bg>
+      <p:bgPr>
+        <a:solidFill>
+          <a:schemeClr val="tx1"/>
+        </a:solidFill>
+        <a:effectLst/>
+      </p:bgPr>
+    </p:bg>
     <p:spTree>
       <p:nvGrpSpPr>
         <p:cNvPr id="1" name=""/>
@@ -3348,12 +3522,34 @@
             <p:ph type="ctrTitle"/>
           </p:nvPr>
         </p:nvSpPr>
-        <p:spPr/>
-        <p:txBody>
-          <a:bodyPr/>
-          <a:lstStyle/>
-          <a:p>
-            <a:endParaRPr lang="ru-RU"/>
+        <p:spPr>
+          <a:xfrm>
+            <a:off x="5295897" y="2686050"/>
+            <a:ext cx="6533245" cy="723900"/>
+          </a:xfrm>
+        </p:spPr>
+        <p:txBody>
+          <a:bodyPr anchor="ctr">
+            <a:normAutofit/>
+          </a:bodyPr>
+          <a:lstStyle/>
+          <a:p>
+            <a:pPr algn="l"/>
+            <a:r>
+              <a:rPr lang="en-US" sz="2400" b="1" dirty="0" smtClean="0">
+                <a:solidFill>
+                  <a:schemeClr val="bg1"/>
+                </a:solidFill>
+                <a:latin typeface="+mn-lt"/>
+              </a:rPr>
+              <a:t>Research of mobile phone subscribers routes</a:t>
+            </a:r>
+            <a:endParaRPr lang="ru-RU" sz="2400" b="1" dirty="0">
+              <a:solidFill>
+                <a:schemeClr val="bg1"/>
+              </a:solidFill>
+              <a:latin typeface="+mn-lt"/>
+            </a:endParaRPr>
           </a:p>
         </p:txBody>
       </p:sp>
@@ -3367,15 +3563,70 @@
             <p:ph type="subTitle" idx="1"/>
           </p:nvPr>
         </p:nvSpPr>
-        <p:spPr/>
-        <p:txBody>
-          <a:bodyPr/>
-          <a:lstStyle/>
-          <a:p>
-            <a:endParaRPr lang="ru-RU"/>
-          </a:p>
-        </p:txBody>
-      </p:sp>
+        <p:spPr>
+          <a:xfrm>
+            <a:off x="5295899" y="3409950"/>
+            <a:ext cx="6410325" cy="361950"/>
+          </a:xfrm>
+        </p:spPr>
+        <p:txBody>
+          <a:bodyPr>
+            <a:normAutofit/>
+          </a:bodyPr>
+          <a:lstStyle/>
+          <a:p>
+            <a:pPr algn="l"/>
+            <a:r>
+              <a:rPr lang="en-US" sz="1600" dirty="0" smtClean="0">
+                <a:solidFill>
+                  <a:schemeClr val="bg1"/>
+                </a:solidFill>
+              </a:rPr>
+              <a:t>February</a:t>
+            </a:r>
+            <a:r>
+              <a:rPr lang="ru-RU" sz="1600" dirty="0" smtClean="0">
+                <a:solidFill>
+                  <a:schemeClr val="bg1"/>
+                </a:solidFill>
+              </a:rPr>
+              <a:t>, 2015</a:t>
+            </a:r>
+            <a:endParaRPr lang="ru-RU" sz="1800" dirty="0">
+              <a:solidFill>
+                <a:schemeClr val="bg1"/>
+              </a:solidFill>
+            </a:endParaRPr>
+          </a:p>
+        </p:txBody>
+      </p:sp>
+      <p:pic>
+        <p:nvPicPr>
+          <p:cNvPr id="7" name="Picture 6"/>
+          <p:cNvPicPr>
+            <a:picLocks noChangeAspect="1"/>
+          </p:cNvPicPr>
+          <p:nvPr/>
+        </p:nvPicPr>
+        <p:blipFill>
+          <a:blip r:embed="rId2"/>
+          <a:stretch>
+            <a:fillRect/>
+          </a:stretch>
+        </p:blipFill>
+        <p:spPr>
+          <a:xfrm>
+            <a:off x="143977" y="876300"/>
+            <a:ext cx="4569391" cy="5122181"/>
+          </a:xfrm>
+          <a:prstGeom prst="rect">
+            <a:avLst/>
+          </a:prstGeom>
+          <a:effectLst>
+            <a:softEdge rad="241300"/>
+          </a:effectLst>
+        </p:spPr>
+      </p:pic>
     </p:spTree>
     <p:extLst>
       <p:ext uri="{BB962C8B-B14F-4D97-AF65-F5344CB8AC3E}">
@@ -3386,6 +3637,13 @@
   <p:clrMapOvr>
     <a:masterClrMapping/>
   </p:clrMapOvr>
+  <p:timing>
+    <p:tnLst>
+      <p:par>
+        <p:cTn id="1" dur="indefinite" restart="never" nodeType="tmRoot"/>
+      </p:par>
+    </p:tnLst>
+  </p:timing>
 </p:sld>
 </file>
 
@@ -3408,7 +3666,7 @@
       </p:grpSpPr>
       <p:sp>
         <p:nvSpPr>
-          <p:cNvPr id="2" name="Title 1"/>
+          <p:cNvPr id="5" name="Title 4"/>
           <p:cNvSpPr>
             <a:spLocks noGrp="1"/>
           </p:cNvSpPr>
@@ -3421,29 +3679,38 @@
           <a:bodyPr/>
           <a:lstStyle/>
           <a:p>
-            <a:endParaRPr lang="en-US"/>
-          </a:p>
-        </p:txBody>
-      </p:sp>
-      <p:sp>
-        <p:nvSpPr>
-          <p:cNvPr id="3" name="Content Placeholder 2"/>
-          <p:cNvSpPr>
-            <a:spLocks noGrp="1"/>
-          </p:cNvSpPr>
-          <p:nvPr>
-            <p:ph idx="1"/>
-          </p:nvPr>
-        </p:nvSpPr>
-        <p:spPr/>
-        <p:txBody>
-          <a:bodyPr/>
-          <a:lstStyle/>
-          <a:p>
-            <a:endParaRPr lang="en-US"/>
-          </a:p>
-        </p:txBody>
-      </p:sp>
+            <a:r>
+              <a:rPr lang="en-US" dirty="0" smtClean="0"/>
+              <a:t>Example of the result from the algorithm that calculate base stations overlapping points</a:t>
+            </a:r>
+            <a:endParaRPr lang="ru-RU" dirty="0"/>
+          </a:p>
+        </p:txBody>
+      </p:sp>
+      <p:pic>
+        <p:nvPicPr>
+          <p:cNvPr id="3" name="Picture 2"/>
+          <p:cNvPicPr>
+            <a:picLocks noChangeAspect="1"/>
+          </p:cNvPicPr>
+          <p:nvPr/>
+        </p:nvPicPr>
+        <p:blipFill>
+          <a:blip r:embed="rId3"/>
+          <a:stretch>
+            <a:fillRect/>
+          </a:stretch>
+        </p:blipFill>
+        <p:spPr>
+          <a:xfrm>
+            <a:off x="283774" y="1944933"/>
+            <a:ext cx="5778367" cy="3968979"/>
+          </a:xfrm>
+          <a:prstGeom prst="rect">
+            <a:avLst/>
+          </a:prstGeom>
+        </p:spPr>
+      </p:pic>
       <p:pic>
         <p:nvPicPr>
           <p:cNvPr id="4" name="Picture 3"/>
@@ -3453,273 +3720,7 @@
           <p:nvPr/>
         </p:nvPicPr>
         <p:blipFill>
-          <a:blip r:embed="rId2"/>
-          <a:stretch>
-            <a:fillRect/>
-          </a:stretch>
-        </p:blipFill>
-        <p:spPr>
-          <a:xfrm>
-            <a:off x="1084241" y="1476932"/>
-            <a:ext cx="9977084" cy="5030746"/>
-          </a:xfrm>
-          <a:prstGeom prst="rect">
-            <a:avLst/>
-          </a:prstGeom>
-        </p:spPr>
-      </p:pic>
-    </p:spTree>
-    <p:extLst>
-      <p:ext uri="{BB962C8B-B14F-4D97-AF65-F5344CB8AC3E}">
-        <p14:creationId xmlns:p14="http://schemas.microsoft.com/office/powerpoint/2010/main" val="1555388984"/>
-      </p:ext>
-    </p:extLst>
-  </p:cSld>
-  <p:clrMapOvr>
-    <a:masterClrMapping/>
-  </p:clrMapOvr>
-</p:sld>
-</file>
-
-<file path=ppt/slides/slide11.xml><?xml version="1.0" encoding="utf-8"?>
-<p:sld xmlns:a="http://schemas.openxmlformats.org/drawingml/2006/main" xmlns:r="http://schemas.openxmlformats.org/officeDocument/2006/relationships" xmlns:p="http://schemas.openxmlformats.org/presentationml/2006/main">
-  <p:cSld>
-    <p:spTree>
-      <p:nvGrpSpPr>
-        <p:cNvPr id="1" name=""/>
-        <p:cNvGrpSpPr/>
-        <p:nvPr/>
-      </p:nvGrpSpPr>
-      <p:grpSpPr>
-        <a:xfrm>
-          <a:off x="0" y="0"/>
-          <a:ext cx="0" cy="0"/>
-          <a:chOff x="0" y="0"/>
-          <a:chExt cx="0" cy="0"/>
-        </a:xfrm>
-      </p:grpSpPr>
-      <p:sp>
-        <p:nvSpPr>
-          <p:cNvPr id="2" name="Title 1"/>
-          <p:cNvSpPr>
-            <a:spLocks noGrp="1"/>
-          </p:cNvSpPr>
-          <p:nvPr>
-            <p:ph type="title"/>
-          </p:nvPr>
-        </p:nvSpPr>
-        <p:spPr/>
-        <p:txBody>
-          <a:bodyPr/>
-          <a:lstStyle/>
-          <a:p>
-            <a:endParaRPr lang="en-US"/>
-          </a:p>
-        </p:txBody>
-      </p:sp>
-      <p:pic>
-        <p:nvPicPr>
-          <p:cNvPr id="4" name="Picture 3"/>
-          <p:cNvPicPr>
-            <a:picLocks noChangeAspect="1"/>
-          </p:cNvPicPr>
-          <p:nvPr/>
-        </p:nvPicPr>
-        <p:blipFill>
-          <a:blip r:embed="rId2"/>
-          <a:stretch>
-            <a:fillRect/>
-          </a:stretch>
-        </p:blipFill>
-        <p:spPr>
-          <a:xfrm>
-            <a:off x="838200" y="1416442"/>
-            <a:ext cx="9791144" cy="4941247"/>
-          </a:xfrm>
-          <a:prstGeom prst="rect">
-            <a:avLst/>
-          </a:prstGeom>
-        </p:spPr>
-      </p:pic>
-    </p:spTree>
-    <p:extLst>
-      <p:ext uri="{BB962C8B-B14F-4D97-AF65-F5344CB8AC3E}">
-        <p14:creationId xmlns:p14="http://schemas.microsoft.com/office/powerpoint/2010/main" val="3456961081"/>
-      </p:ext>
-    </p:extLst>
-  </p:cSld>
-  <p:clrMapOvr>
-    <a:masterClrMapping/>
-  </p:clrMapOvr>
-</p:sld>
-</file>
-
-<file path=ppt/slides/slide12.xml><?xml version="1.0" encoding="utf-8"?>
-<p:sld xmlns:a="http://schemas.openxmlformats.org/drawingml/2006/main" xmlns:r="http://schemas.openxmlformats.org/officeDocument/2006/relationships" xmlns:p="http://schemas.openxmlformats.org/presentationml/2006/main">
-  <p:cSld>
-    <p:spTree>
-      <p:nvGrpSpPr>
-        <p:cNvPr id="1" name=""/>
-        <p:cNvGrpSpPr/>
-        <p:nvPr/>
-      </p:nvGrpSpPr>
-      <p:grpSpPr>
-        <a:xfrm>
-          <a:off x="0" y="0"/>
-          <a:ext cx="0" cy="0"/>
-          <a:chOff x="0" y="0"/>
-          <a:chExt cx="0" cy="0"/>
-        </a:xfrm>
-      </p:grpSpPr>
-      <p:sp>
-        <p:nvSpPr>
-          <p:cNvPr id="2" name="Title 1"/>
-          <p:cNvSpPr>
-            <a:spLocks noGrp="1"/>
-          </p:cNvSpPr>
-          <p:nvPr>
-            <p:ph type="title"/>
-          </p:nvPr>
-        </p:nvSpPr>
-        <p:spPr/>
-        <p:txBody>
-          <a:bodyPr/>
-          <a:lstStyle/>
-          <a:p>
-            <a:endParaRPr lang="en-US"/>
-          </a:p>
-        </p:txBody>
-      </p:sp>
-      <p:sp>
-        <p:nvSpPr>
-          <p:cNvPr id="3" name="Content Placeholder 2"/>
-          <p:cNvSpPr>
-            <a:spLocks noGrp="1"/>
-          </p:cNvSpPr>
-          <p:nvPr>
-            <p:ph idx="1"/>
-          </p:nvPr>
-        </p:nvSpPr>
-        <p:spPr/>
-        <p:txBody>
-          <a:bodyPr/>
-          <a:lstStyle/>
-          <a:p>
-            <a:endParaRPr lang="en-US"/>
-          </a:p>
-        </p:txBody>
-      </p:sp>
-      <p:pic>
-        <p:nvPicPr>
-          <p:cNvPr id="4" name="Picture 3"/>
-          <p:cNvPicPr>
-            <a:picLocks noChangeAspect="1"/>
-          </p:cNvPicPr>
-          <p:nvPr/>
-        </p:nvPicPr>
-        <p:blipFill>
-          <a:blip r:embed="rId2"/>
-          <a:stretch>
-            <a:fillRect/>
-          </a:stretch>
-        </p:blipFill>
-        <p:spPr>
-          <a:xfrm>
-            <a:off x="1053379" y="1577707"/>
-            <a:ext cx="9588796" cy="4847173"/>
-          </a:xfrm>
-          <a:prstGeom prst="rect">
-            <a:avLst/>
-          </a:prstGeom>
-        </p:spPr>
-      </p:pic>
-    </p:spTree>
-    <p:extLst>
-      <p:ext uri="{BB962C8B-B14F-4D97-AF65-F5344CB8AC3E}">
-        <p14:creationId xmlns:p14="http://schemas.microsoft.com/office/powerpoint/2010/main" val="1642550565"/>
-      </p:ext>
-    </p:extLst>
-  </p:cSld>
-  <p:clrMapOvr>
-    <a:masterClrMapping/>
-  </p:clrMapOvr>
-</p:sld>
-</file>
-
-<file path=ppt/slides/slide13.xml><?xml version="1.0" encoding="utf-8"?>
-<p:sld xmlns:a="http://schemas.openxmlformats.org/drawingml/2006/main" xmlns:r="http://schemas.openxmlformats.org/officeDocument/2006/relationships" xmlns:p="http://schemas.openxmlformats.org/presentationml/2006/main">
-  <p:cSld>
-    <p:spTree>
-      <p:nvGrpSpPr>
-        <p:cNvPr id="1" name=""/>
-        <p:cNvGrpSpPr/>
-        <p:nvPr/>
-      </p:nvGrpSpPr>
-      <p:grpSpPr>
-        <a:xfrm>
-          <a:off x="0" y="0"/>
-          <a:ext cx="0" cy="0"/>
-          <a:chOff x="0" y="0"/>
-          <a:chExt cx="0" cy="0"/>
-        </a:xfrm>
-      </p:grpSpPr>
-      <p:pic>
-        <p:nvPicPr>
-          <p:cNvPr id="3" name="Picture 2"/>
-          <p:cNvPicPr>
-            <a:picLocks noChangeAspect="1"/>
-          </p:cNvPicPr>
-          <p:nvPr/>
-        </p:nvPicPr>
-        <p:blipFill>
-          <a:blip r:embed="rId2"/>
-          <a:stretch>
-            <a:fillRect/>
-          </a:stretch>
-        </p:blipFill>
-        <p:spPr>
-          <a:xfrm>
-            <a:off x="283774" y="1944933"/>
-            <a:ext cx="5778367" cy="3968979"/>
-          </a:xfrm>
-          <a:prstGeom prst="rect">
-            <a:avLst/>
-          </a:prstGeom>
-        </p:spPr>
-      </p:pic>
-      <p:sp>
-        <p:nvSpPr>
-          <p:cNvPr id="2" name="Title 1"/>
-          <p:cNvSpPr>
-            <a:spLocks noGrp="1"/>
-          </p:cNvSpPr>
-          <p:nvPr>
-            <p:ph type="title"/>
-          </p:nvPr>
-        </p:nvSpPr>
-        <p:spPr/>
-        <p:txBody>
-          <a:bodyPr/>
-          <a:lstStyle/>
-          <a:p>
-            <a:r>
-              <a:rPr lang="ru-RU" dirty="0" smtClean="0"/>
-              <a:t>Пересечения между зонами приёма вышек</a:t>
-            </a:r>
-            <a:endParaRPr lang="en-US" dirty="0"/>
-          </a:p>
-        </p:txBody>
-      </p:sp>
-      <p:pic>
-        <p:nvPicPr>
-          <p:cNvPr id="4" name="Picture 3"/>
-          <p:cNvPicPr>
-            <a:picLocks noChangeAspect="1"/>
-          </p:cNvPicPr>
-          <p:nvPr/>
-        </p:nvPicPr>
-        <p:blipFill>
-          <a:blip r:embed="rId3"/>
+          <a:blip r:embed="rId4"/>
           <a:stretch>
             <a:fillRect/>
           </a:stretch>
@@ -4107,6 +4108,695 @@
 </p:sld>
 </file>
 
+<file path=ppt/slides/slide11.xml><?xml version="1.0" encoding="utf-8"?>
+<p:sld xmlns:a="http://schemas.openxmlformats.org/drawingml/2006/main" xmlns:r="http://schemas.openxmlformats.org/officeDocument/2006/relationships" xmlns:p="http://schemas.openxmlformats.org/presentationml/2006/main">
+  <p:cSld>
+    <p:spTree>
+      <p:nvGrpSpPr>
+        <p:cNvPr id="1" name=""/>
+        <p:cNvGrpSpPr/>
+        <p:nvPr/>
+      </p:nvGrpSpPr>
+      <p:grpSpPr>
+        <a:xfrm>
+          <a:off x="0" y="0"/>
+          <a:ext cx="0" cy="0"/>
+          <a:chOff x="0" y="0"/>
+          <a:chExt cx="0" cy="0"/>
+        </a:xfrm>
+      </p:grpSpPr>
+      <p:sp>
+        <p:nvSpPr>
+          <p:cNvPr id="2" name="Title 1"/>
+          <p:cNvSpPr>
+            <a:spLocks noGrp="1"/>
+          </p:cNvSpPr>
+          <p:nvPr>
+            <p:ph type="title"/>
+          </p:nvPr>
+        </p:nvSpPr>
+        <p:spPr/>
+        <p:txBody>
+          <a:bodyPr>
+            <a:normAutofit/>
+          </a:bodyPr>
+          <a:lstStyle/>
+          <a:p>
+            <a:r>
+              <a:rPr lang="en-US" sz="4000" dirty="0" smtClean="0"/>
+              <a:t>All base stations that overlaps a selected station</a:t>
+            </a:r>
+            <a:endParaRPr lang="ru-RU" sz="4000" dirty="0"/>
+          </a:p>
+        </p:txBody>
+      </p:sp>
+      <p:pic>
+        <p:nvPicPr>
+          <p:cNvPr id="5" name="Picture 4"/>
+          <p:cNvPicPr>
+            <a:picLocks noChangeAspect="1"/>
+          </p:cNvPicPr>
+          <p:nvPr/>
+        </p:nvPicPr>
+        <p:blipFill>
+          <a:blip r:embed="rId2"/>
+          <a:stretch>
+            <a:fillRect/>
+          </a:stretch>
+        </p:blipFill>
+        <p:spPr>
+          <a:xfrm>
+            <a:off x="838200" y="3016250"/>
+            <a:ext cx="4721555" cy="3582950"/>
+          </a:xfrm>
+          <a:prstGeom prst="rect">
+            <a:avLst/>
+          </a:prstGeom>
+        </p:spPr>
+      </p:pic>
+      <p:pic>
+        <p:nvPicPr>
+          <p:cNvPr id="6" name="Picture 5"/>
+          <p:cNvPicPr>
+            <a:picLocks noChangeAspect="1"/>
+          </p:cNvPicPr>
+          <p:nvPr/>
+        </p:nvPicPr>
+        <p:blipFill>
+          <a:blip r:embed="rId3"/>
+          <a:stretch>
+            <a:fillRect/>
+          </a:stretch>
+        </p:blipFill>
+        <p:spPr>
+          <a:xfrm>
+            <a:off x="6315661" y="3016250"/>
+            <a:ext cx="4768447" cy="3582950"/>
+          </a:xfrm>
+          <a:prstGeom prst="rect">
+            <a:avLst/>
+          </a:prstGeom>
+        </p:spPr>
+      </p:pic>
+      <p:sp>
+        <p:nvSpPr>
+          <p:cNvPr id="7" name="TextBox 6"/>
+          <p:cNvSpPr txBox="1"/>
+          <p:nvPr/>
+        </p:nvSpPr>
+        <p:spPr>
+          <a:xfrm>
+            <a:off x="838199" y="1394691"/>
+            <a:ext cx="10810876" cy="1754326"/>
+          </a:xfrm>
+          <a:prstGeom prst="rect">
+            <a:avLst/>
+          </a:prstGeom>
+          <a:noFill/>
+        </p:spPr>
+        <p:txBody>
+          <a:bodyPr wrap="square" rtlCol="0">
+            <a:spAutoFit/>
+          </a:bodyPr>
+          <a:lstStyle/>
+          <a:p>
+            <a:pPr marL="285750" indent="-285750">
+              <a:buFont typeface="Arial" panose="020B0604020202020204" pitchFamily="34" charset="0"/>
+              <a:buChar char="•"/>
+            </a:pPr>
+            <a:r>
+              <a:rPr lang="en-US" dirty="0" smtClean="0"/>
+              <a:t>On the graphs we can see a red triangle – this is a working zone of the selected base station</a:t>
+            </a:r>
+          </a:p>
+          <a:p>
+            <a:pPr marL="285750" indent="-285750">
+              <a:buFont typeface="Arial" panose="020B0604020202020204" pitchFamily="34" charset="0"/>
+              <a:buChar char="•"/>
+            </a:pPr>
+            <a:r>
+              <a:rPr lang="en-US" dirty="0" smtClean="0"/>
+              <a:t>To calculate all overlapping stations we use the following algorithm:</a:t>
+            </a:r>
+          </a:p>
+          <a:p>
+            <a:pPr marL="742950" lvl="1" indent="-285750">
+              <a:buFont typeface="Arial" panose="020B0604020202020204" pitchFamily="34" charset="0"/>
+              <a:buChar char="•"/>
+            </a:pPr>
+            <a:r>
+              <a:rPr lang="en-US" dirty="0" smtClean="0"/>
+              <a:t>Search for all stations in a reasonable radius from the selected stations</a:t>
+            </a:r>
+          </a:p>
+          <a:p>
+            <a:pPr marL="742950" lvl="1" indent="-285750">
+              <a:buFont typeface="Arial" panose="020B0604020202020204" pitchFamily="34" charset="0"/>
+              <a:buChar char="•"/>
+            </a:pPr>
+            <a:r>
+              <a:rPr lang="en-US" dirty="0" smtClean="0"/>
+              <a:t>For each of the station in this radius we identify if stations have overlapping connection zones with current station or not</a:t>
+            </a:r>
+          </a:p>
+          <a:p>
+            <a:pPr marL="285750" indent="-285750">
+              <a:buFont typeface="Arial" panose="020B0604020202020204" pitchFamily="34" charset="0"/>
+              <a:buChar char="•"/>
+            </a:pPr>
+            <a:endParaRPr lang="ru-RU" dirty="0"/>
+          </a:p>
+        </p:txBody>
+      </p:sp>
+    </p:spTree>
+    <p:extLst>
+      <p:ext uri="{BB962C8B-B14F-4D97-AF65-F5344CB8AC3E}">
+        <p14:creationId xmlns:p14="http://schemas.microsoft.com/office/powerpoint/2010/main" val="4161222387"/>
+      </p:ext>
+    </p:extLst>
+  </p:cSld>
+  <p:clrMapOvr>
+    <a:masterClrMapping/>
+  </p:clrMapOvr>
+</p:sld>
+</file>
+
+<file path=ppt/slides/slide12.xml><?xml version="1.0" encoding="utf-8"?>
+<p:sld xmlns:a="http://schemas.openxmlformats.org/drawingml/2006/main" xmlns:r="http://schemas.openxmlformats.org/officeDocument/2006/relationships" xmlns:p="http://schemas.openxmlformats.org/presentationml/2006/main">
+  <p:cSld>
+    <p:spTree>
+      <p:nvGrpSpPr>
+        <p:cNvPr id="1" name=""/>
+        <p:cNvGrpSpPr/>
+        <p:nvPr/>
+      </p:nvGrpSpPr>
+      <p:grpSpPr>
+        <a:xfrm>
+          <a:off x="0" y="0"/>
+          <a:ext cx="0" cy="0"/>
+          <a:chOff x="0" y="0"/>
+          <a:chExt cx="0" cy="0"/>
+        </a:xfrm>
+      </p:grpSpPr>
+      <p:sp>
+        <p:nvSpPr>
+          <p:cNvPr id="2" name="Title 1"/>
+          <p:cNvSpPr>
+            <a:spLocks noGrp="1"/>
+          </p:cNvSpPr>
+          <p:nvPr>
+            <p:ph type="title"/>
+          </p:nvPr>
+        </p:nvSpPr>
+        <p:spPr/>
+        <p:txBody>
+          <a:bodyPr/>
+          <a:lstStyle/>
+          <a:p>
+            <a:r>
+              <a:rPr lang="en-US" dirty="0" err="1" smtClean="0"/>
+              <a:t>Buildling</a:t>
+            </a:r>
+            <a:r>
+              <a:rPr lang="en-US" dirty="0" smtClean="0"/>
+              <a:t> train and test datasets</a:t>
+            </a:r>
+            <a:endParaRPr lang="ru-RU" dirty="0"/>
+          </a:p>
+        </p:txBody>
+      </p:sp>
+      <p:sp>
+        <p:nvSpPr>
+          <p:cNvPr id="3" name="Content Placeholder 2"/>
+          <p:cNvSpPr>
+            <a:spLocks noGrp="1"/>
+          </p:cNvSpPr>
+          <p:nvPr>
+            <p:ph idx="1"/>
+          </p:nvPr>
+        </p:nvSpPr>
+        <p:spPr>
+          <a:xfrm>
+            <a:off x="838200" y="1825625"/>
+            <a:ext cx="5038725" cy="4351338"/>
+          </a:xfrm>
+        </p:spPr>
+        <p:txBody>
+          <a:bodyPr/>
+          <a:lstStyle/>
+          <a:p>
+            <a:pPr marL="0" indent="0">
+              <a:buNone/>
+            </a:pPr>
+            <a:r>
+              <a:rPr lang="en-US" dirty="0" smtClean="0">
+                <a:solidFill>
+                  <a:srgbClr val="92D050"/>
+                </a:solidFill>
+              </a:rPr>
+              <a:t>Test data:</a:t>
+            </a:r>
+          </a:p>
+          <a:p>
+            <a:r>
+              <a:rPr lang="en-US" sz="2000" dirty="0" smtClean="0"/>
+              <a:t>Will contain of 120 pairs from the fact table with the class ‘1’ – e.g. two pairs match</a:t>
+            </a:r>
+          </a:p>
+          <a:p>
+            <a:endParaRPr lang="en-US" sz="2000" dirty="0" smtClean="0"/>
+          </a:p>
+          <a:p>
+            <a:r>
+              <a:rPr lang="en-US" sz="2000" dirty="0" smtClean="0"/>
+              <a:t>1000 pairs generated from other combinations of the ‘</a:t>
+            </a:r>
+            <a:r>
+              <a:rPr lang="en-US" sz="2000" dirty="0" err="1" smtClean="0"/>
+              <a:t>msisdn’s</a:t>
+            </a:r>
+            <a:r>
+              <a:rPr lang="en-US" sz="2000" dirty="0" smtClean="0"/>
+              <a:t>’ available in the fact table. We will assume that with the high probability this ‘</a:t>
+            </a:r>
+            <a:r>
+              <a:rPr lang="en-US" sz="2000" dirty="0" err="1" smtClean="0"/>
+              <a:t>msisdn’s</a:t>
+            </a:r>
+            <a:r>
+              <a:rPr lang="en-US" sz="2000" dirty="0" smtClean="0"/>
+              <a:t>’ don’t match. This pairs will  have the class ‘0’</a:t>
+            </a:r>
+            <a:endParaRPr lang="ru-RU" sz="2000" dirty="0"/>
+          </a:p>
+        </p:txBody>
+      </p:sp>
+      <p:sp>
+        <p:nvSpPr>
+          <p:cNvPr id="4" name="Content Placeholder 2"/>
+          <p:cNvSpPr txBox="1">
+            <a:spLocks/>
+          </p:cNvSpPr>
+          <p:nvPr/>
+        </p:nvSpPr>
+        <p:spPr>
+          <a:xfrm>
+            <a:off x="6143625" y="1825625"/>
+            <a:ext cx="5038725" cy="4351338"/>
+          </a:xfrm>
+          <a:prstGeom prst="rect">
+            <a:avLst/>
+          </a:prstGeom>
+        </p:spPr>
+        <p:txBody>
+          <a:bodyPr vert="horz" lIns="91440" tIns="45720" rIns="91440" bIns="45720" rtlCol="0">
+            <a:normAutofit/>
+          </a:bodyPr>
+          <a:lstStyle>
+            <a:lvl1pPr marL="228600" indent="-228600" algn="l" defTabSz="914400" rtl="0" eaLnBrk="1" latinLnBrk="0" hangingPunct="1">
+              <a:lnSpc>
+                <a:spcPct val="90000"/>
+              </a:lnSpc>
+              <a:spcBef>
+                <a:spcPts val="1000"/>
+              </a:spcBef>
+              <a:buFont typeface="Arial" panose="020B0604020202020204" pitchFamily="34" charset="0"/>
+              <a:buChar char="•"/>
+              <a:defRPr sz="2800" kern="1200">
+                <a:solidFill>
+                  <a:schemeClr val="tx1"/>
+                </a:solidFill>
+                <a:latin typeface="+mn-lt"/>
+                <a:ea typeface="+mn-ea"/>
+                <a:cs typeface="+mn-cs"/>
+              </a:defRPr>
+            </a:lvl1pPr>
+            <a:lvl2pPr marL="685800" indent="-228600" algn="l" defTabSz="914400" rtl="0" eaLnBrk="1" latinLnBrk="0" hangingPunct="1">
+              <a:lnSpc>
+                <a:spcPct val="90000"/>
+              </a:lnSpc>
+              <a:spcBef>
+                <a:spcPts val="500"/>
+              </a:spcBef>
+              <a:buFont typeface="Arial" panose="020B0604020202020204" pitchFamily="34" charset="0"/>
+              <a:buChar char="•"/>
+              <a:defRPr sz="2400" kern="1200">
+                <a:solidFill>
+                  <a:schemeClr val="tx1"/>
+                </a:solidFill>
+                <a:latin typeface="+mn-lt"/>
+                <a:ea typeface="+mn-ea"/>
+                <a:cs typeface="+mn-cs"/>
+              </a:defRPr>
+            </a:lvl2pPr>
+            <a:lvl3pPr marL="1143000" indent="-228600" algn="l" defTabSz="914400" rtl="0" eaLnBrk="1" latinLnBrk="0" hangingPunct="1">
+              <a:lnSpc>
+                <a:spcPct val="90000"/>
+              </a:lnSpc>
+              <a:spcBef>
+                <a:spcPts val="500"/>
+              </a:spcBef>
+              <a:buFont typeface="Arial" panose="020B0604020202020204" pitchFamily="34" charset="0"/>
+              <a:buChar char="•"/>
+              <a:defRPr sz="2000" kern="1200">
+                <a:solidFill>
+                  <a:schemeClr val="tx1"/>
+                </a:solidFill>
+                <a:latin typeface="+mn-lt"/>
+                <a:ea typeface="+mn-ea"/>
+                <a:cs typeface="+mn-cs"/>
+              </a:defRPr>
+            </a:lvl3pPr>
+            <a:lvl4pPr marL="1600200" indent="-228600" algn="l" defTabSz="914400" rtl="0" eaLnBrk="1" latinLnBrk="0" hangingPunct="1">
+              <a:lnSpc>
+                <a:spcPct val="90000"/>
+              </a:lnSpc>
+              <a:spcBef>
+                <a:spcPts val="500"/>
+              </a:spcBef>
+              <a:buFont typeface="Arial" panose="020B0604020202020204" pitchFamily="34" charset="0"/>
+              <a:buChar char="•"/>
+              <a:defRPr sz="1800" kern="1200">
+                <a:solidFill>
+                  <a:schemeClr val="tx1"/>
+                </a:solidFill>
+                <a:latin typeface="+mn-lt"/>
+                <a:ea typeface="+mn-ea"/>
+                <a:cs typeface="+mn-cs"/>
+              </a:defRPr>
+            </a:lvl4pPr>
+            <a:lvl5pPr marL="2057400" indent="-228600" algn="l" defTabSz="914400" rtl="0" eaLnBrk="1" latinLnBrk="0" hangingPunct="1">
+              <a:lnSpc>
+                <a:spcPct val="90000"/>
+              </a:lnSpc>
+              <a:spcBef>
+                <a:spcPts val="500"/>
+              </a:spcBef>
+              <a:buFont typeface="Arial" panose="020B0604020202020204" pitchFamily="34" charset="0"/>
+              <a:buChar char="•"/>
+              <a:defRPr sz="1800" kern="1200">
+                <a:solidFill>
+                  <a:schemeClr val="tx1"/>
+                </a:solidFill>
+                <a:latin typeface="+mn-lt"/>
+                <a:ea typeface="+mn-ea"/>
+                <a:cs typeface="+mn-cs"/>
+              </a:defRPr>
+            </a:lvl5pPr>
+            <a:lvl6pPr marL="2514600" indent="-228600" algn="l" defTabSz="914400" rtl="0" eaLnBrk="1" latinLnBrk="0" hangingPunct="1">
+              <a:lnSpc>
+                <a:spcPct val="90000"/>
+              </a:lnSpc>
+              <a:spcBef>
+                <a:spcPts val="500"/>
+              </a:spcBef>
+              <a:buFont typeface="Arial" panose="020B0604020202020204" pitchFamily="34" charset="0"/>
+              <a:buChar char="•"/>
+              <a:defRPr sz="1800" kern="1200">
+                <a:solidFill>
+                  <a:schemeClr val="tx1"/>
+                </a:solidFill>
+                <a:latin typeface="+mn-lt"/>
+                <a:ea typeface="+mn-ea"/>
+                <a:cs typeface="+mn-cs"/>
+              </a:defRPr>
+            </a:lvl6pPr>
+            <a:lvl7pPr marL="2971800" indent="-228600" algn="l" defTabSz="914400" rtl="0" eaLnBrk="1" latinLnBrk="0" hangingPunct="1">
+              <a:lnSpc>
+                <a:spcPct val="90000"/>
+              </a:lnSpc>
+              <a:spcBef>
+                <a:spcPts val="500"/>
+              </a:spcBef>
+              <a:buFont typeface="Arial" panose="020B0604020202020204" pitchFamily="34" charset="0"/>
+              <a:buChar char="•"/>
+              <a:defRPr sz="1800" kern="1200">
+                <a:solidFill>
+                  <a:schemeClr val="tx1"/>
+                </a:solidFill>
+                <a:latin typeface="+mn-lt"/>
+                <a:ea typeface="+mn-ea"/>
+                <a:cs typeface="+mn-cs"/>
+              </a:defRPr>
+            </a:lvl7pPr>
+            <a:lvl8pPr marL="3429000" indent="-228600" algn="l" defTabSz="914400" rtl="0" eaLnBrk="1" latinLnBrk="0" hangingPunct="1">
+              <a:lnSpc>
+                <a:spcPct val="90000"/>
+              </a:lnSpc>
+              <a:spcBef>
+                <a:spcPts val="500"/>
+              </a:spcBef>
+              <a:buFont typeface="Arial" panose="020B0604020202020204" pitchFamily="34" charset="0"/>
+              <a:buChar char="•"/>
+              <a:defRPr sz="1800" kern="1200">
+                <a:solidFill>
+                  <a:schemeClr val="tx1"/>
+                </a:solidFill>
+                <a:latin typeface="+mn-lt"/>
+                <a:ea typeface="+mn-ea"/>
+                <a:cs typeface="+mn-cs"/>
+              </a:defRPr>
+            </a:lvl8pPr>
+            <a:lvl9pPr marL="3886200" indent="-228600" algn="l" defTabSz="914400" rtl="0" eaLnBrk="1" latinLnBrk="0" hangingPunct="1">
+              <a:lnSpc>
+                <a:spcPct val="90000"/>
+              </a:lnSpc>
+              <a:spcBef>
+                <a:spcPts val="500"/>
+              </a:spcBef>
+              <a:buFont typeface="Arial" panose="020B0604020202020204" pitchFamily="34" charset="0"/>
+              <a:buChar char="•"/>
+              <a:defRPr sz="1800" kern="1200">
+                <a:solidFill>
+                  <a:schemeClr val="tx1"/>
+                </a:solidFill>
+                <a:latin typeface="+mn-lt"/>
+                <a:ea typeface="+mn-ea"/>
+                <a:cs typeface="+mn-cs"/>
+              </a:defRPr>
+            </a:lvl9pPr>
+          </a:lstStyle>
+          <a:p>
+            <a:pPr marL="0" indent="0">
+              <a:buFont typeface="Arial" panose="020B0604020202020204" pitchFamily="34" charset="0"/>
+              <a:buNone/>
+            </a:pPr>
+            <a:r>
+              <a:rPr lang="en-US" dirty="0" smtClean="0">
+                <a:solidFill>
+                  <a:srgbClr val="92D050"/>
+                </a:solidFill>
+              </a:rPr>
+              <a:t>Test data:</a:t>
+            </a:r>
+          </a:p>
+          <a:p>
+            <a:r>
+              <a:rPr lang="en-US" sz="2000" dirty="0" smtClean="0"/>
+              <a:t>Input data have 2361 different ‘</a:t>
+            </a:r>
+            <a:r>
+              <a:rPr lang="en-US" sz="2000" dirty="0" err="1" smtClean="0"/>
+              <a:t>msisdn’s</a:t>
+            </a:r>
+            <a:r>
+              <a:rPr lang="en-US" sz="2000" dirty="0" smtClean="0"/>
+              <a:t>’</a:t>
+            </a:r>
+          </a:p>
+          <a:p>
+            <a:endParaRPr lang="en-US" sz="2000" dirty="0" smtClean="0"/>
+          </a:p>
+          <a:p>
+            <a:r>
+              <a:rPr lang="en-US" sz="2000" dirty="0" smtClean="0"/>
+              <a:t>To build the test data we will construct the matrix with all possible unique combinations of this 2361 ids and then we will use our classifier to predict if two ‘</a:t>
+            </a:r>
+            <a:r>
+              <a:rPr lang="en-US" sz="2000" dirty="0" err="1" smtClean="0"/>
+              <a:t>msisdn’s</a:t>
+            </a:r>
+            <a:r>
+              <a:rPr lang="en-US" sz="2000" dirty="0" smtClean="0"/>
+              <a:t>’ match with each other or not</a:t>
+            </a:r>
+            <a:endParaRPr lang="ru-RU" sz="2000" dirty="0" smtClean="0"/>
+          </a:p>
+        </p:txBody>
+      </p:sp>
+    </p:spTree>
+    <p:extLst>
+      <p:ext uri="{BB962C8B-B14F-4D97-AF65-F5344CB8AC3E}">
+        <p14:creationId xmlns:p14="http://schemas.microsoft.com/office/powerpoint/2010/main" val="450677932"/>
+      </p:ext>
+    </p:extLst>
+  </p:cSld>
+  <p:clrMapOvr>
+    <a:masterClrMapping/>
+  </p:clrMapOvr>
+</p:sld>
+</file>
+
+<file path=ppt/slides/slide13.xml><?xml version="1.0" encoding="utf-8"?>
+<p:sld xmlns:a="http://schemas.openxmlformats.org/drawingml/2006/main" xmlns:r="http://schemas.openxmlformats.org/officeDocument/2006/relationships" xmlns:p="http://schemas.openxmlformats.org/presentationml/2006/main">
+  <p:cSld>
+    <p:spTree>
+      <p:nvGrpSpPr>
+        <p:cNvPr id="1" name=""/>
+        <p:cNvGrpSpPr/>
+        <p:nvPr/>
+      </p:nvGrpSpPr>
+      <p:grpSpPr>
+        <a:xfrm>
+          <a:off x="0" y="0"/>
+          <a:ext cx="0" cy="0"/>
+          <a:chOff x="0" y="0"/>
+          <a:chExt cx="0" cy="0"/>
+        </a:xfrm>
+      </p:grpSpPr>
+      <p:sp>
+        <p:nvSpPr>
+          <p:cNvPr id="2" name="Title 1"/>
+          <p:cNvSpPr>
+            <a:spLocks noGrp="1"/>
+          </p:cNvSpPr>
+          <p:nvPr>
+            <p:ph type="title"/>
+          </p:nvPr>
+        </p:nvSpPr>
+        <p:spPr/>
+        <p:txBody>
+          <a:bodyPr/>
+          <a:lstStyle/>
+          <a:p>
+            <a:r>
+              <a:rPr lang="en-US" dirty="0" smtClean="0"/>
+              <a:t>Building Features</a:t>
+            </a:r>
+            <a:endParaRPr lang="ru-RU" dirty="0"/>
+          </a:p>
+        </p:txBody>
+      </p:sp>
+      <p:sp>
+        <p:nvSpPr>
+          <p:cNvPr id="3" name="Content Placeholder 2"/>
+          <p:cNvSpPr>
+            <a:spLocks noGrp="1"/>
+          </p:cNvSpPr>
+          <p:nvPr>
+            <p:ph idx="1"/>
+          </p:nvPr>
+        </p:nvSpPr>
+        <p:spPr/>
+        <p:txBody>
+          <a:bodyPr/>
+          <a:lstStyle/>
+          <a:p>
+            <a:r>
+              <a:rPr lang="en-US" sz="2400" dirty="0" err="1" smtClean="0"/>
+              <a:t>Jaccard</a:t>
+            </a:r>
+            <a:r>
+              <a:rPr lang="en-US" sz="2400" dirty="0" smtClean="0"/>
+              <a:t> distance, S2 and S3 distances between two ‘</a:t>
+            </a:r>
+            <a:r>
+              <a:rPr lang="en-US" sz="2400" dirty="0" err="1" smtClean="0"/>
+              <a:t>msisdn’s</a:t>
+            </a:r>
+            <a:r>
+              <a:rPr lang="en-US" sz="2400" dirty="0" smtClean="0"/>
+              <a:t>’ for the original data</a:t>
+            </a:r>
+          </a:p>
+          <a:p>
+            <a:r>
+              <a:rPr lang="en-US" sz="2400" dirty="0" smtClean="0"/>
+              <a:t>If two ‘</a:t>
+            </a:r>
+            <a:r>
+              <a:rPr lang="en-US" sz="2400" dirty="0" err="1" smtClean="0"/>
+              <a:t>msisdn’s</a:t>
+            </a:r>
+            <a:r>
+              <a:rPr lang="en-US" sz="2400" dirty="0" smtClean="0"/>
+              <a:t>’ have matching phones</a:t>
+            </a:r>
+          </a:p>
+          <a:p>
+            <a:r>
+              <a:rPr lang="en-US" sz="2400" dirty="0" smtClean="0"/>
+              <a:t>If two ‘</a:t>
+            </a:r>
+            <a:r>
+              <a:rPr lang="en-US" sz="2400" dirty="0" err="1" smtClean="0"/>
+              <a:t>msisdn’s</a:t>
+            </a:r>
+            <a:r>
+              <a:rPr lang="en-US" sz="2400" dirty="0" smtClean="0"/>
+              <a:t>’ have matching phone vendors</a:t>
+            </a:r>
+          </a:p>
+          <a:p>
+            <a:r>
+              <a:rPr lang="en-US" sz="2400" dirty="0" smtClean="0"/>
+              <a:t>If one of two ‘</a:t>
+            </a:r>
+            <a:r>
+              <a:rPr lang="en-US" sz="2400" dirty="0" err="1" smtClean="0"/>
+              <a:t>msisdn’s</a:t>
+            </a:r>
+            <a:r>
+              <a:rPr lang="en-US" sz="2400" dirty="0" smtClean="0"/>
+              <a:t>’ used Laptop, USB modem or other Network device</a:t>
+            </a:r>
+          </a:p>
+          <a:p>
+            <a:r>
+              <a:rPr lang="en-US" sz="2400" dirty="0" err="1" smtClean="0"/>
+              <a:t>Jaccard</a:t>
+            </a:r>
+            <a:r>
+              <a:rPr lang="en-US" sz="2400" dirty="0" smtClean="0"/>
+              <a:t> distance, S2 and S3 distances for the adjusted data with nearest base stations added to the ‘</a:t>
+            </a:r>
+            <a:r>
+              <a:rPr lang="en-US" sz="2400" dirty="0" err="1" smtClean="0"/>
+              <a:t>msisdn’s</a:t>
+            </a:r>
+            <a:r>
+              <a:rPr lang="en-US" sz="2400" dirty="0" smtClean="0"/>
+              <a:t>’ witch have less or equal than three unique points</a:t>
+            </a:r>
+          </a:p>
+          <a:p>
+            <a:pPr marL="0" indent="0">
+              <a:buNone/>
+            </a:pPr>
+            <a:endParaRPr lang="ru-RU" dirty="0"/>
+          </a:p>
+        </p:txBody>
+      </p:sp>
+    </p:spTree>
+    <p:extLst>
+      <p:ext uri="{BB962C8B-B14F-4D97-AF65-F5344CB8AC3E}">
+        <p14:creationId xmlns:p14="http://schemas.microsoft.com/office/powerpoint/2010/main" val="2118829511"/>
+      </p:ext>
+    </p:extLst>
+  </p:cSld>
+  <p:clrMapOvr>
+    <a:masterClrMapping/>
+  </p:clrMapOvr>
+  <p:timing>
+    <p:tnLst>
+      <p:par>
+        <p:cTn id="1" dur="indefinite" restart="never" nodeType="tmRoot"/>
+      </p:par>
+    </p:tnLst>
+  </p:timing>
+</p:sld>
+</file>
+
 <file path=ppt/slides/slide14.xml><?xml version="1.0" encoding="utf-8"?>
 <p:sld xmlns:a="http://schemas.openxmlformats.org/drawingml/2006/main" xmlns:r="http://schemas.openxmlformats.org/officeDocument/2006/relationships" xmlns:p="http://schemas.openxmlformats.org/presentationml/2006/main">
   <p:cSld>
@@ -4139,62 +4829,104 @@
           <a:bodyPr/>
           <a:lstStyle/>
           <a:p>
+            <a:r>
+              <a:rPr lang="en-US" dirty="0" smtClean="0"/>
+              <a:t>Testing the Model </a:t>
+            </a:r>
             <a:endParaRPr lang="ru-RU" dirty="0"/>
           </a:p>
         </p:txBody>
       </p:sp>
-      <p:pic>
-        <p:nvPicPr>
-          <p:cNvPr id="5" name="Picture 4"/>
-          <p:cNvPicPr>
-            <a:picLocks noChangeAspect="1"/>
-          </p:cNvPicPr>
-          <p:nvPr/>
-        </p:nvPicPr>
-        <p:blipFill>
-          <a:blip r:embed="rId2"/>
-          <a:stretch>
-            <a:fillRect/>
-          </a:stretch>
-        </p:blipFill>
-        <p:spPr>
-          <a:xfrm>
-            <a:off x="643387" y="1889022"/>
-            <a:ext cx="5332550" cy="4046603"/>
-          </a:xfrm>
-          <a:prstGeom prst="rect">
-            <a:avLst/>
-          </a:prstGeom>
-        </p:spPr>
-      </p:pic>
-      <p:pic>
-        <p:nvPicPr>
-          <p:cNvPr id="6" name="Picture 5"/>
-          <p:cNvPicPr>
-            <a:picLocks noChangeAspect="1"/>
-          </p:cNvPicPr>
-          <p:nvPr/>
-        </p:nvPicPr>
-        <p:blipFill>
-          <a:blip r:embed="rId3"/>
-          <a:stretch>
-            <a:fillRect/>
-          </a:stretch>
-        </p:blipFill>
-        <p:spPr>
-          <a:xfrm>
-            <a:off x="6229937" y="2007708"/>
-            <a:ext cx="5178018" cy="3890697"/>
-          </a:xfrm>
-          <a:prstGeom prst="rect">
-            <a:avLst/>
-          </a:prstGeom>
-        </p:spPr>
-      </p:pic>
+      <p:sp>
+        <p:nvSpPr>
+          <p:cNvPr id="3" name="Content Placeholder 2"/>
+          <p:cNvSpPr>
+            <a:spLocks noGrp="1"/>
+          </p:cNvSpPr>
+          <p:nvPr>
+            <p:ph idx="1"/>
+          </p:nvPr>
+        </p:nvSpPr>
+        <p:spPr/>
+        <p:txBody>
+          <a:bodyPr/>
+          <a:lstStyle/>
+          <a:p>
+            <a:pPr>
+              <a:spcBef>
+                <a:spcPts val="1200"/>
+              </a:spcBef>
+            </a:pPr>
+            <a:r>
+              <a:rPr lang="en-US" dirty="0" smtClean="0"/>
+              <a:t>The classifier was build with the </a:t>
+            </a:r>
+            <a:r>
+              <a:rPr lang="en-US" dirty="0" err="1" smtClean="0"/>
+              <a:t>RandomForest</a:t>
+            </a:r>
+            <a:r>
+              <a:rPr lang="en-US" dirty="0" smtClean="0"/>
+              <a:t> model</a:t>
+            </a:r>
+          </a:p>
+          <a:p>
+            <a:pPr>
+              <a:spcBef>
+                <a:spcPts val="1200"/>
+              </a:spcBef>
+            </a:pPr>
+            <a:r>
+              <a:rPr lang="en-US" dirty="0" smtClean="0"/>
+              <a:t>Model was tested using 5-folds stratified cross validation</a:t>
+            </a:r>
+          </a:p>
+          <a:p>
+            <a:pPr>
+              <a:spcBef>
+                <a:spcPts val="1200"/>
+              </a:spcBef>
+            </a:pPr>
+            <a:r>
+              <a:rPr lang="en-US" dirty="0" smtClean="0"/>
+              <a:t>Features selection was made using </a:t>
+            </a:r>
+            <a:r>
+              <a:rPr lang="en-US" dirty="0" err="1" smtClean="0"/>
+              <a:t>RandomForest</a:t>
+            </a:r>
+            <a:r>
+              <a:rPr lang="en-US" dirty="0" smtClean="0"/>
+              <a:t> classifier</a:t>
+            </a:r>
+          </a:p>
+          <a:p>
+            <a:r>
+              <a:rPr lang="en-US" dirty="0" smtClean="0"/>
+              <a:t>Two parameters were tuned in the model: maximum number of trees and trees </a:t>
+            </a:r>
+            <a:r>
+              <a:rPr lang="en-US" dirty="0" err="1" smtClean="0"/>
+              <a:t>max_depth</a:t>
+            </a:r>
+            <a:endParaRPr lang="en-US" dirty="0" smtClean="0"/>
+          </a:p>
+          <a:p>
+            <a:endParaRPr lang="en-US" dirty="0" smtClean="0"/>
+          </a:p>
+          <a:p>
+            <a:r>
+              <a:rPr lang="en-US" dirty="0" smtClean="0"/>
+              <a:t>Features were build and model was trained on the AWS ‘c3.8xlarge’ instance </a:t>
+            </a:r>
+            <a:endParaRPr lang="ru-RU" dirty="0"/>
+          </a:p>
+        </p:txBody>
+      </p:sp>
     </p:spTree>
     <p:extLst>
       <p:ext uri="{BB962C8B-B14F-4D97-AF65-F5344CB8AC3E}">
-        <p14:creationId xmlns:p14="http://schemas.microsoft.com/office/powerpoint/2010/main" val="4161222387"/>
+        <p14:creationId xmlns:p14="http://schemas.microsoft.com/office/powerpoint/2010/main" val="2502075066"/>
       </p:ext>
     </p:extLst>
   </p:cSld>
@@ -4223,20 +4955,32 @@
       </p:grpSpPr>
       <p:sp>
         <p:nvSpPr>
-          <p:cNvPr id="2" name="Title 1"/>
-          <p:cNvSpPr>
-            <a:spLocks noGrp="1"/>
-          </p:cNvSpPr>
-          <p:nvPr>
-            <p:ph type="title"/>
-          </p:nvPr>
-        </p:nvSpPr>
-        <p:spPr/>
+          <p:cNvPr id="3" name="Content Placeholder 2"/>
+          <p:cNvSpPr>
+            <a:spLocks noGrp="1"/>
+          </p:cNvSpPr>
+          <p:nvPr>
+            <p:ph idx="1"/>
+          </p:nvPr>
+        </p:nvSpPr>
+        <p:spPr>
+          <a:xfrm>
+            <a:off x="933275" y="4693444"/>
+            <a:ext cx="3971925" cy="784225"/>
+          </a:xfrm>
+        </p:spPr>
         <p:txBody>
           <a:bodyPr/>
           <a:lstStyle/>
           <a:p>
-            <a:endParaRPr lang="en-US"/>
+            <a:pPr marL="0" indent="0">
+              <a:buNone/>
+            </a:pPr>
+            <a:r>
+              <a:rPr lang="en-US" dirty="0" smtClean="0"/>
+              <a:t>Thank You!</a:t>
+            </a:r>
+            <a:endParaRPr lang="ru-RU" dirty="0"/>
           </a:p>
         </p:txBody>
       </p:sp>
@@ -4256,8 +5000,8 @@
         </p:blipFill>
         <p:spPr>
           <a:xfrm>
-            <a:off x="1134217" y="1967263"/>
-            <a:ext cx="6345232" cy="4350410"/>
+            <a:off x="5114750" y="1489075"/>
+            <a:ext cx="6779992" cy="4587875"/>
           </a:xfrm>
           <a:prstGeom prst="rect">
             <a:avLst/>
@@ -4267,215 +5011,20 @@
     </p:spTree>
     <p:extLst>
       <p:ext uri="{BB962C8B-B14F-4D97-AF65-F5344CB8AC3E}">
-        <p14:creationId xmlns:p14="http://schemas.microsoft.com/office/powerpoint/2010/main" val="2927743467"/>
+        <p14:creationId xmlns:p14="http://schemas.microsoft.com/office/powerpoint/2010/main" val="667757522"/>
       </p:ext>
     </p:extLst>
   </p:cSld>
   <p:clrMapOvr>
     <a:masterClrMapping/>
   </p:clrMapOvr>
-</p:sld>
-</file>
-
-<file path=ppt/slides/slide16.xml><?xml version="1.0" encoding="utf-8"?>
-<p:sld xmlns:a="http://schemas.openxmlformats.org/drawingml/2006/main" xmlns:r="http://schemas.openxmlformats.org/officeDocument/2006/relationships" xmlns:p="http://schemas.openxmlformats.org/presentationml/2006/main">
-  <p:cSld>
-    <p:spTree>
-      <p:nvGrpSpPr>
-        <p:cNvPr id="1" name=""/>
-        <p:cNvGrpSpPr/>
-        <p:nvPr/>
-      </p:nvGrpSpPr>
-      <p:grpSpPr>
-        <a:xfrm>
-          <a:off x="0" y="0"/>
-          <a:ext cx="0" cy="0"/>
-          <a:chOff x="0" y="0"/>
-          <a:chExt cx="0" cy="0"/>
-        </a:xfrm>
-      </p:grpSpPr>
-      <p:sp>
-        <p:nvSpPr>
-          <p:cNvPr id="2" name="Title 1"/>
-          <p:cNvSpPr>
-            <a:spLocks noGrp="1"/>
-          </p:cNvSpPr>
-          <p:nvPr>
-            <p:ph type="title"/>
-          </p:nvPr>
-        </p:nvSpPr>
-        <p:spPr/>
-        <p:txBody>
-          <a:bodyPr/>
-          <a:lstStyle/>
-          <a:p>
-            <a:r>
-              <a:rPr lang="en-US" dirty="0" smtClean="0"/>
-              <a:t>Registered users in each cellular tower</a:t>
-            </a:r>
-            <a:endParaRPr lang="en-US" dirty="0"/>
-          </a:p>
-        </p:txBody>
-      </p:sp>
-      <p:pic>
-        <p:nvPicPr>
-          <p:cNvPr id="4" name="Picture 3"/>
-          <p:cNvPicPr>
-            <a:picLocks noChangeAspect="1"/>
-          </p:cNvPicPr>
-          <p:nvPr/>
-        </p:nvPicPr>
-        <p:blipFill>
-          <a:blip r:embed="rId2"/>
-          <a:stretch>
-            <a:fillRect/>
-          </a:stretch>
-        </p:blipFill>
-        <p:spPr>
-          <a:xfrm>
-            <a:off x="446315" y="2046948"/>
-            <a:ext cx="5301416" cy="3836661"/>
-          </a:xfrm>
-          <a:prstGeom prst="rect">
-            <a:avLst/>
-          </a:prstGeom>
-        </p:spPr>
-      </p:pic>
-      <p:pic>
-        <p:nvPicPr>
-          <p:cNvPr id="5" name="Picture 4"/>
-          <p:cNvPicPr>
-            <a:picLocks noChangeAspect="1"/>
-          </p:cNvPicPr>
-          <p:nvPr/>
-        </p:nvPicPr>
-        <p:blipFill>
-          <a:blip r:embed="rId3"/>
-          <a:stretch>
-            <a:fillRect/>
-          </a:stretch>
-        </p:blipFill>
-        <p:spPr>
-          <a:xfrm>
-            <a:off x="6335203" y="2046948"/>
-            <a:ext cx="5056917" cy="3836661"/>
-          </a:xfrm>
-          <a:prstGeom prst="rect">
-            <a:avLst/>
-          </a:prstGeom>
-        </p:spPr>
-      </p:pic>
-    </p:spTree>
-    <p:extLst>
-      <p:ext uri="{BB962C8B-B14F-4D97-AF65-F5344CB8AC3E}">
-        <p14:creationId xmlns:p14="http://schemas.microsoft.com/office/powerpoint/2010/main" val="2952965859"/>
-      </p:ext>
-    </p:extLst>
-  </p:cSld>
-  <p:clrMapOvr>
-    <a:masterClrMapping/>
-  </p:clrMapOvr>
-</p:sld>
-</file>
-
-<file path=ppt/slides/slide17.xml><?xml version="1.0" encoding="utf-8"?>
-<p:sld xmlns:a="http://schemas.openxmlformats.org/drawingml/2006/main" xmlns:r="http://schemas.openxmlformats.org/officeDocument/2006/relationships" xmlns:p="http://schemas.openxmlformats.org/presentationml/2006/main">
-  <p:cSld>
-    <p:spTree>
-      <p:nvGrpSpPr>
-        <p:cNvPr id="1" name=""/>
-        <p:cNvGrpSpPr/>
-        <p:nvPr/>
-      </p:nvGrpSpPr>
-      <p:grpSpPr>
-        <a:xfrm>
-          <a:off x="0" y="0"/>
-          <a:ext cx="0" cy="0"/>
-          <a:chOff x="0" y="0"/>
-          <a:chExt cx="0" cy="0"/>
-        </a:xfrm>
-      </p:grpSpPr>
-      <p:sp>
-        <p:nvSpPr>
-          <p:cNvPr id="2" name="Title 1"/>
-          <p:cNvSpPr>
-            <a:spLocks noGrp="1"/>
-          </p:cNvSpPr>
-          <p:nvPr>
-            <p:ph type="title"/>
-          </p:nvPr>
-        </p:nvSpPr>
-        <p:spPr/>
-        <p:txBody>
-          <a:bodyPr/>
-          <a:lstStyle/>
-          <a:p>
-            <a:r>
-              <a:rPr lang="ru-RU" dirty="0" smtClean="0"/>
-              <a:t>Как выглядят некоторые пары в тестовых данных</a:t>
-            </a:r>
-            <a:endParaRPr lang="en-US" dirty="0"/>
-          </a:p>
-        </p:txBody>
-      </p:sp>
-      <p:pic>
-        <p:nvPicPr>
-          <p:cNvPr id="4" name="Picture 3"/>
-          <p:cNvPicPr>
-            <a:picLocks noChangeAspect="1"/>
-          </p:cNvPicPr>
-          <p:nvPr/>
-        </p:nvPicPr>
-        <p:blipFill>
-          <a:blip r:embed="rId2"/>
-          <a:stretch>
-            <a:fillRect/>
-          </a:stretch>
-        </p:blipFill>
-        <p:spPr>
-          <a:xfrm>
-            <a:off x="699716" y="1772444"/>
-            <a:ext cx="5591175" cy="4457700"/>
-          </a:xfrm>
-          <a:prstGeom prst="rect">
-            <a:avLst/>
-          </a:prstGeom>
-        </p:spPr>
-      </p:pic>
-      <p:pic>
-        <p:nvPicPr>
-          <p:cNvPr id="5" name="Picture 4"/>
-          <p:cNvPicPr>
-            <a:picLocks noChangeAspect="1"/>
-          </p:cNvPicPr>
-          <p:nvPr/>
-        </p:nvPicPr>
-        <p:blipFill>
-          <a:blip r:embed="rId3"/>
-          <a:stretch>
-            <a:fillRect/>
-          </a:stretch>
-        </p:blipFill>
-        <p:spPr>
-          <a:xfrm>
-            <a:off x="6385894" y="1690688"/>
-            <a:ext cx="5572125" cy="4486275"/>
-          </a:xfrm>
-          <a:prstGeom prst="rect">
-            <a:avLst/>
-          </a:prstGeom>
-        </p:spPr>
-      </p:pic>
-    </p:spTree>
-    <p:extLst>
-      <p:ext uri="{BB962C8B-B14F-4D97-AF65-F5344CB8AC3E}">
-        <p14:creationId xmlns:p14="http://schemas.microsoft.com/office/powerpoint/2010/main" val="4081527403"/>
-      </p:ext>
-    </p:extLst>
-  </p:cSld>
-  <p:clrMapOvr>
-    <a:masterClrMapping/>
-  </p:clrMapOvr>
+  <p:timing>
+    <p:tnLst>
+      <p:par>
+        <p:cTn id="1" dur="indefinite" restart="never" nodeType="tmRoot"/>
+      </p:par>
+    </p:tnLst>
+  </p:timing>
 </p:sld>
 </file>
 
@@ -4496,25 +5045,6 @@
           <a:chExt cx="0" cy="0"/>
         </a:xfrm>
       </p:grpSpPr>
-      <p:sp>
-        <p:nvSpPr>
-          <p:cNvPr id="2" name="Title 1"/>
-          <p:cNvSpPr>
-            <a:spLocks noGrp="1"/>
-          </p:cNvSpPr>
-          <p:nvPr>
-            <p:ph type="title"/>
-          </p:nvPr>
-        </p:nvSpPr>
-        <p:spPr/>
-        <p:txBody>
-          <a:bodyPr/>
-          <a:lstStyle/>
-          <a:p>
-            <a:endParaRPr lang="en-US"/>
-          </a:p>
-        </p:txBody>
-      </p:sp>
       <p:pic>
         <p:nvPicPr>
           <p:cNvPr id="4" name="Content Placeholder 3"/>
@@ -4539,11 +5069,221 @@
         </p:blipFill>
         <p:spPr>
           <a:xfrm>
-            <a:off x="2334758" y="1833192"/>
-            <a:ext cx="6609978" cy="4626985"/>
+            <a:off x="5848349" y="1976437"/>
+            <a:ext cx="6252481" cy="4376737"/>
           </a:xfrm>
         </p:spPr>
       </p:pic>
+      <p:sp>
+        <p:nvSpPr>
+          <p:cNvPr id="7" name="TextBox 6"/>
+          <p:cNvSpPr txBox="1"/>
+          <p:nvPr/>
+        </p:nvSpPr>
+        <p:spPr>
+          <a:xfrm>
+            <a:off x="571500" y="2085975"/>
+            <a:ext cx="5019675" cy="4555093"/>
+          </a:xfrm>
+          <a:prstGeom prst="rect">
+            <a:avLst/>
+          </a:prstGeom>
+          <a:noFill/>
+        </p:spPr>
+        <p:txBody>
+          <a:bodyPr wrap="square" rtlCol="0">
+            <a:spAutoFit/>
+          </a:bodyPr>
+          <a:lstStyle/>
+          <a:p>
+            <a:r>
+              <a:rPr lang="en-US" sz="1600" dirty="0" smtClean="0">
+                <a:solidFill>
+                  <a:srgbClr val="92D050"/>
+                </a:solidFill>
+              </a:rPr>
+              <a:t>Task</a:t>
+            </a:r>
+            <a:endParaRPr lang="en-US" sz="1600" dirty="0" smtClean="0"/>
+          </a:p>
+          <a:p>
+            <a:r>
+              <a:rPr lang="en-US" sz="1600" dirty="0" smtClean="0"/>
+              <a:t>Objective of this research was to build a classifier which would analyze data gathered from base stations around Moscow and would identify all ‘</a:t>
+            </a:r>
+            <a:r>
+              <a:rPr lang="en-US" sz="1600" dirty="0" err="1" smtClean="0"/>
+              <a:t>msisdns</a:t>
+            </a:r>
+            <a:r>
+              <a:rPr lang="en-US" sz="1600" dirty="0" smtClean="0"/>
+              <a:t>’ that belongs to a particular user with the high probability. As the result we need to build a database with user id and all </a:t>
+            </a:r>
+            <a:r>
+              <a:rPr lang="en-US" sz="1600" dirty="0" err="1" smtClean="0"/>
+              <a:t>msisdns</a:t>
+            </a:r>
+            <a:r>
+              <a:rPr lang="en-US" sz="1600" dirty="0" smtClean="0"/>
+              <a:t> that belong to this user</a:t>
+            </a:r>
+          </a:p>
+          <a:p>
+            <a:endParaRPr lang="en-US" sz="1600" dirty="0"/>
+          </a:p>
+          <a:p>
+            <a:r>
+              <a:rPr lang="en-US" sz="1600" dirty="0" smtClean="0">
+                <a:solidFill>
+                  <a:srgbClr val="92D050"/>
+                </a:solidFill>
+              </a:rPr>
+              <a:t>Input data: </a:t>
+            </a:r>
+          </a:p>
+          <a:p>
+            <a:pPr marL="285750" indent="-285750">
+              <a:buFontTx/>
+              <a:buChar char="-"/>
+            </a:pPr>
+            <a:r>
+              <a:rPr lang="en-US" sz="1600" dirty="0" smtClean="0"/>
+              <a:t>Sample of the matching ‘</a:t>
+            </a:r>
+            <a:r>
+              <a:rPr lang="en-US" sz="1600" dirty="0" err="1" smtClean="0"/>
+              <a:t>msisdns</a:t>
+            </a:r>
+            <a:r>
+              <a:rPr lang="en-US" sz="1600" dirty="0" smtClean="0"/>
+              <a:t>’ that belong to a particular users – train data</a:t>
+            </a:r>
+          </a:p>
+          <a:p>
+            <a:pPr marL="285750" indent="-285750">
+              <a:buFontTx/>
+              <a:buChar char="-"/>
+            </a:pPr>
+            <a:r>
+              <a:rPr lang="en-US" sz="1600" dirty="0" smtClean="0"/>
+              <a:t>Database with the ‘</a:t>
+            </a:r>
+            <a:r>
+              <a:rPr lang="en-US" sz="1600" dirty="0" err="1" smtClean="0"/>
+              <a:t>msisdns</a:t>
+            </a:r>
+            <a:r>
+              <a:rPr lang="en-US" sz="1600" dirty="0" smtClean="0"/>
+              <a:t>’ and time of the user registration on the base station</a:t>
+            </a:r>
+          </a:p>
+          <a:p>
+            <a:pPr marL="285750" indent="-285750">
+              <a:buFontTx/>
+              <a:buChar char="-"/>
+            </a:pPr>
+            <a:r>
+              <a:rPr lang="en-US" sz="1600" dirty="0" smtClean="0"/>
+              <a:t>“</a:t>
+            </a:r>
+            <a:r>
+              <a:rPr lang="en-US" sz="1600" dirty="0" err="1" smtClean="0"/>
+              <a:t>imei</a:t>
+            </a:r>
+            <a:r>
+              <a:rPr lang="en-US" sz="1600" dirty="0" smtClean="0"/>
+              <a:t> – phone type” matching table</a:t>
+            </a:r>
+          </a:p>
+          <a:p>
+            <a:pPr marL="285750" indent="-285750">
+              <a:buFontTx/>
+              <a:buChar char="-"/>
+            </a:pPr>
+            <a:r>
+              <a:rPr lang="en-US" sz="1600" dirty="0" smtClean="0"/>
+              <a:t>Dictionary for ever base station “event type” field</a:t>
+            </a:r>
+          </a:p>
+          <a:p>
+            <a:endParaRPr lang="en-US" sz="1600" dirty="0"/>
+          </a:p>
+          <a:p>
+            <a:r>
+              <a:rPr lang="en-US" sz="1600" dirty="0" smtClean="0"/>
+              <a:t>Sample data provided for 23</a:t>
+            </a:r>
+            <a:r>
+              <a:rPr lang="en-US" sz="1600" baseline="30000" dirty="0" smtClean="0"/>
+              <a:t>rd</a:t>
+            </a:r>
+            <a:r>
+              <a:rPr lang="en-US" sz="1600" dirty="0" smtClean="0"/>
+              <a:t> – 25</a:t>
+            </a:r>
+            <a:r>
+              <a:rPr lang="en-US" sz="1600" baseline="30000" dirty="0" smtClean="0"/>
+              <a:t>th</a:t>
+            </a:r>
+            <a:r>
+              <a:rPr lang="en-US" sz="1600" dirty="0" smtClean="0"/>
+              <a:t> of May 2013</a:t>
+            </a:r>
+          </a:p>
+          <a:p>
+            <a:endParaRPr lang="ru-RU" dirty="0"/>
+          </a:p>
+        </p:txBody>
+      </p:sp>
+      <p:sp>
+        <p:nvSpPr>
+          <p:cNvPr id="8" name="Title 1"/>
+          <p:cNvSpPr txBox="1">
+            <a:spLocks/>
+          </p:cNvSpPr>
+          <p:nvPr/>
+        </p:nvSpPr>
+        <p:spPr>
+          <a:xfrm>
+            <a:off x="838200" y="365125"/>
+            <a:ext cx="10515600" cy="1325563"/>
+          </a:xfrm>
+          <a:prstGeom prst="rect">
+            <a:avLst/>
+          </a:prstGeom>
+        </p:spPr>
+        <p:txBody>
+          <a:bodyPr vert="horz" lIns="91440" tIns="45720" rIns="91440" bIns="45720" rtlCol="0" anchor="ctr">
+            <a:normAutofit/>
+          </a:bodyPr>
+          <a:lstStyle>
+            <a:lvl1pPr algn="l" defTabSz="914400" rtl="0" eaLnBrk="1" latinLnBrk="0" hangingPunct="1">
+              <a:lnSpc>
+                <a:spcPct val="90000"/>
+              </a:lnSpc>
+              <a:spcBef>
+                <a:spcPct val="0"/>
+              </a:spcBef>
+              <a:buNone/>
+              <a:defRPr sz="4400" kern="1200">
+                <a:solidFill>
+                  <a:schemeClr val="tx1"/>
+                </a:solidFill>
+                <a:latin typeface="+mj-lt"/>
+                <a:ea typeface="+mj-ea"/>
+                <a:cs typeface="+mj-cs"/>
+              </a:defRPr>
+            </a:lvl1pPr>
+          </a:lstStyle>
+          <a:p>
+            <a:r>
+              <a:rPr lang="en-US" dirty="0"/>
+              <a:t>Research objectives and input data</a:t>
+            </a:r>
+            <a:endParaRPr lang="ru-RU" dirty="0" smtClean="0"/>
+          </a:p>
+        </p:txBody>
+      </p:sp>
     </p:spTree>
     <p:extLst>
       <p:ext uri="{BB962C8B-B14F-4D97-AF65-F5344CB8AC3E}">
@@ -4554,6 +5294,13 @@
   <p:clrMapOvr>
     <a:masterClrMapping/>
   </p:clrMapOvr>
+  <p:timing>
+    <p:tnLst>
+      <p:par>
+        <p:cTn id="1" dur="indefinite" restart="never" nodeType="tmRoot"/>
+      </p:par>
+    </p:tnLst>
+  </p:timing>
 </p:sld>
 </file>
 
@@ -4589,13 +5336,239 @@
           <a:bodyPr/>
           <a:lstStyle/>
           <a:p>
-            <a:endParaRPr lang="en-US"/>
+            <a:r>
+              <a:rPr lang="en-US" dirty="0" smtClean="0"/>
+              <a:t>Base station registration data</a:t>
+            </a:r>
+            <a:endParaRPr lang="ru-RU" dirty="0"/>
+          </a:p>
+        </p:txBody>
+      </p:sp>
+      <p:sp>
+        <p:nvSpPr>
+          <p:cNvPr id="3" name="Content Placeholder 2"/>
+          <p:cNvSpPr>
+            <a:spLocks noGrp="1"/>
+          </p:cNvSpPr>
+          <p:nvPr>
+            <p:ph idx="1"/>
+          </p:nvPr>
+        </p:nvSpPr>
+        <p:spPr>
+          <a:xfrm>
+            <a:off x="838200" y="1825625"/>
+            <a:ext cx="4391025" cy="4351338"/>
+          </a:xfrm>
+        </p:spPr>
+        <p:txBody>
+          <a:bodyPr>
+            <a:normAutofit/>
+          </a:bodyPr>
+          <a:lstStyle/>
+          <a:p>
+            <a:pPr marL="0" indent="0">
+              <a:spcBef>
+                <a:spcPts val="0"/>
+              </a:spcBef>
+              <a:buNone/>
+            </a:pPr>
+            <a:r>
+              <a:rPr lang="en-US" sz="1800" dirty="0" smtClean="0"/>
+              <a:t>Data consist of the following fields:</a:t>
+            </a:r>
+          </a:p>
+          <a:p>
+            <a:pPr marL="0" indent="0">
+              <a:spcBef>
+                <a:spcPts val="0"/>
+              </a:spcBef>
+              <a:buNone/>
+            </a:pPr>
+            <a:endParaRPr lang="en-US" sz="1800" dirty="0" smtClean="0"/>
+          </a:p>
+          <a:p>
+            <a:pPr marL="0" indent="0">
+              <a:spcBef>
+                <a:spcPts val="0"/>
+              </a:spcBef>
+              <a:buNone/>
+            </a:pPr>
+            <a:r>
+              <a:rPr lang="en-US" sz="1800" dirty="0" smtClean="0"/>
+              <a:t>- Lac </a:t>
+            </a:r>
+            <a:r>
+              <a:rPr lang="en-US" sz="1800" dirty="0" smtClean="0"/>
+              <a:t>and </a:t>
+            </a:r>
+            <a:r>
+              <a:rPr lang="en-US" sz="1800" dirty="0" err="1" smtClean="0"/>
+              <a:t>cid</a:t>
+            </a:r>
+            <a:r>
+              <a:rPr lang="en-US" sz="1800" dirty="0" smtClean="0"/>
+              <a:t> are base station </a:t>
+            </a:r>
+            <a:r>
+              <a:rPr lang="en-US" sz="1800" dirty="0" err="1" smtClean="0"/>
+              <a:t>group_id</a:t>
+            </a:r>
+            <a:r>
+              <a:rPr lang="en-US" sz="1800" dirty="0" smtClean="0"/>
+              <a:t> and </a:t>
+            </a:r>
+            <a:r>
+              <a:rPr lang="en-US" sz="1800" dirty="0" err="1" smtClean="0"/>
+              <a:t>unit_id</a:t>
+            </a:r>
+            <a:r>
+              <a:rPr lang="en-US" sz="1800" dirty="0" smtClean="0"/>
+              <a:t> correspondingly</a:t>
+            </a:r>
+            <a:endParaRPr lang="en-US" sz="1800" dirty="0" smtClean="0"/>
+          </a:p>
+          <a:p>
+            <a:pPr>
+              <a:spcBef>
+                <a:spcPts val="0"/>
+              </a:spcBef>
+              <a:buFontTx/>
+              <a:buChar char="-"/>
+            </a:pPr>
+            <a:r>
+              <a:rPr lang="en-US" sz="1800" dirty="0" err="1" smtClean="0"/>
+              <a:t>msisdn</a:t>
+            </a:r>
+            <a:r>
+              <a:rPr lang="en-US" sz="1800" dirty="0" smtClean="0"/>
+              <a:t> – unique identifier of a user</a:t>
+            </a:r>
+          </a:p>
+          <a:p>
+            <a:pPr>
+              <a:spcBef>
+                <a:spcPts val="0"/>
+              </a:spcBef>
+              <a:buFontTx/>
+              <a:buChar char="-"/>
+            </a:pPr>
+            <a:r>
+              <a:rPr lang="en-US" sz="1800" dirty="0" err="1" smtClean="0"/>
+              <a:t>Imei</a:t>
+            </a:r>
+            <a:r>
+              <a:rPr lang="en-US" sz="1800" dirty="0" smtClean="0"/>
+              <a:t> – identifier of the phone</a:t>
+            </a:r>
+          </a:p>
+          <a:p>
+            <a:pPr>
+              <a:spcBef>
+                <a:spcPts val="0"/>
+              </a:spcBef>
+              <a:buFontTx/>
+              <a:buChar char="-"/>
+            </a:pPr>
+            <a:r>
+              <a:rPr lang="en-US" sz="1800" dirty="0" err="1" smtClean="0"/>
+              <a:t>Event_type</a:t>
+            </a:r>
+            <a:r>
+              <a:rPr lang="en-US" sz="1800" dirty="0" smtClean="0"/>
+              <a:t> – type of the signal registered on the base station</a:t>
+            </a:r>
+          </a:p>
+          <a:p>
+            <a:pPr>
+              <a:spcBef>
+                <a:spcPts val="0"/>
+              </a:spcBef>
+              <a:buFontTx/>
+              <a:buChar char="-"/>
+            </a:pPr>
+            <a:r>
+              <a:rPr lang="en-US" sz="1800" dirty="0" err="1" smtClean="0"/>
+              <a:t>Tstamp</a:t>
+            </a:r>
+            <a:r>
+              <a:rPr lang="en-US" sz="1800" dirty="0" smtClean="0"/>
+              <a:t> – time of the registered event</a:t>
+            </a:r>
+          </a:p>
+          <a:p>
+            <a:pPr>
+              <a:spcBef>
+                <a:spcPts val="0"/>
+              </a:spcBef>
+              <a:buFontTx/>
+              <a:buChar char="-"/>
+            </a:pPr>
+            <a:r>
+              <a:rPr lang="en-US" sz="1800" dirty="0" smtClean="0"/>
+              <a:t>Long/</a:t>
+            </a:r>
+            <a:r>
+              <a:rPr lang="en-US" sz="1800" dirty="0" err="1" smtClean="0"/>
+              <a:t>lat</a:t>
+            </a:r>
+            <a:r>
+              <a:rPr lang="en-US" sz="1800" dirty="0" smtClean="0"/>
+              <a:t>/ </a:t>
+            </a:r>
+            <a:r>
+              <a:rPr lang="en-US" sz="1800" dirty="0" err="1" smtClean="0"/>
+              <a:t>max_dist</a:t>
+            </a:r>
+            <a:r>
+              <a:rPr lang="en-US" sz="1800" dirty="0" smtClean="0"/>
+              <a:t>/</a:t>
+            </a:r>
+            <a:r>
+              <a:rPr lang="en-US" sz="1800" dirty="0" err="1" smtClean="0"/>
+              <a:t>start_angle</a:t>
+            </a:r>
+            <a:r>
+              <a:rPr lang="en-US" sz="1800" dirty="0" smtClean="0"/>
+              <a:t>/</a:t>
+            </a:r>
+            <a:r>
+              <a:rPr lang="en-US" sz="1800" dirty="0" err="1" smtClean="0"/>
+              <a:t>end_angle</a:t>
+            </a:r>
+            <a:r>
+              <a:rPr lang="en-US" sz="1800" dirty="0" smtClean="0"/>
+              <a:t> parameters of the base station and its coverage area</a:t>
+            </a:r>
+          </a:p>
+          <a:p>
+            <a:pPr>
+              <a:spcBef>
+                <a:spcPts val="0"/>
+              </a:spcBef>
+              <a:buFontTx/>
+              <a:buChar char="-"/>
+            </a:pPr>
+            <a:r>
+              <a:rPr lang="en-US" sz="1800" dirty="0" err="1" smtClean="0"/>
+              <a:t>Cell_type</a:t>
+            </a:r>
+            <a:r>
+              <a:rPr lang="en-US" sz="1800" dirty="0" smtClean="0"/>
+              <a:t> – type of the base station</a:t>
+            </a:r>
+          </a:p>
+          <a:p>
+            <a:pPr>
+              <a:buFontTx/>
+              <a:buChar char="-"/>
+            </a:pPr>
+            <a:endParaRPr lang="ru-RU" sz="2000" dirty="0"/>
           </a:p>
         </p:txBody>
       </p:sp>
       <p:pic>
         <p:nvPicPr>
-          <p:cNvPr id="4" name="Picture 3"/>
+          <p:cNvPr id="6" name="Picture 5"/>
           <p:cNvPicPr>
             <a:picLocks noChangeAspect="1"/>
           </p:cNvPicPr>
@@ -4609,8 +5582,8 @@
         </p:blipFill>
         <p:spPr>
           <a:xfrm>
-            <a:off x="956025" y="1615714"/>
-            <a:ext cx="9438249" cy="4771159"/>
+            <a:off x="5527400" y="1825625"/>
+            <a:ext cx="6418201" cy="3690938"/>
           </a:xfrm>
           <a:prstGeom prst="rect">
             <a:avLst/>
@@ -4620,13 +5593,20 @@
     </p:spTree>
     <p:extLst>
       <p:ext uri="{BB962C8B-B14F-4D97-AF65-F5344CB8AC3E}">
-        <p14:creationId xmlns:p14="http://schemas.microsoft.com/office/powerpoint/2010/main" val="2116526745"/>
+        <p14:creationId xmlns:p14="http://schemas.microsoft.com/office/powerpoint/2010/main" val="3432207345"/>
       </p:ext>
     </p:extLst>
   </p:cSld>
   <p:clrMapOvr>
     <a:masterClrMapping/>
   </p:clrMapOvr>
+  <p:timing>
+    <p:tnLst>
+      <p:par>
+        <p:cTn id="1" dur="indefinite" restart="never" nodeType="tmRoot"/>
+      </p:par>
+    </p:tnLst>
+  </p:timing>
 </p:sld>
 </file>
 
@@ -4662,26 +5642,11 @@
           <a:bodyPr/>
           <a:lstStyle/>
           <a:p>
-            <a:endParaRPr lang="en-US"/>
-          </a:p>
-        </p:txBody>
-      </p:sp>
-      <p:sp>
-        <p:nvSpPr>
-          <p:cNvPr id="3" name="Content Placeholder 2"/>
-          <p:cNvSpPr>
-            <a:spLocks noGrp="1"/>
-          </p:cNvSpPr>
-          <p:nvPr>
-            <p:ph idx="1"/>
-          </p:nvPr>
-        </p:nvSpPr>
-        <p:spPr/>
-        <p:txBody>
-          <a:bodyPr/>
-          <a:lstStyle/>
-          <a:p>
-            <a:endParaRPr lang="en-US"/>
+            <a:r>
+              <a:rPr lang="en-US" dirty="0" smtClean="0"/>
+              <a:t>Visual analysis: phone distribution </a:t>
+            </a:r>
+            <a:endParaRPr lang="ru-RU" dirty="0"/>
           </a:p>
         </p:txBody>
       </p:sp>
@@ -4701,18 +5666,134 @@
         </p:blipFill>
         <p:spPr>
           <a:xfrm>
-            <a:off x="1530973" y="1690688"/>
-            <a:ext cx="8629667" cy="4351338"/>
+            <a:off x="727817" y="3259313"/>
+            <a:ext cx="4871146" cy="3339749"/>
           </a:xfrm>
           <a:prstGeom prst="rect">
             <a:avLst/>
           </a:prstGeom>
         </p:spPr>
       </p:pic>
+      <p:pic>
+        <p:nvPicPr>
+          <p:cNvPr id="5" name="Picture 4"/>
+          <p:cNvPicPr>
+            <a:picLocks noChangeAspect="1"/>
+          </p:cNvPicPr>
+          <p:nvPr/>
+        </p:nvPicPr>
+        <p:blipFill>
+          <a:blip r:embed="rId3"/>
+          <a:stretch>
+            <a:fillRect/>
+          </a:stretch>
+        </p:blipFill>
+        <p:spPr>
+          <a:xfrm>
+            <a:off x="5786288" y="3386313"/>
+            <a:ext cx="6241446" cy="3131285"/>
+          </a:xfrm>
+          <a:prstGeom prst="rect">
+            <a:avLst/>
+          </a:prstGeom>
+        </p:spPr>
+      </p:pic>
+      <p:sp>
+        <p:nvSpPr>
+          <p:cNvPr id="6" name="TextBox 5"/>
+          <p:cNvSpPr txBox="1"/>
+          <p:nvPr/>
+        </p:nvSpPr>
+        <p:spPr>
+          <a:xfrm>
+            <a:off x="838199" y="1422399"/>
+            <a:ext cx="10810876" cy="1754326"/>
+          </a:xfrm>
+          <a:prstGeom prst="rect">
+            <a:avLst/>
+          </a:prstGeom>
+          <a:noFill/>
+        </p:spPr>
+        <p:txBody>
+          <a:bodyPr wrap="square" rtlCol="0">
+            <a:spAutoFit/>
+          </a:bodyPr>
+          <a:lstStyle/>
+          <a:p>
+            <a:pPr marL="285750" indent="-285750">
+              <a:buFont typeface="Arial" panose="020B0604020202020204" pitchFamily="34" charset="0"/>
+              <a:buChar char="•"/>
+            </a:pPr>
+            <a:r>
+              <a:rPr lang="en-US" dirty="0" smtClean="0"/>
+              <a:t>Visual analyze shows that some of the data is generated by laptop’s and modems</a:t>
+            </a:r>
+          </a:p>
+          <a:p>
+            <a:pPr marL="285750" indent="-285750">
+              <a:buFont typeface="Arial" panose="020B0604020202020204" pitchFamily="34" charset="0"/>
+              <a:buChar char="•"/>
+            </a:pPr>
+            <a:r>
+              <a:rPr lang="en-US" dirty="0" smtClean="0"/>
+              <a:t>Data generated by laptops and </a:t>
+            </a:r>
+            <a:r>
+              <a:rPr lang="en-US" dirty="0" err="1" smtClean="0"/>
+              <a:t>usb</a:t>
+            </a:r>
+            <a:r>
+              <a:rPr lang="en-US" dirty="0" smtClean="0"/>
+              <a:t> modems usually have less data points vs phone data</a:t>
+            </a:r>
+          </a:p>
+          <a:p>
+            <a:pPr marL="285750" indent="-285750">
+              <a:buFont typeface="Arial" panose="020B0604020202020204" pitchFamily="34" charset="0"/>
+              <a:buChar char="•"/>
+            </a:pPr>
+            <a:r>
+              <a:rPr lang="en-US" dirty="0" smtClean="0"/>
+              <a:t>All phones are divided into two groups “Phone” and “Smartphone”, data analysis suggests that same device can be attributed to both groups (</a:t>
+            </a:r>
+            <a:r>
+              <a:rPr lang="en-US" dirty="0" err="1" smtClean="0"/>
+              <a:t>e.g</a:t>
+            </a:r>
+            <a:r>
+              <a:rPr lang="en-US" dirty="0" smtClean="0"/>
+              <a:t> “Apple – </a:t>
+            </a:r>
+            <a:r>
+              <a:rPr lang="en-US" dirty="0" err="1" smtClean="0"/>
+              <a:t>iOs</a:t>
+            </a:r>
+            <a:r>
+              <a:rPr lang="en-US" dirty="0" smtClean="0"/>
+              <a:t> – phone” or “Apple – </a:t>
+            </a:r>
+            <a:r>
+              <a:rPr lang="en-US" dirty="0" err="1" smtClean="0"/>
+              <a:t>iOs</a:t>
+            </a:r>
+            <a:r>
+              <a:rPr lang="en-US" dirty="0" smtClean="0"/>
+              <a:t> – Smartphone”); During modelling both groups will be merged together </a:t>
+            </a:r>
+          </a:p>
+          <a:p>
+            <a:pPr marL="285750" indent="-285750">
+              <a:buFont typeface="Arial" panose="020B0604020202020204" pitchFamily="34" charset="0"/>
+              <a:buChar char="•"/>
+            </a:pPr>
+            <a:endParaRPr lang="ru-RU" dirty="0"/>
+          </a:p>
+        </p:txBody>
+      </p:sp>
     </p:spTree>
     <p:extLst>
       <p:ext uri="{BB962C8B-B14F-4D97-AF65-F5344CB8AC3E}">
-        <p14:creationId xmlns:p14="http://schemas.microsoft.com/office/powerpoint/2010/main" val="3355218638"/>
+        <p14:creationId xmlns:p14="http://schemas.microsoft.com/office/powerpoint/2010/main" val="535990211"/>
       </p:ext>
     </p:extLst>
   </p:cSld>
@@ -4751,35 +5832,30 @@
         </p:nvSpPr>
         <p:spPr/>
         <p:txBody>
-          <a:bodyPr/>
-          <a:lstStyle/>
-          <a:p>
-            <a:endParaRPr lang="en-US"/>
-          </a:p>
-        </p:txBody>
-      </p:sp>
-      <p:sp>
-        <p:nvSpPr>
-          <p:cNvPr id="3" name="Content Placeholder 2"/>
-          <p:cNvSpPr>
-            <a:spLocks noGrp="1"/>
-          </p:cNvSpPr>
-          <p:nvPr>
-            <p:ph idx="1"/>
-          </p:nvPr>
-        </p:nvSpPr>
-        <p:spPr/>
-        <p:txBody>
-          <a:bodyPr/>
-          <a:lstStyle/>
-          <a:p>
-            <a:endParaRPr lang="en-US"/>
+          <a:bodyPr>
+            <a:normAutofit/>
+          </a:bodyPr>
+          <a:lstStyle/>
+          <a:p>
+            <a:r>
+              <a:rPr lang="en-US" sz="3600" dirty="0" smtClean="0"/>
+              <a:t>Visual analysis: number of unique </a:t>
+            </a:r>
+            <a:r>
+              <a:rPr lang="en-US" sz="3600" dirty="0" err="1" smtClean="0"/>
+              <a:t>msisdns</a:t>
+            </a:r>
+            <a:r>
+              <a:rPr lang="en-US" sz="3600" dirty="0" smtClean="0"/>
+              <a:t> for each base station</a:t>
+            </a:r>
+            <a:endParaRPr lang="en-US" sz="3600" dirty="0"/>
           </a:p>
         </p:txBody>
       </p:sp>
       <p:pic>
         <p:nvPicPr>
-          <p:cNvPr id="4" name="Picture 3"/>
+          <p:cNvPr id="6" name="Picture 5"/>
           <p:cNvPicPr>
             <a:picLocks noChangeAspect="1"/>
           </p:cNvPicPr>
@@ -4793,18 +5869,136 @@
         </p:blipFill>
         <p:spPr>
           <a:xfrm>
-            <a:off x="1155494" y="1430431"/>
-            <a:ext cx="9461046" cy="4746532"/>
+            <a:off x="446315" y="2935948"/>
+            <a:ext cx="5301416" cy="3836661"/>
           </a:xfrm>
           <a:prstGeom prst="rect">
             <a:avLst/>
           </a:prstGeom>
         </p:spPr>
       </p:pic>
+      <p:pic>
+        <p:nvPicPr>
+          <p:cNvPr id="7" name="Picture 6"/>
+          <p:cNvPicPr>
+            <a:picLocks noChangeAspect="1"/>
+          </p:cNvPicPr>
+          <p:nvPr/>
+        </p:nvPicPr>
+        <p:blipFill>
+          <a:blip r:embed="rId3"/>
+          <a:stretch>
+            <a:fillRect/>
+          </a:stretch>
+        </p:blipFill>
+        <p:spPr>
+          <a:xfrm>
+            <a:off x="6335203" y="2935948"/>
+            <a:ext cx="5056917" cy="3836661"/>
+          </a:xfrm>
+          <a:prstGeom prst="rect">
+            <a:avLst/>
+          </a:prstGeom>
+        </p:spPr>
+      </p:pic>
+      <p:sp>
+        <p:nvSpPr>
+          <p:cNvPr id="8" name="TextBox 7"/>
+          <p:cNvSpPr txBox="1"/>
+          <p:nvPr/>
+        </p:nvSpPr>
+        <p:spPr>
+          <a:xfrm>
+            <a:off x="838199" y="1549399"/>
+            <a:ext cx="10810876" cy="1477328"/>
+          </a:xfrm>
+          <a:prstGeom prst="rect">
+            <a:avLst/>
+          </a:prstGeom>
+          <a:noFill/>
+        </p:spPr>
+        <p:txBody>
+          <a:bodyPr wrap="square" rtlCol="0">
+            <a:spAutoFit/>
+          </a:bodyPr>
+          <a:lstStyle/>
+          <a:p>
+            <a:pPr marL="285750" indent="-285750">
+              <a:buFont typeface="Arial" panose="020B0604020202020204" pitchFamily="34" charset="0"/>
+              <a:buChar char="•"/>
+            </a:pPr>
+            <a:r>
+              <a:rPr lang="en-US" dirty="0" smtClean="0"/>
+              <a:t>Data provided for 18891 different base stations</a:t>
+            </a:r>
+          </a:p>
+          <a:p>
+            <a:pPr marL="285750" indent="-285750">
+              <a:buFont typeface="Arial" panose="020B0604020202020204" pitchFamily="34" charset="0"/>
+              <a:buChar char="•"/>
+            </a:pPr>
+            <a:r>
+              <a:rPr lang="en-US" dirty="0" smtClean="0"/>
+              <a:t>We will define base station usage as number of unique </a:t>
+            </a:r>
+            <a:r>
+              <a:rPr lang="en-US" dirty="0" err="1" smtClean="0"/>
+              <a:t>msidns</a:t>
+            </a:r>
+            <a:r>
+              <a:rPr lang="en-US" dirty="0" smtClean="0"/>
+              <a:t> registered in this base station</a:t>
+            </a:r>
+          </a:p>
+          <a:p>
+            <a:pPr marL="285750" indent="-285750">
+              <a:buFont typeface="Arial" panose="020B0604020202020204" pitchFamily="34" charset="0"/>
+              <a:buChar char="•"/>
+            </a:pPr>
+            <a:r>
+              <a:rPr lang="en-US" dirty="0" smtClean="0"/>
+              <a:t>Data suggests that most of the base stations were visited by less than five different ‘</a:t>
+            </a:r>
+            <a:r>
+              <a:rPr lang="en-US" dirty="0" err="1" smtClean="0"/>
+              <a:t>msisdns</a:t>
+            </a:r>
+            <a:r>
+              <a:rPr lang="en-US" dirty="0" smtClean="0"/>
+              <a:t>’</a:t>
+            </a:r>
+          </a:p>
+          <a:p>
+            <a:pPr marL="285750" indent="-285750">
+              <a:buFont typeface="Arial" panose="020B0604020202020204" pitchFamily="34" charset="0"/>
+              <a:buChar char="•"/>
+            </a:pPr>
+            <a:r>
+              <a:rPr lang="en-US" dirty="0" smtClean="0"/>
+              <a:t>About 40% of all base stations were visited only by one ‘</a:t>
+            </a:r>
+            <a:r>
+              <a:rPr lang="en-US" dirty="0" err="1" smtClean="0"/>
+              <a:t>msisdn</a:t>
+            </a:r>
+            <a:r>
+              <a:rPr lang="en-US" dirty="0" smtClean="0"/>
+              <a:t>’</a:t>
+            </a:r>
+          </a:p>
+          <a:p>
+            <a:pPr marL="285750" indent="-285750">
+              <a:buFont typeface="Arial" panose="020B0604020202020204" pitchFamily="34" charset="0"/>
+              <a:buChar char="•"/>
+            </a:pPr>
+            <a:endParaRPr lang="ru-RU" dirty="0"/>
+          </a:p>
+        </p:txBody>
+      </p:sp>
     </p:spTree>
     <p:extLst>
       <p:ext uri="{BB962C8B-B14F-4D97-AF65-F5344CB8AC3E}">
-        <p14:creationId xmlns:p14="http://schemas.microsoft.com/office/powerpoint/2010/main" val="1263844640"/>
+        <p14:creationId xmlns:p14="http://schemas.microsoft.com/office/powerpoint/2010/main" val="569338563"/>
       </p:ext>
     </p:extLst>
   </p:cSld>
@@ -4846,26 +6040,11 @@
           <a:bodyPr/>
           <a:lstStyle/>
           <a:p>
-            <a:endParaRPr lang="en-US"/>
-          </a:p>
-        </p:txBody>
-      </p:sp>
-      <p:sp>
-        <p:nvSpPr>
-          <p:cNvPr id="3" name="Content Placeholder 2"/>
-          <p:cNvSpPr>
-            <a:spLocks noGrp="1"/>
-          </p:cNvSpPr>
-          <p:nvPr>
-            <p:ph idx="1"/>
-          </p:nvPr>
-        </p:nvSpPr>
-        <p:spPr/>
-        <p:txBody>
-          <a:bodyPr/>
-          <a:lstStyle/>
-          <a:p>
-            <a:endParaRPr lang="en-US"/>
+            <a:r>
+              <a:rPr lang="en-US" dirty="0" smtClean="0"/>
+              <a:t>Visual analysis: Fact table</a:t>
+            </a:r>
+            <a:endParaRPr lang="ru-RU" dirty="0"/>
           </a:p>
         </p:txBody>
       </p:sp>
@@ -4885,8 +6064,114 @@
         </p:blipFill>
         <p:spPr>
           <a:xfrm>
-            <a:off x="1271897" y="1690688"/>
-            <a:ext cx="9325389" cy="4710112"/>
+            <a:off x="6149361" y="3094181"/>
+            <a:ext cx="5956626" cy="3008601"/>
+          </a:xfrm>
+          <a:prstGeom prst="rect">
+            <a:avLst/>
+          </a:prstGeom>
+        </p:spPr>
+      </p:pic>
+      <p:sp>
+        <p:nvSpPr>
+          <p:cNvPr id="7" name="TextBox 6"/>
+          <p:cNvSpPr txBox="1"/>
+          <p:nvPr/>
+        </p:nvSpPr>
+        <p:spPr>
+          <a:xfrm>
+            <a:off x="838199" y="1549399"/>
+            <a:ext cx="10810876" cy="1200329"/>
+          </a:xfrm>
+          <a:prstGeom prst="rect">
+            <a:avLst/>
+          </a:prstGeom>
+          <a:noFill/>
+        </p:spPr>
+        <p:txBody>
+          <a:bodyPr wrap="square" rtlCol="0">
+            <a:spAutoFit/>
+          </a:bodyPr>
+          <a:lstStyle/>
+          <a:p>
+            <a:pPr marL="285750" indent="-285750">
+              <a:buFont typeface="Arial" panose="020B0604020202020204" pitchFamily="34" charset="0"/>
+              <a:buChar char="•"/>
+            </a:pPr>
+            <a:r>
+              <a:rPr lang="en-US" dirty="0" smtClean="0"/>
+              <a:t>From the fact table we can see that two ‘</a:t>
+            </a:r>
+            <a:r>
+              <a:rPr lang="en-US" dirty="0" err="1" smtClean="0"/>
+              <a:t>msisdns</a:t>
+            </a:r>
+            <a:r>
+              <a:rPr lang="en-US" dirty="0" smtClean="0"/>
+              <a:t>’ match if they have a lot of similar base stations</a:t>
+            </a:r>
+          </a:p>
+          <a:p>
+            <a:pPr marL="285750" indent="-285750">
+              <a:buFont typeface="Arial" panose="020B0604020202020204" pitchFamily="34" charset="0"/>
+              <a:buChar char="•"/>
+            </a:pPr>
+            <a:r>
+              <a:rPr lang="en-US" dirty="0" smtClean="0"/>
+              <a:t>We can measure this similarities using several methods: </a:t>
+            </a:r>
+            <a:r>
+              <a:rPr lang="en-US" dirty="0" err="1" smtClean="0"/>
+              <a:t>Jaccard</a:t>
+            </a:r>
+            <a:r>
+              <a:rPr lang="en-US" dirty="0" smtClean="0"/>
+              <a:t> </a:t>
+            </a:r>
+            <a:r>
+              <a:rPr lang="en-US" dirty="0"/>
+              <a:t>Index, Bernstein and </a:t>
+            </a:r>
+            <a:r>
+              <a:rPr lang="en-US" dirty="0" err="1"/>
+              <a:t>Zobel</a:t>
+            </a:r>
+            <a:r>
+              <a:rPr lang="en-US" dirty="0"/>
+              <a:t> </a:t>
+            </a:r>
+            <a:r>
+              <a:rPr lang="en-US" dirty="0" smtClean="0"/>
+              <a:t>S2 and S3 similarities measures</a:t>
+            </a:r>
+          </a:p>
+          <a:p>
+            <a:pPr marL="285750" indent="-285750">
+              <a:buFont typeface="Arial" panose="020B0604020202020204" pitchFamily="34" charset="0"/>
+              <a:buChar char="•"/>
+            </a:pPr>
+            <a:endParaRPr lang="ru-RU" dirty="0"/>
+          </a:p>
+        </p:txBody>
+      </p:sp>
+      <p:pic>
+        <p:nvPicPr>
+          <p:cNvPr id="8" name="Picture 7"/>
+          <p:cNvPicPr>
+            <a:picLocks noChangeAspect="1"/>
+          </p:cNvPicPr>
+          <p:nvPr/>
+        </p:nvPicPr>
+        <p:blipFill>
+          <a:blip r:embed="rId3"/>
+          <a:stretch>
+            <a:fillRect/>
+          </a:stretch>
+        </p:blipFill>
+        <p:spPr>
+          <a:xfrm>
+            <a:off x="108528" y="3094182"/>
+            <a:ext cx="5996976" cy="3008601"/>
           </a:xfrm>
           <a:prstGeom prst="rect">
             <a:avLst/>
@@ -4896,7 +6181,7 @@
     </p:spTree>
     <p:extLst>
       <p:ext uri="{BB962C8B-B14F-4D97-AF65-F5344CB8AC3E}">
-        <p14:creationId xmlns:p14="http://schemas.microsoft.com/office/powerpoint/2010/main" val="4272212951"/>
+        <p14:creationId xmlns:p14="http://schemas.microsoft.com/office/powerpoint/2010/main" val="3066599123"/>
       </p:ext>
     </p:extLst>
   </p:cSld>
@@ -4923,28 +6208,9 @@
           <a:chExt cx="0" cy="0"/>
         </a:xfrm>
       </p:grpSpPr>
-      <p:sp>
-        <p:nvSpPr>
-          <p:cNvPr id="2" name="Title 1"/>
-          <p:cNvSpPr>
-            <a:spLocks noGrp="1"/>
-          </p:cNvSpPr>
-          <p:nvPr>
-            <p:ph type="title"/>
-          </p:nvPr>
-        </p:nvSpPr>
-        <p:spPr/>
-        <p:txBody>
-          <a:bodyPr/>
-          <a:lstStyle/>
-          <a:p>
-            <a:endParaRPr lang="en-US"/>
-          </a:p>
-        </p:txBody>
-      </p:sp>
       <p:pic>
         <p:nvPicPr>
-          <p:cNvPr id="4" name="Picture 3"/>
+          <p:cNvPr id="10" name="Picture 9"/>
           <p:cNvPicPr>
             <a:picLocks noChangeAspect="1"/>
           </p:cNvPicPr>
@@ -4958,8 +6224,121 @@
         </p:blipFill>
         <p:spPr>
           <a:xfrm>
-            <a:off x="1112755" y="1666772"/>
-            <a:ext cx="9236415" cy="4669043"/>
+            <a:off x="6169891" y="3105181"/>
+            <a:ext cx="5751945" cy="2907630"/>
+          </a:xfrm>
+          <a:prstGeom prst="rect">
+            <a:avLst/>
+          </a:prstGeom>
+        </p:spPr>
+      </p:pic>
+      <p:sp>
+        <p:nvSpPr>
+          <p:cNvPr id="2" name="Title 1"/>
+          <p:cNvSpPr>
+            <a:spLocks noGrp="1"/>
+          </p:cNvSpPr>
+          <p:nvPr>
+            <p:ph type="title"/>
+          </p:nvPr>
+        </p:nvSpPr>
+        <p:spPr/>
+        <p:txBody>
+          <a:bodyPr/>
+          <a:lstStyle/>
+          <a:p>
+            <a:r>
+              <a:rPr lang="en-US" dirty="0" smtClean="0"/>
+              <a:t>Visual analysis: Fact table</a:t>
+            </a:r>
+            <a:endParaRPr lang="ru-RU" dirty="0"/>
+          </a:p>
+        </p:txBody>
+      </p:sp>
+      <p:sp>
+        <p:nvSpPr>
+          <p:cNvPr id="7" name="TextBox 6"/>
+          <p:cNvSpPr txBox="1"/>
+          <p:nvPr/>
+        </p:nvSpPr>
+        <p:spPr>
+          <a:xfrm>
+            <a:off x="838199" y="1549399"/>
+            <a:ext cx="10810876" cy="1200329"/>
+          </a:xfrm>
+          <a:prstGeom prst="rect">
+            <a:avLst/>
+          </a:prstGeom>
+          <a:noFill/>
+        </p:spPr>
+        <p:txBody>
+          <a:bodyPr wrap="square" rtlCol="0">
+            <a:spAutoFit/>
+          </a:bodyPr>
+          <a:lstStyle/>
+          <a:p>
+            <a:pPr marL="285750" indent="-285750">
+              <a:buFont typeface="Arial" panose="020B0604020202020204" pitchFamily="34" charset="0"/>
+              <a:buChar char="•"/>
+            </a:pPr>
+            <a:r>
+              <a:rPr lang="en-US" dirty="0" smtClean="0"/>
+              <a:t>Some </a:t>
+            </a:r>
+            <a:r>
+              <a:rPr lang="en-US" dirty="0" err="1" smtClean="0"/>
+              <a:t>msisdn’s</a:t>
+            </a:r>
+            <a:r>
+              <a:rPr lang="en-US" dirty="0" smtClean="0"/>
+              <a:t> that are assumed to be matched in the fact table visually doesn’t have any base stations in common</a:t>
+            </a:r>
+          </a:p>
+          <a:p>
+            <a:pPr marL="285750" indent="-285750">
+              <a:buFont typeface="Arial" panose="020B0604020202020204" pitchFamily="34" charset="0"/>
+              <a:buChar char="•"/>
+            </a:pPr>
+            <a:r>
+              <a:rPr lang="en-US" dirty="0" smtClean="0"/>
+              <a:t>Geographically this ‘</a:t>
+            </a:r>
+            <a:r>
+              <a:rPr lang="en-US" dirty="0" err="1" smtClean="0"/>
+              <a:t>msisdns</a:t>
+            </a:r>
+            <a:r>
+              <a:rPr lang="en-US" dirty="0" smtClean="0"/>
+              <a:t>’ can be far away from each other and can be easily separated by line</a:t>
+            </a:r>
+          </a:p>
+          <a:p>
+            <a:pPr marL="285750" indent="-285750">
+              <a:buFont typeface="Arial" panose="020B0604020202020204" pitchFamily="34" charset="0"/>
+              <a:buChar char="•"/>
+            </a:pPr>
+            <a:endParaRPr lang="ru-RU" dirty="0"/>
+          </a:p>
+        </p:txBody>
+      </p:sp>
+      <p:pic>
+        <p:nvPicPr>
+          <p:cNvPr id="6" name="Picture 5"/>
+          <p:cNvPicPr>
+            <a:picLocks noChangeAspect="1"/>
+          </p:cNvPicPr>
+          <p:nvPr/>
+        </p:nvPicPr>
+        <p:blipFill>
+          <a:blip r:embed="rId3"/>
+          <a:stretch>
+            <a:fillRect/>
+          </a:stretch>
+        </p:blipFill>
+        <p:spPr>
+          <a:xfrm>
+            <a:off x="379297" y="3105182"/>
+            <a:ext cx="5675006" cy="2861509"/>
           </a:xfrm>
           <a:prstGeom prst="rect">
             <a:avLst/>
@@ -4969,7 +6348,7 @@
     </p:spTree>
     <p:extLst>
       <p:ext uri="{BB962C8B-B14F-4D97-AF65-F5344CB8AC3E}">
-        <p14:creationId xmlns:p14="http://schemas.microsoft.com/office/powerpoint/2010/main" val="4161484074"/>
+        <p14:creationId xmlns:p14="http://schemas.microsoft.com/office/powerpoint/2010/main" val="3229864977"/>
       </p:ext>
     </p:extLst>
   </p:cSld>
@@ -5011,7 +6390,11 @@
           <a:bodyPr/>
           <a:lstStyle/>
           <a:p>
-            <a:endParaRPr lang="en-US"/>
+            <a:r>
+              <a:rPr lang="en-US" dirty="0" smtClean="0"/>
+              <a:t>Visual analysis: Fact table</a:t>
+            </a:r>
+            <a:endParaRPr lang="en-US" dirty="0"/>
           </a:p>
         </p:txBody>
       </p:sp>
@@ -5031,18 +6414,100 @@
         </p:blipFill>
         <p:spPr>
           <a:xfrm>
-            <a:off x="960726" y="1329790"/>
-            <a:ext cx="9605035" cy="4847173"/>
+            <a:off x="838200" y="2564700"/>
+            <a:ext cx="4916055" cy="3919444"/>
           </a:xfrm>
           <a:prstGeom prst="rect">
             <a:avLst/>
           </a:prstGeom>
         </p:spPr>
       </p:pic>
+      <p:pic>
+        <p:nvPicPr>
+          <p:cNvPr id="5" name="Picture 4"/>
+          <p:cNvPicPr>
+            <a:picLocks noChangeAspect="1"/>
+          </p:cNvPicPr>
+          <p:nvPr/>
+        </p:nvPicPr>
+        <p:blipFill>
+          <a:blip r:embed="rId3"/>
+          <a:stretch>
+            <a:fillRect/>
+          </a:stretch>
+        </p:blipFill>
+        <p:spPr>
+          <a:xfrm>
+            <a:off x="6589094" y="2564700"/>
+            <a:ext cx="4710271" cy="3792372"/>
+          </a:xfrm>
+          <a:prstGeom prst="rect">
+            <a:avLst/>
+          </a:prstGeom>
+        </p:spPr>
+      </p:pic>
+      <p:sp>
+        <p:nvSpPr>
+          <p:cNvPr id="6" name="TextBox 5"/>
+          <p:cNvSpPr txBox="1"/>
+          <p:nvPr/>
+        </p:nvSpPr>
+        <p:spPr>
+          <a:xfrm>
+            <a:off x="838199" y="1521691"/>
+            <a:ext cx="10810876" cy="1200329"/>
+          </a:xfrm>
+          <a:prstGeom prst="rect">
+            <a:avLst/>
+          </a:prstGeom>
+          <a:noFill/>
+        </p:spPr>
+        <p:txBody>
+          <a:bodyPr wrap="square" rtlCol="0">
+            <a:spAutoFit/>
+          </a:bodyPr>
+          <a:lstStyle/>
+          <a:p>
+            <a:pPr marL="285750" indent="-285750">
+              <a:buFont typeface="Arial" panose="020B0604020202020204" pitchFamily="34" charset="0"/>
+              <a:buChar char="•"/>
+            </a:pPr>
+            <a:r>
+              <a:rPr lang="en-US" dirty="0" smtClean="0"/>
+              <a:t>This two ‘</a:t>
+            </a:r>
+            <a:r>
+              <a:rPr lang="en-US" dirty="0" err="1" smtClean="0"/>
+              <a:t>msisdns</a:t>
+            </a:r>
+            <a:r>
+              <a:rPr lang="en-US" dirty="0" smtClean="0"/>
+              <a:t>’ are assumed to belong to the same user</a:t>
+            </a:r>
+          </a:p>
+          <a:p>
+            <a:pPr marL="285750" indent="-285750">
+              <a:buFont typeface="Arial" panose="020B0604020202020204" pitchFamily="34" charset="0"/>
+              <a:buChar char="•"/>
+            </a:pPr>
+            <a:r>
+              <a:rPr lang="en-US" dirty="0" smtClean="0"/>
+              <a:t>However we can visually see on the map that they don’t have any geo data in common and located in different Moscow parts</a:t>
+            </a:r>
+          </a:p>
+          <a:p>
+            <a:pPr marL="285750" indent="-285750">
+              <a:buFont typeface="Arial" panose="020B0604020202020204" pitchFamily="34" charset="0"/>
+              <a:buChar char="•"/>
+            </a:pPr>
+            <a:endParaRPr lang="ru-RU" dirty="0"/>
+          </a:p>
+        </p:txBody>
+      </p:sp>
     </p:spTree>
     <p:extLst>
       <p:ext uri="{BB962C8B-B14F-4D97-AF65-F5344CB8AC3E}">
-        <p14:creationId xmlns:p14="http://schemas.microsoft.com/office/powerpoint/2010/main" val="1011074328"/>
+        <p14:creationId xmlns:p14="http://schemas.microsoft.com/office/powerpoint/2010/main" val="1449238729"/>
       </p:ext>
     </p:extLst>
   </p:cSld>
@@ -5084,13 +6549,113 @@
           <a:bodyPr/>
           <a:lstStyle/>
           <a:p>
-            <a:endParaRPr lang="en-US"/>
+            <a:r>
+              <a:rPr lang="en-US" dirty="0" smtClean="0"/>
+              <a:t>Visual analysis: Fact table</a:t>
+            </a:r>
+            <a:endParaRPr lang="en-US" dirty="0"/>
+          </a:p>
+        </p:txBody>
+      </p:sp>
+      <p:sp>
+        <p:nvSpPr>
+          <p:cNvPr id="6" name="TextBox 5"/>
+          <p:cNvSpPr txBox="1"/>
+          <p:nvPr/>
+        </p:nvSpPr>
+        <p:spPr>
+          <a:xfrm>
+            <a:off x="838199" y="1394691"/>
+            <a:ext cx="10810876" cy="2308324"/>
+          </a:xfrm>
+          <a:prstGeom prst="rect">
+            <a:avLst/>
+          </a:prstGeom>
+          <a:noFill/>
+        </p:spPr>
+        <p:txBody>
+          <a:bodyPr wrap="square" rtlCol="0">
+            <a:spAutoFit/>
+          </a:bodyPr>
+          <a:lstStyle/>
+          <a:p>
+            <a:pPr marL="285750" indent="-285750">
+              <a:buFont typeface="Arial" panose="020B0604020202020204" pitchFamily="34" charset="0"/>
+              <a:buChar char="•"/>
+            </a:pPr>
+            <a:r>
+              <a:rPr lang="en-US" dirty="0" smtClean="0"/>
+              <a:t>On the other hand we can see examples in the fact table were two ‘</a:t>
+            </a:r>
+            <a:r>
+              <a:rPr lang="en-US" dirty="0" err="1" smtClean="0"/>
+              <a:t>msisdn’s</a:t>
+            </a:r>
+            <a:r>
+              <a:rPr lang="en-US" dirty="0" smtClean="0"/>
+              <a:t>’ are matched with each other, but one of the matched </a:t>
+            </a:r>
+            <a:r>
+              <a:rPr lang="en-US" dirty="0" err="1" smtClean="0"/>
+              <a:t>msisdn’s</a:t>
+            </a:r>
+            <a:r>
+              <a:rPr lang="en-US" dirty="0" smtClean="0"/>
+              <a:t> have less than 4 points and this points displaced from the track created by the second ‘</a:t>
+            </a:r>
+            <a:r>
+              <a:rPr lang="en-US" dirty="0" err="1" smtClean="0"/>
+              <a:t>msisdn</a:t>
+            </a:r>
+            <a:r>
+              <a:rPr lang="en-US" dirty="0" smtClean="0"/>
+              <a:t>’</a:t>
+            </a:r>
+          </a:p>
+          <a:p>
+            <a:pPr marL="285750" indent="-285750">
+              <a:buFont typeface="Arial" panose="020B0604020202020204" pitchFamily="34" charset="0"/>
+              <a:buChar char="•"/>
+            </a:pPr>
+            <a:r>
+              <a:rPr lang="en-US" dirty="0" err="1" smtClean="0"/>
+              <a:t>Jaccard</a:t>
+            </a:r>
+            <a:r>
+              <a:rPr lang="en-US" dirty="0" smtClean="0"/>
+              <a:t> distance won’t work in this cases</a:t>
+            </a:r>
+          </a:p>
+          <a:p>
+            <a:pPr marL="285750" indent="-285750">
+              <a:buFont typeface="Arial" panose="020B0604020202020204" pitchFamily="34" charset="0"/>
+              <a:buChar char="•"/>
+            </a:pPr>
+            <a:r>
+              <a:rPr lang="en-US" dirty="0" smtClean="0"/>
+              <a:t>My approach would be to take all ‘</a:t>
+            </a:r>
+            <a:r>
+              <a:rPr lang="en-US" dirty="0" err="1" smtClean="0"/>
+              <a:t>msisdn’s</a:t>
+            </a:r>
+            <a:r>
+              <a:rPr lang="en-US" dirty="0" smtClean="0"/>
+              <a:t>’ with short tracks (less or equal 3 points) and add to each point of their track all nearest base stations – base stations that have overlapping signals with points from the original track</a:t>
+            </a:r>
+          </a:p>
+          <a:p>
+            <a:pPr marL="285750" indent="-285750">
+              <a:buFont typeface="Arial" panose="020B0604020202020204" pitchFamily="34" charset="0"/>
+              <a:buChar char="•"/>
+            </a:pPr>
+            <a:endParaRPr lang="ru-RU" dirty="0"/>
           </a:p>
         </p:txBody>
       </p:sp>
       <p:pic>
         <p:nvPicPr>
-          <p:cNvPr id="4" name="Picture 3"/>
+          <p:cNvPr id="7" name="Picture 6"/>
           <p:cNvPicPr>
             <a:picLocks noChangeAspect="1"/>
           </p:cNvPicPr>
@@ -5104,8 +6669,32 @@
         </p:blipFill>
         <p:spPr>
           <a:xfrm>
-            <a:off x="1207695" y="1659659"/>
-            <a:ext cx="9335054" cy="4683269"/>
+            <a:off x="6223000" y="3541566"/>
+            <a:ext cx="5851370" cy="2935586"/>
+          </a:xfrm>
+          <a:prstGeom prst="rect">
+            <a:avLst/>
+          </a:prstGeom>
+        </p:spPr>
+      </p:pic>
+      <p:pic>
+        <p:nvPicPr>
+          <p:cNvPr id="9" name="Picture 8"/>
+          <p:cNvPicPr>
+            <a:picLocks noChangeAspect="1"/>
+          </p:cNvPicPr>
+          <p:nvPr/>
+        </p:nvPicPr>
+        <p:blipFill>
+          <a:blip r:embed="rId3"/>
+          <a:stretch>
+            <a:fillRect/>
+          </a:stretch>
+        </p:blipFill>
+        <p:spPr>
+          <a:xfrm>
+            <a:off x="117595" y="3487439"/>
+            <a:ext cx="5999042" cy="2989713"/>
           </a:xfrm>
           <a:prstGeom prst="rect">
             <a:avLst/>
@@ -5115,7 +6704,7 @@
     </p:spTree>
     <p:extLst>
       <p:ext uri="{BB962C8B-B14F-4D97-AF65-F5344CB8AC3E}">
-        <p14:creationId xmlns:p14="http://schemas.microsoft.com/office/powerpoint/2010/main" val="1194380634"/>
+        <p14:creationId xmlns:p14="http://schemas.microsoft.com/office/powerpoint/2010/main" val="402053557"/>
       </p:ext>
     </p:extLst>
   </p:cSld>

</xml_diff>

<commit_message>
Model with min-max dist
</commit_message>
<xml_diff>
--- a/my_ppt.pptx
+++ b/my_ppt.pptx
@@ -5,7 +5,7 @@
     <p:sldMasterId id="2147483707" r:id="rId1"/>
   </p:sldMasterIdLst>
   <p:notesMasterIdLst>
-    <p:notesMasterId r:id="rId17"/>
+    <p:notesMasterId r:id="rId18"/>
   </p:notesMasterIdLst>
   <p:sldIdLst>
     <p:sldId id="256" r:id="rId2"/>
@@ -22,7 +22,8 @@
     <p:sldId id="286" r:id="rId13"/>
     <p:sldId id="287" r:id="rId14"/>
     <p:sldId id="288" r:id="rId15"/>
-    <p:sldId id="279" r:id="rId16"/>
+    <p:sldId id="289" r:id="rId16"/>
+    <p:sldId id="279" r:id="rId17"/>
   </p:sldIdLst>
   <p:sldSz cx="12192000" cy="6858000"/>
   <p:notesSz cx="6858000" cy="9144000"/>
@@ -211,7 +212,7 @@
           <a:p>
             <a:fld id="{287E1A8F-7719-4622-A7FC-B09120ECE8B8}" type="datetimeFigureOut">
               <a:rPr lang="ru-RU" smtClean="0"/>
-              <a:t>10.02.2016</a:t>
+              <a:t>11.02.2016</a:t>
             </a:fld>
             <a:endParaRPr lang="ru-RU"/>
           </a:p>
@@ -778,7 +779,7 @@
           <a:p>
             <a:fld id="{1C14A076-ED6C-40E7-8314-F402E5703C6E}" type="datetimeFigureOut">
               <a:rPr lang="ru-RU" smtClean="0"/>
-              <a:t>10.02.2016</a:t>
+              <a:t>11.02.2016</a:t>
             </a:fld>
             <a:endParaRPr lang="ru-RU"/>
           </a:p>
@@ -948,7 +949,7 @@
           <a:p>
             <a:fld id="{1C14A076-ED6C-40E7-8314-F402E5703C6E}" type="datetimeFigureOut">
               <a:rPr lang="ru-RU" smtClean="0"/>
-              <a:t>10.02.2016</a:t>
+              <a:t>11.02.2016</a:t>
             </a:fld>
             <a:endParaRPr lang="ru-RU"/>
           </a:p>
@@ -1128,7 +1129,7 @@
           <a:p>
             <a:fld id="{1C14A076-ED6C-40E7-8314-F402E5703C6E}" type="datetimeFigureOut">
               <a:rPr lang="ru-RU" smtClean="0"/>
-              <a:t>10.02.2016</a:t>
+              <a:t>11.02.2016</a:t>
             </a:fld>
             <a:endParaRPr lang="ru-RU"/>
           </a:p>
@@ -1298,7 +1299,7 @@
           <a:p>
             <a:fld id="{1C14A076-ED6C-40E7-8314-F402E5703C6E}" type="datetimeFigureOut">
               <a:rPr lang="ru-RU" smtClean="0"/>
-              <a:t>10.02.2016</a:t>
+              <a:t>11.02.2016</a:t>
             </a:fld>
             <a:endParaRPr lang="ru-RU"/>
           </a:p>
@@ -1544,7 +1545,7 @@
           <a:p>
             <a:fld id="{1C14A076-ED6C-40E7-8314-F402E5703C6E}" type="datetimeFigureOut">
               <a:rPr lang="ru-RU" smtClean="0"/>
-              <a:t>10.02.2016</a:t>
+              <a:t>11.02.2016</a:t>
             </a:fld>
             <a:endParaRPr lang="ru-RU"/>
           </a:p>
@@ -1776,7 +1777,7 @@
           <a:p>
             <a:fld id="{1C14A076-ED6C-40E7-8314-F402E5703C6E}" type="datetimeFigureOut">
               <a:rPr lang="ru-RU" smtClean="0"/>
-              <a:t>10.02.2016</a:t>
+              <a:t>11.02.2016</a:t>
             </a:fld>
             <a:endParaRPr lang="ru-RU"/>
           </a:p>
@@ -2143,7 +2144,7 @@
           <a:p>
             <a:fld id="{1C14A076-ED6C-40E7-8314-F402E5703C6E}" type="datetimeFigureOut">
               <a:rPr lang="ru-RU" smtClean="0"/>
-              <a:t>10.02.2016</a:t>
+              <a:t>11.02.2016</a:t>
             </a:fld>
             <a:endParaRPr lang="ru-RU"/>
           </a:p>
@@ -2261,7 +2262,7 @@
           <a:p>
             <a:fld id="{1C14A076-ED6C-40E7-8314-F402E5703C6E}" type="datetimeFigureOut">
               <a:rPr lang="ru-RU" smtClean="0"/>
-              <a:t>10.02.2016</a:t>
+              <a:t>11.02.2016</a:t>
             </a:fld>
             <a:endParaRPr lang="ru-RU"/>
           </a:p>
@@ -2356,7 +2357,7 @@
           <a:p>
             <a:fld id="{1C14A076-ED6C-40E7-8314-F402E5703C6E}" type="datetimeFigureOut">
               <a:rPr lang="ru-RU" smtClean="0"/>
-              <a:t>10.02.2016</a:t>
+              <a:t>11.02.2016</a:t>
             </a:fld>
             <a:endParaRPr lang="ru-RU"/>
           </a:p>
@@ -2633,7 +2634,7 @@
           <a:p>
             <a:fld id="{1C14A076-ED6C-40E7-8314-F402E5703C6E}" type="datetimeFigureOut">
               <a:rPr lang="ru-RU" smtClean="0"/>
-              <a:t>10.02.2016</a:t>
+              <a:t>11.02.2016</a:t>
             </a:fld>
             <a:endParaRPr lang="ru-RU"/>
           </a:p>
@@ -2886,7 +2887,7 @@
           <a:p>
             <a:fld id="{1C14A076-ED6C-40E7-8314-F402E5703C6E}" type="datetimeFigureOut">
               <a:rPr lang="ru-RU" smtClean="0"/>
-              <a:t>10.02.2016</a:t>
+              <a:t>11.02.2016</a:t>
             </a:fld>
             <a:endParaRPr lang="ru-RU"/>
           </a:p>
@@ -3099,7 +3100,7 @@
           <a:p>
             <a:fld id="{1C14A076-ED6C-40E7-8314-F402E5703C6E}" type="datetimeFigureOut">
               <a:rPr lang="ru-RU" smtClean="0"/>
-              <a:t>10.02.2016</a:t>
+              <a:t>11.02.2016</a:t>
             </a:fld>
             <a:endParaRPr lang="ru-RU"/>
           </a:p>
@@ -3676,14 +3677,16 @@
         </p:nvSpPr>
         <p:spPr/>
         <p:txBody>
-          <a:bodyPr/>
-          <a:lstStyle/>
-          <a:p>
-            <a:r>
-              <a:rPr lang="en-US" dirty="0" smtClean="0"/>
+          <a:bodyPr>
+            <a:normAutofit/>
+          </a:bodyPr>
+          <a:lstStyle/>
+          <a:p>
+            <a:r>
+              <a:rPr lang="en-US" sz="3600" dirty="0" smtClean="0"/>
               <a:t>Example of the result from the algorithm that calculate base stations overlapping points</a:t>
             </a:r>
-            <a:endParaRPr lang="ru-RU" dirty="0"/>
+            <a:endParaRPr lang="ru-RU" sz="3600" dirty="0"/>
           </a:p>
         </p:txBody>
       </p:sp>
@@ -3703,7 +3706,7 @@
         </p:blipFill>
         <p:spPr>
           <a:xfrm>
-            <a:off x="283774" y="1944933"/>
+            <a:off x="283774" y="2071933"/>
             <a:ext cx="5778367" cy="3968979"/>
           </a:xfrm>
           <a:prstGeom prst="rect">
@@ -3727,7 +3730,7 @@
         </p:blipFill>
         <p:spPr>
           <a:xfrm>
-            <a:off x="6332275" y="1981559"/>
+            <a:off x="6332275" y="2108559"/>
             <a:ext cx="5657850" cy="3895725"/>
           </a:xfrm>
           <a:prstGeom prst="rect">
@@ -3743,7 +3746,7 @@
         </p:nvCxnSpPr>
         <p:spPr>
           <a:xfrm>
-            <a:off x="938151" y="2814452"/>
+            <a:off x="938151" y="2941452"/>
             <a:ext cx="2106880" cy="2636322"/>
           </a:xfrm>
           <a:prstGeom prst="line">
@@ -3773,7 +3776,7 @@
         </p:nvCxnSpPr>
         <p:spPr>
           <a:xfrm flipV="1">
-            <a:off x="938151" y="2196935"/>
+            <a:off x="938151" y="2323935"/>
             <a:ext cx="3194462" cy="617517"/>
           </a:xfrm>
           <a:prstGeom prst="line">
@@ -3803,7 +3806,7 @@
         </p:nvCxnSpPr>
         <p:spPr>
           <a:xfrm flipH="1">
-            <a:off x="3045031" y="2196935"/>
+            <a:off x="3045031" y="2323935"/>
             <a:ext cx="1087582" cy="3253839"/>
           </a:xfrm>
           <a:prstGeom prst="line">
@@ -3833,7 +3836,7 @@
         </p:nvCxnSpPr>
         <p:spPr>
           <a:xfrm>
-            <a:off x="3241965" y="3194463"/>
+            <a:off x="3241965" y="3321463"/>
             <a:ext cx="866898" cy="1277587"/>
           </a:xfrm>
           <a:prstGeom prst="line">
@@ -3863,7 +3866,7 @@
         </p:nvCxnSpPr>
         <p:spPr>
           <a:xfrm>
-            <a:off x="3218215" y="3194463"/>
+            <a:off x="3218215" y="3321463"/>
             <a:ext cx="1318159" cy="734958"/>
           </a:xfrm>
           <a:prstGeom prst="line">
@@ -3893,7 +3896,7 @@
         </p:nvCxnSpPr>
         <p:spPr>
           <a:xfrm flipV="1">
-            <a:off x="4108863" y="3965875"/>
+            <a:off x="4108863" y="4092875"/>
             <a:ext cx="427511" cy="506176"/>
           </a:xfrm>
           <a:prstGeom prst="line">
@@ -3923,7 +3926,7 @@
         </p:nvCxnSpPr>
         <p:spPr>
           <a:xfrm>
-            <a:off x="9189525" y="3158009"/>
+            <a:off x="9189525" y="3285009"/>
             <a:ext cx="866898" cy="1277587"/>
           </a:xfrm>
           <a:prstGeom prst="line">
@@ -3953,7 +3956,7 @@
         </p:nvCxnSpPr>
         <p:spPr>
           <a:xfrm>
-            <a:off x="9165775" y="3158009"/>
+            <a:off x="9165775" y="3285009"/>
             <a:ext cx="1318159" cy="734958"/>
           </a:xfrm>
           <a:prstGeom prst="line">
@@ -3983,7 +3986,7 @@
         </p:nvCxnSpPr>
         <p:spPr>
           <a:xfrm flipV="1">
-            <a:off x="10056423" y="3929421"/>
+            <a:off x="10056423" y="4056421"/>
             <a:ext cx="427511" cy="506176"/>
           </a:xfrm>
           <a:prstGeom prst="line">
@@ -4013,7 +4016,7 @@
         </p:nvCxnSpPr>
         <p:spPr>
           <a:xfrm>
-            <a:off x="6869664" y="2802577"/>
+            <a:off x="6869664" y="2929577"/>
             <a:ext cx="2106880" cy="2636322"/>
           </a:xfrm>
           <a:prstGeom prst="line">
@@ -4043,7 +4046,7 @@
         </p:nvCxnSpPr>
         <p:spPr>
           <a:xfrm flipV="1">
-            <a:off x="6869664" y="2185060"/>
+            <a:off x="6869664" y="2312060"/>
             <a:ext cx="3194462" cy="617517"/>
           </a:xfrm>
           <a:prstGeom prst="line">
@@ -4073,7 +4076,7 @@
         </p:nvCxnSpPr>
         <p:spPr>
           <a:xfrm flipH="1">
-            <a:off x="8976544" y="2185060"/>
+            <a:off x="8976544" y="2312060"/>
             <a:ext cx="1087582" cy="3253839"/>
           </a:xfrm>
           <a:prstGeom prst="line">
@@ -4095,6 +4098,84 @@
           </a:fontRef>
         </p:style>
       </p:cxnSp>
+      <p:sp>
+        <p:nvSpPr>
+          <p:cNvPr id="2" name="TextBox 1"/>
+          <p:cNvSpPr txBox="1"/>
+          <p:nvPr/>
+        </p:nvSpPr>
+        <p:spPr>
+          <a:xfrm>
+            <a:off x="838200" y="1696925"/>
+            <a:ext cx="3785558" cy="338554"/>
+          </a:xfrm>
+          <a:prstGeom prst="rect">
+            <a:avLst/>
+          </a:prstGeom>
+          <a:noFill/>
+        </p:spPr>
+        <p:txBody>
+          <a:bodyPr wrap="square" rtlCol="0">
+            <a:spAutoFit/>
+          </a:bodyPr>
+          <a:lstStyle/>
+          <a:p>
+            <a:pPr algn="ctr"/>
+            <a:r>
+              <a:rPr lang="en-US" sz="1600" dirty="0" smtClean="0">
+                <a:solidFill>
+                  <a:schemeClr val="accent6"/>
+                </a:solidFill>
+              </a:rPr>
+              <a:t>Two base stations have overlapping signals</a:t>
+            </a:r>
+            <a:endParaRPr lang="ru-RU" sz="1600" dirty="0">
+              <a:solidFill>
+                <a:schemeClr val="accent6"/>
+              </a:solidFill>
+            </a:endParaRPr>
+          </a:p>
+        </p:txBody>
+      </p:sp>
+      <p:sp>
+        <p:nvSpPr>
+          <p:cNvPr id="18" name="TextBox 17"/>
+          <p:cNvSpPr txBox="1"/>
+          <p:nvPr/>
+        </p:nvSpPr>
+        <p:spPr>
+          <a:xfrm>
+            <a:off x="7083765" y="1727142"/>
+            <a:ext cx="3785558" cy="338554"/>
+          </a:xfrm>
+          <a:prstGeom prst="rect">
+            <a:avLst/>
+          </a:prstGeom>
+          <a:noFill/>
+        </p:spPr>
+        <p:txBody>
+          <a:bodyPr wrap="square" rtlCol="0">
+            <a:spAutoFit/>
+          </a:bodyPr>
+          <a:lstStyle/>
+          <a:p>
+            <a:pPr algn="ctr"/>
+            <a:r>
+              <a:rPr lang="en-US" sz="1600" dirty="0" smtClean="0">
+                <a:solidFill>
+                  <a:schemeClr val="accent6"/>
+                </a:solidFill>
+              </a:rPr>
+              <a:t>Searching for overlapping area</a:t>
+            </a:r>
+            <a:endParaRPr lang="ru-RU" sz="1600" dirty="0">
+              <a:solidFill>
+                <a:schemeClr val="accent6"/>
+              </a:solidFill>
+            </a:endParaRPr>
+          </a:p>
+        </p:txBody>
+      </p:sp>
     </p:spTree>
     <p:extLst>
       <p:ext uri="{BB962C8B-B14F-4D97-AF65-F5344CB8AC3E}">
@@ -4143,10 +4224,10 @@
           <a:lstStyle/>
           <a:p>
             <a:r>
-              <a:rPr lang="en-US" sz="4000" dirty="0" smtClean="0"/>
-              <a:t>All base stations that overlaps a selected station</a:t>
-            </a:r>
-            <a:endParaRPr lang="ru-RU" sz="4000" dirty="0"/>
+              <a:rPr lang="en-US" sz="3200" dirty="0" smtClean="0"/>
+              <a:t>Example of set of base stations that overlaps a selected station</a:t>
+            </a:r>
+            <a:endParaRPr lang="ru-RU" sz="3200" dirty="0"/>
           </a:p>
         </p:txBody>
       </p:sp>
@@ -4369,7 +4450,7 @@
           <a:p>
             <a:r>
               <a:rPr lang="en-US" sz="2000" dirty="0" smtClean="0"/>
-              <a:t>1000 pairs generated from other combinations of the ‘</a:t>
+              <a:t>1100 pairs generated from other combinations of the ‘</a:t>
             </a:r>
             <a:r>
               <a:rPr lang="en-US" sz="2000" dirty="0" err="1" smtClean="0"/>
@@ -4385,7 +4466,13 @@
             </a:r>
             <a:r>
               <a:rPr lang="en-US" sz="2000" dirty="0" smtClean="0"/>
-              <a:t>’ don’t match. This pairs will  have the class ‘0’</a:t>
+              <a:t>’ don’t match. This pairs will  have the class ‘0’ (This fact was visually tested)</a:t>
+            </a:r>
+          </a:p>
+          <a:p>
+            <a:r>
+              <a:rPr lang="en-US" sz="2000" dirty="0" smtClean="0"/>
+              <a:t>Total 1220 observations</a:t>
             </a:r>
             <a:endParaRPr lang="ru-RU" sz="2000" dirty="0"/>
           </a:p>
@@ -4610,7 +4697,15 @@
           <a:p>
             <a:r>
               <a:rPr lang="en-US" sz="2000" dirty="0" smtClean="0"/>
-              <a:t>To build the test data we will construct the matrix with all possible unique combinations of this 2361 ids and then we will use our classifier to predict if two ‘</a:t>
+              <a:t>To build the test data we will construct the matrix with all possible unique combinations of this 2361 ids </a:t>
+            </a:r>
+            <a:r>
+              <a:rPr lang="en-US" sz="2000" dirty="0" err="1" smtClean="0"/>
+              <a:t>e.g</a:t>
+            </a:r>
+            <a:r>
+              <a:rPr lang="en-US" sz="2000" dirty="0" smtClean="0"/>
+              <a:t> test data will consist of pairs of ‘</a:t>
             </a:r>
             <a:r>
               <a:rPr lang="en-US" sz="2000" dirty="0" err="1" smtClean="0"/>
@@ -4618,7 +4713,15 @@
             </a:r>
             <a:r>
               <a:rPr lang="en-US" sz="2000" dirty="0" smtClean="0"/>
-              <a:t>’ match with each other or not</a:t>
+              <a:t>’. Then we will use classifier to predict if two ‘</a:t>
+            </a:r>
+            <a:r>
+              <a:rPr lang="en-US" sz="2000" dirty="0" err="1" smtClean="0"/>
+              <a:t>msisdn’s</a:t>
+            </a:r>
+            <a:r>
+              <a:rPr lang="en-US" sz="2000" dirty="0" smtClean="0"/>
+              <a:t>’ match with each other or not. </a:t>
             </a:r>
             <a:endParaRPr lang="ru-RU" sz="2000" dirty="0" smtClean="0"/>
           </a:p>
@@ -4831,7 +4934,7 @@
           <a:p>
             <a:r>
               <a:rPr lang="en-US" dirty="0" smtClean="0"/>
-              <a:t>Testing the Model </a:t>
+              <a:t>Model </a:t>
             </a:r>
             <a:endParaRPr lang="ru-RU" dirty="0"/>
           </a:p>
@@ -4847,9 +4950,16 @@
             <p:ph idx="1"/>
           </p:nvPr>
         </p:nvSpPr>
-        <p:spPr/>
-        <p:txBody>
-          <a:bodyPr/>
+        <p:spPr>
+          <a:xfrm>
+            <a:off x="838200" y="1552755"/>
+            <a:ext cx="10515600" cy="4624208"/>
+          </a:xfrm>
+        </p:spPr>
+        <p:txBody>
+          <a:bodyPr>
+            <a:normAutofit/>
+          </a:bodyPr>
           <a:lstStyle/>
           <a:p>
             <a:pPr>
@@ -4857,18 +4967,7 @@
                 <a:spcPts val="1200"/>
               </a:spcBef>
             </a:pPr>
-            <a:r>
-              <a:rPr lang="en-US" dirty="0" smtClean="0"/>
-              <a:t>The classifier was build with the </a:t>
-            </a:r>
-            <a:r>
-              <a:rPr lang="en-US" dirty="0" err="1" smtClean="0"/>
-              <a:t>RandomForest</a:t>
-            </a:r>
-            <a:r>
-              <a:rPr lang="en-US" dirty="0" smtClean="0"/>
-              <a:t> model</a:t>
-            </a:r>
+            <a:endParaRPr lang="en-US" dirty="0" smtClean="0"/>
           </a:p>
           <a:p>
             <a:pPr>
@@ -4878,8 +4977,17 @@
             </a:pPr>
             <a:r>
               <a:rPr lang="en-US" dirty="0" smtClean="0"/>
-              <a:t>Model was tested using 5-folds stratified cross validation</a:t>
-            </a:r>
+              <a:t>The </a:t>
+            </a:r>
+            <a:r>
+              <a:rPr lang="en-US" dirty="0" smtClean="0"/>
+              <a:t>classifier was build with the </a:t>
+            </a:r>
+            <a:r>
+              <a:rPr lang="en-US" dirty="0" smtClean="0"/>
+              <a:t>Logistic regression model</a:t>
+            </a:r>
+            <a:endParaRPr lang="en-US" dirty="0" smtClean="0"/>
           </a:p>
           <a:p>
             <a:pPr>
@@ -4889,35 +4997,48 @@
             </a:pPr>
             <a:r>
               <a:rPr lang="en-US" dirty="0" smtClean="0"/>
-              <a:t>Features selection was made using </a:t>
-            </a:r>
-            <a:r>
-              <a:rPr lang="en-US" dirty="0" err="1" smtClean="0"/>
-              <a:t>RandomForest</a:t>
+              <a:t>Features </a:t>
             </a:r>
             <a:r>
               <a:rPr lang="en-US" dirty="0" smtClean="0"/>
-              <a:t> classifier</a:t>
-            </a:r>
-          </a:p>
-          <a:p>
+              <a:t>selection was made using </a:t>
+            </a:r>
             <a:r>
               <a:rPr lang="en-US" dirty="0" smtClean="0"/>
-              <a:t>Two parameters were tuned in the model: maximum number of trees and trees </a:t>
-            </a:r>
-            <a:r>
-              <a:rPr lang="en-US" dirty="0" err="1" smtClean="0"/>
-              <a:t>max_depth</a:t>
+              <a:t>RFECV with logistic regression</a:t>
+            </a:r>
+          </a:p>
+          <a:p>
+            <a:pPr>
+              <a:spcBef>
+                <a:spcPts val="1200"/>
+              </a:spcBef>
+            </a:pPr>
+            <a:r>
+              <a:rPr lang="en-US" dirty="0"/>
+              <a:t>Model was tested using 5-folds stratified cross </a:t>
+            </a:r>
+            <a:r>
+              <a:rPr lang="en-US" dirty="0" smtClean="0"/>
+              <a:t>validation</a:t>
             </a:r>
             <a:endParaRPr lang="en-US" dirty="0" smtClean="0"/>
           </a:p>
           <a:p>
+            <a:r>
+              <a:rPr lang="en-US" dirty="0" smtClean="0"/>
+              <a:t>Parameters tuning using 5-folds CV: C-value </a:t>
+            </a:r>
             <a:endParaRPr lang="en-US" dirty="0" smtClean="0"/>
           </a:p>
           <a:p>
             <a:r>
               <a:rPr lang="en-US" dirty="0" smtClean="0"/>
-              <a:t>Features were build and model was trained on the AWS ‘c3.8xlarge’ instance </a:t>
+              <a:t>Features </a:t>
+            </a:r>
+            <a:r>
+              <a:rPr lang="en-US" dirty="0" smtClean="0"/>
+              <a:t>were build and model was trained on the AWS ‘c3.8xlarge’ instance </a:t>
             </a:r>
             <a:endParaRPr lang="ru-RU" dirty="0"/>
           </a:p>
@@ -4955,6 +5076,546 @@
       </p:grpSpPr>
       <p:sp>
         <p:nvSpPr>
+          <p:cNvPr id="2" name="Title 1"/>
+          <p:cNvSpPr>
+            <a:spLocks noGrp="1"/>
+          </p:cNvSpPr>
+          <p:nvPr>
+            <p:ph type="title"/>
+          </p:nvPr>
+        </p:nvSpPr>
+        <p:spPr/>
+        <p:txBody>
+          <a:bodyPr/>
+          <a:lstStyle/>
+          <a:p>
+            <a:r>
+              <a:rPr lang="en-US" dirty="0" smtClean="0"/>
+              <a:t>Model Evaluation</a:t>
+            </a:r>
+            <a:endParaRPr lang="ru-RU" dirty="0"/>
+          </a:p>
+        </p:txBody>
+      </p:sp>
+      <p:sp>
+        <p:nvSpPr>
+          <p:cNvPr id="3" name="Content Placeholder 2"/>
+          <p:cNvSpPr>
+            <a:spLocks noGrp="1"/>
+          </p:cNvSpPr>
+          <p:nvPr>
+            <p:ph idx="1"/>
+          </p:nvPr>
+        </p:nvSpPr>
+        <p:spPr>
+          <a:xfrm>
+            <a:off x="838200" y="1514475"/>
+            <a:ext cx="10515600" cy="4662488"/>
+          </a:xfrm>
+        </p:spPr>
+        <p:txBody>
+          <a:bodyPr/>
+          <a:lstStyle/>
+          <a:p>
+            <a:endParaRPr lang="en-US" dirty="0" smtClean="0"/>
+          </a:p>
+          <a:p>
+            <a:r>
+              <a:rPr lang="en-US" dirty="0" smtClean="0"/>
+              <a:t>Cross </a:t>
+            </a:r>
+            <a:r>
+              <a:rPr lang="en-US" dirty="0" err="1" smtClean="0"/>
+              <a:t>val</a:t>
+            </a:r>
+            <a:r>
+              <a:rPr lang="en-US" dirty="0" smtClean="0"/>
+              <a:t> scores for 1220 train observations:</a:t>
+            </a:r>
+          </a:p>
+          <a:p>
+            <a:pPr marL="0" indent="0">
+              <a:buNone/>
+            </a:pPr>
+            <a:r>
+              <a:rPr lang="ru-RU" altLang="ru-RU" dirty="0" smtClean="0">
+                <a:solidFill>
+                  <a:srgbClr val="000000"/>
+                </a:solidFill>
+                <a:latin typeface="Courier New" panose="02070309020205020404" pitchFamily="49" charset="0"/>
+                <a:cs typeface="Courier New" panose="02070309020205020404" pitchFamily="49" charset="0"/>
+              </a:rPr>
+              <a:t>0.</a:t>
+            </a:r>
+            <a:r>
+              <a:rPr lang="en-US" altLang="ru-RU" dirty="0" smtClean="0">
+                <a:solidFill>
+                  <a:srgbClr val="000000"/>
+                </a:solidFill>
+                <a:latin typeface="Courier New" panose="02070309020205020404" pitchFamily="49" charset="0"/>
+                <a:cs typeface="Courier New" panose="02070309020205020404" pitchFamily="49" charset="0"/>
+              </a:rPr>
+              <a:t>920</a:t>
+            </a:r>
+            <a:r>
+              <a:rPr lang="ru-RU" altLang="ru-RU" dirty="0" smtClean="0">
+                <a:solidFill>
+                  <a:srgbClr val="000000"/>
+                </a:solidFill>
+                <a:latin typeface="Courier New" panose="02070309020205020404" pitchFamily="49" charset="0"/>
+                <a:cs typeface="Courier New" panose="02070309020205020404" pitchFamily="49" charset="0"/>
+              </a:rPr>
+              <a:t> </a:t>
+            </a:r>
+            <a:r>
+              <a:rPr lang="en-US" altLang="ru-RU" dirty="0" smtClean="0">
+                <a:solidFill>
+                  <a:srgbClr val="000000"/>
+                </a:solidFill>
+                <a:latin typeface="Courier New" panose="02070309020205020404" pitchFamily="49" charset="0"/>
+                <a:cs typeface="Courier New" panose="02070309020205020404" pitchFamily="49" charset="0"/>
+              </a:rPr>
+              <a:t>-- </a:t>
+            </a:r>
+            <a:r>
+              <a:rPr lang="ru-RU" altLang="ru-RU" dirty="0" smtClean="0">
+                <a:solidFill>
+                  <a:srgbClr val="000000"/>
+                </a:solidFill>
+                <a:latin typeface="Courier New" panose="02070309020205020404" pitchFamily="49" charset="0"/>
+                <a:cs typeface="Courier New" panose="02070309020205020404" pitchFamily="49" charset="0"/>
+              </a:rPr>
+              <a:t>0.9</a:t>
+            </a:r>
+            <a:r>
+              <a:rPr lang="en-US" altLang="ru-RU" dirty="0" smtClean="0">
+                <a:solidFill>
+                  <a:srgbClr val="000000"/>
+                </a:solidFill>
+                <a:latin typeface="Courier New" panose="02070309020205020404" pitchFamily="49" charset="0"/>
+                <a:cs typeface="Courier New" panose="02070309020205020404" pitchFamily="49" charset="0"/>
+              </a:rPr>
+              <a:t>68 </a:t>
+            </a:r>
+            <a:r>
+              <a:rPr lang="en-US" altLang="ru-RU" dirty="0" smtClean="0">
+                <a:solidFill>
+                  <a:srgbClr val="000000"/>
+                </a:solidFill>
+                <a:latin typeface="Courier New" panose="02070309020205020404" pitchFamily="49" charset="0"/>
+                <a:cs typeface="Courier New" panose="02070309020205020404" pitchFamily="49" charset="0"/>
+              </a:rPr>
+              <a:t>--</a:t>
+            </a:r>
+            <a:r>
+              <a:rPr lang="ru-RU" altLang="ru-RU" dirty="0" smtClean="0">
+                <a:solidFill>
+                  <a:srgbClr val="000000"/>
+                </a:solidFill>
+                <a:latin typeface="Courier New" panose="02070309020205020404" pitchFamily="49" charset="0"/>
+                <a:cs typeface="Courier New" panose="02070309020205020404" pitchFamily="49" charset="0"/>
+              </a:rPr>
+              <a:t> </a:t>
+            </a:r>
+            <a:r>
+              <a:rPr lang="ru-RU" altLang="ru-RU" dirty="0" smtClean="0">
+                <a:solidFill>
+                  <a:srgbClr val="000000"/>
+                </a:solidFill>
+                <a:latin typeface="Courier New" panose="02070309020205020404" pitchFamily="49" charset="0"/>
+                <a:cs typeface="Courier New" panose="02070309020205020404" pitchFamily="49" charset="0"/>
+              </a:rPr>
+              <a:t>0.9</a:t>
+            </a:r>
+            <a:r>
+              <a:rPr lang="en-US" altLang="ru-RU" dirty="0" smtClean="0">
+                <a:solidFill>
+                  <a:srgbClr val="000000"/>
+                </a:solidFill>
+                <a:latin typeface="Courier New" panose="02070309020205020404" pitchFamily="49" charset="0"/>
+                <a:cs typeface="Courier New" panose="02070309020205020404" pitchFamily="49" charset="0"/>
+              </a:rPr>
+              <a:t>40 </a:t>
+            </a:r>
+            <a:r>
+              <a:rPr lang="en-US" altLang="ru-RU" dirty="0" smtClean="0">
+                <a:solidFill>
+                  <a:srgbClr val="000000"/>
+                </a:solidFill>
+                <a:latin typeface="Courier New" panose="02070309020205020404" pitchFamily="49" charset="0"/>
+                <a:cs typeface="Courier New" panose="02070309020205020404" pitchFamily="49" charset="0"/>
+              </a:rPr>
+              <a:t>--</a:t>
+            </a:r>
+            <a:r>
+              <a:rPr lang="ru-RU" altLang="ru-RU" dirty="0" smtClean="0">
+                <a:solidFill>
+                  <a:srgbClr val="000000"/>
+                </a:solidFill>
+                <a:latin typeface="Courier New" panose="02070309020205020404" pitchFamily="49" charset="0"/>
+                <a:cs typeface="Courier New" panose="02070309020205020404" pitchFamily="49" charset="0"/>
+              </a:rPr>
+              <a:t> </a:t>
+            </a:r>
+            <a:r>
+              <a:rPr lang="ru-RU" altLang="ru-RU" dirty="0" smtClean="0">
+                <a:solidFill>
+                  <a:srgbClr val="000000"/>
+                </a:solidFill>
+                <a:latin typeface="Courier New" panose="02070309020205020404" pitchFamily="49" charset="0"/>
+                <a:cs typeface="Courier New" panose="02070309020205020404" pitchFamily="49" charset="0"/>
+              </a:rPr>
+              <a:t>0.</a:t>
+            </a:r>
+            <a:r>
+              <a:rPr lang="en-US" altLang="ru-RU" dirty="0" smtClean="0">
+                <a:solidFill>
+                  <a:srgbClr val="000000"/>
+                </a:solidFill>
+                <a:latin typeface="Courier New" panose="02070309020205020404" pitchFamily="49" charset="0"/>
+                <a:cs typeface="Courier New" panose="02070309020205020404" pitchFamily="49" charset="0"/>
+              </a:rPr>
+              <a:t>897 </a:t>
+            </a:r>
+            <a:r>
+              <a:rPr lang="en-US" altLang="ru-RU" dirty="0" smtClean="0">
+                <a:solidFill>
+                  <a:srgbClr val="000000"/>
+                </a:solidFill>
+                <a:latin typeface="Courier New" panose="02070309020205020404" pitchFamily="49" charset="0"/>
+                <a:cs typeface="Courier New" panose="02070309020205020404" pitchFamily="49" charset="0"/>
+              </a:rPr>
+              <a:t>--</a:t>
+            </a:r>
+            <a:r>
+              <a:rPr lang="ru-RU" altLang="ru-RU" dirty="0" smtClean="0">
+                <a:solidFill>
+                  <a:srgbClr val="000000"/>
+                </a:solidFill>
+                <a:latin typeface="Courier New" panose="02070309020205020404" pitchFamily="49" charset="0"/>
+                <a:cs typeface="Courier New" panose="02070309020205020404" pitchFamily="49" charset="0"/>
+              </a:rPr>
+              <a:t> </a:t>
+            </a:r>
+            <a:r>
+              <a:rPr lang="ru-RU" altLang="ru-RU" dirty="0" smtClean="0">
+                <a:solidFill>
+                  <a:srgbClr val="000000"/>
+                </a:solidFill>
+                <a:latin typeface="Courier New" panose="02070309020205020404" pitchFamily="49" charset="0"/>
+                <a:cs typeface="Courier New" panose="02070309020205020404" pitchFamily="49" charset="0"/>
+              </a:rPr>
+              <a:t>0.9</a:t>
+            </a:r>
+            <a:r>
+              <a:rPr lang="en-US" altLang="ru-RU" dirty="0" smtClean="0">
+                <a:solidFill>
+                  <a:srgbClr val="000000"/>
+                </a:solidFill>
+                <a:latin typeface="Courier New" panose="02070309020205020404" pitchFamily="49" charset="0"/>
+                <a:cs typeface="Courier New" panose="02070309020205020404" pitchFamily="49" charset="0"/>
+              </a:rPr>
+              <a:t>64</a:t>
+            </a:r>
+            <a:endParaRPr lang="en-US" altLang="ru-RU" dirty="0" smtClean="0">
+              <a:solidFill>
+                <a:srgbClr val="000000"/>
+              </a:solidFill>
+              <a:latin typeface="Courier New" panose="02070309020205020404" pitchFamily="49" charset="0"/>
+              <a:cs typeface="Courier New" panose="02070309020205020404" pitchFamily="49" charset="0"/>
+            </a:endParaRPr>
+          </a:p>
+          <a:p>
+            <a:r>
+              <a:rPr lang="en-US" dirty="0" smtClean="0"/>
+              <a:t>Accuracy score = </a:t>
+            </a:r>
+            <a:r>
+              <a:rPr lang="en-US" dirty="0" smtClean="0"/>
+              <a:t>78</a:t>
+            </a:r>
+            <a:r>
+              <a:rPr lang="en-US" dirty="0" smtClean="0"/>
+              <a:t>%</a:t>
+            </a:r>
+            <a:endParaRPr lang="en-US" dirty="0" smtClean="0"/>
+          </a:p>
+          <a:p>
+            <a:r>
+              <a:rPr lang="en-US" dirty="0" smtClean="0"/>
+              <a:t>Confusion matrix: </a:t>
+            </a:r>
+          </a:p>
+          <a:p>
+            <a:endParaRPr lang="en-US" dirty="0" smtClean="0"/>
+          </a:p>
+          <a:p>
+            <a:endParaRPr lang="ru-RU" dirty="0"/>
+          </a:p>
+        </p:txBody>
+      </p:sp>
+      <p:graphicFrame>
+        <p:nvGraphicFramePr>
+          <p:cNvPr id="8" name="Table 7"/>
+          <p:cNvGraphicFramePr>
+            <a:graphicFrameLocks noGrp="1"/>
+          </p:cNvGraphicFramePr>
+          <p:nvPr>
+            <p:extLst>
+              <p:ext uri="{D42A27DB-BD31-4B8C-83A1-F6EECF244321}">
+                <p14:modId xmlns:p14="http://schemas.microsoft.com/office/powerpoint/2010/main" val="2955413772"/>
+              </p:ext>
+            </p:extLst>
+          </p:nvPr>
+        </p:nvGraphicFramePr>
+        <p:xfrm>
+          <a:off x="4037700" y="4264086"/>
+          <a:ext cx="3372928" cy="1440612"/>
+        </p:xfrm>
+        <a:graphic>
+          <a:graphicData uri="http://schemas.openxmlformats.org/drawingml/2006/table">
+            <a:tbl>
+              <a:tblPr firstRow="1" bandRow="1">
+                <a:tableStyleId>{912C8C85-51F0-491E-9774-3900AFEF0FD7}</a:tableStyleId>
+              </a:tblPr>
+              <a:tblGrid>
+                <a:gridCol w="1686464"/>
+                <a:gridCol w="1686464"/>
+              </a:tblGrid>
+              <a:tr h="480204">
+                <a:tc>
+                  <a:txBody>
+                    <a:bodyPr/>
+                    <a:lstStyle/>
+                    <a:p>
+                      <a:r>
+                        <a:rPr lang="en-US" dirty="0" smtClean="0"/>
+                        <a:t>Class “0”</a:t>
+                      </a:r>
+                      <a:endParaRPr lang="ru-RU" dirty="0"/>
+                    </a:p>
+                  </a:txBody>
+                  <a:tcPr/>
+                </a:tc>
+                <a:tc>
+                  <a:txBody>
+                    <a:bodyPr/>
+                    <a:lstStyle/>
+                    <a:p>
+                      <a:r>
+                        <a:rPr lang="en-US" dirty="0" smtClean="0"/>
+                        <a:t>Class “1”</a:t>
+                      </a:r>
+                      <a:endParaRPr lang="ru-RU" dirty="0"/>
+                    </a:p>
+                  </a:txBody>
+                  <a:tcPr/>
+                </a:tc>
+              </a:tr>
+              <a:tr h="480204">
+                <a:tc>
+                  <a:txBody>
+                    <a:bodyPr/>
+                    <a:lstStyle/>
+                    <a:p>
+                      <a:r>
+                        <a:rPr lang="en-US" dirty="0" smtClean="0"/>
+                        <a:t>1098</a:t>
+                      </a:r>
+                      <a:endParaRPr lang="ru-RU" dirty="0"/>
+                    </a:p>
+                  </a:txBody>
+                  <a:tcPr/>
+                </a:tc>
+                <a:tc>
+                  <a:txBody>
+                    <a:bodyPr/>
+                    <a:lstStyle/>
+                    <a:p>
+                      <a:r>
+                        <a:rPr lang="en-US" dirty="0" smtClean="0"/>
+                        <a:t>2</a:t>
+                      </a:r>
+                      <a:endParaRPr lang="ru-RU" dirty="0"/>
+                    </a:p>
+                  </a:txBody>
+                  <a:tcPr/>
+                </a:tc>
+              </a:tr>
+              <a:tr h="480204">
+                <a:tc>
+                  <a:txBody>
+                    <a:bodyPr/>
+                    <a:lstStyle/>
+                    <a:p>
+                      <a:r>
+                        <a:rPr lang="en-US" dirty="0" smtClean="0"/>
+                        <a:t>26</a:t>
+                      </a:r>
+                      <a:endParaRPr lang="ru-RU" dirty="0"/>
+                    </a:p>
+                  </a:txBody>
+                  <a:tcPr/>
+                </a:tc>
+                <a:tc>
+                  <a:txBody>
+                    <a:bodyPr/>
+                    <a:lstStyle/>
+                    <a:p>
+                      <a:r>
+                        <a:rPr lang="en-US" dirty="0" smtClean="0"/>
+                        <a:t>94</a:t>
+                      </a:r>
+                      <a:endParaRPr lang="ru-RU" dirty="0"/>
+                    </a:p>
+                  </a:txBody>
+                  <a:tcPr/>
+                </a:tc>
+              </a:tr>
+            </a:tbl>
+          </a:graphicData>
+        </a:graphic>
+      </p:graphicFrame>
+      <p:sp>
+        <p:nvSpPr>
+          <p:cNvPr id="4" name="Rectangle 1"/>
+          <p:cNvSpPr>
+            <a:spLocks noChangeArrowheads="1"/>
+          </p:cNvSpPr>
+          <p:nvPr/>
+        </p:nvSpPr>
+        <p:spPr bwMode="auto">
+          <a:xfrm>
+            <a:off x="0" y="0"/>
+            <a:ext cx="12192000" cy="457200"/>
+          </a:xfrm>
+          <a:prstGeom prst="rect">
+            <a:avLst/>
+          </a:prstGeom>
+          <a:solidFill>
+            <a:srgbClr val="FFFFFF"/>
+          </a:solidFill>
+          <a:ln>
+            <a:noFill/>
+          </a:ln>
+          <a:effectLst/>
+          <a:extLst>
+            <a:ext uri="{91240B29-F687-4F45-9708-019B960494DF}">
+              <a14:hiddenLine xmlns:a14="http://schemas.microsoft.com/office/drawing/2010/main" w="9525">
+                <a:solidFill>
+                  <a:schemeClr val="tx1"/>
+                </a:solidFill>
+                <a:miter lim="800000"/>
+                <a:headEnd/>
+                <a:tailEnd/>
+              </a14:hiddenLine>
+            </a:ext>
+            <a:ext uri="{AF507438-7753-43E0-B8FC-AC1667EBCBE1}">
+              <a14:hiddenEffects xmlns:a14="http://schemas.microsoft.com/office/drawing/2010/main">
+                <a:effectLst>
+                  <a:outerShdw dist="35921" dir="2700000" algn="ctr" rotWithShape="0">
+                    <a:schemeClr val="bg2"/>
+                  </a:outerShdw>
+                </a:effectLst>
+              </a14:hiddenEffects>
+            </a:ext>
+          </a:extLst>
+        </p:spPr>
+        <p:txBody>
+          <a:bodyPr vert="horz" wrap="none" lIns="0" tIns="0" rIns="0" bIns="0" numCol="1" anchor="ctr" anchorCtr="0" compatLnSpc="1">
+            <a:prstTxWarp prst="textNoShape">
+              <a:avLst/>
+            </a:prstTxWarp>
+            <a:spAutoFit/>
+          </a:bodyPr>
+          <a:lstStyle/>
+          <a:p>
+            <a:pPr marL="0" marR="0" lvl="0" indent="0" algn="l" defTabSz="914400" rtl="0" eaLnBrk="0" fontAlgn="base" latinLnBrk="0" hangingPunct="0">
+              <a:lnSpc>
+                <a:spcPct val="100000"/>
+              </a:lnSpc>
+              <a:spcBef>
+                <a:spcPct val="0"/>
+              </a:spcBef>
+              <a:spcAft>
+                <a:spcPct val="0"/>
+              </a:spcAft>
+              <a:buClrTx/>
+              <a:buSzTx/>
+              <a:buFontTx/>
+              <a:buNone/>
+              <a:tabLst/>
+            </a:pPr>
+            <a:r>
+              <a:rPr kumimoji="0" lang="ru-RU" altLang="ru-RU" sz="1000" b="0" i="0" u="none" strike="noStrike" cap="none" normalizeH="0" baseline="0" smtClean="0">
+                <a:ln>
+                  <a:noFill/>
+                </a:ln>
+                <a:solidFill>
+                  <a:srgbClr val="000000"/>
+                </a:solidFill>
+                <a:effectLst/>
+                <a:latin typeface="Courier New" panose="02070309020205020404" pitchFamily="49" charset="0"/>
+              </a:rPr>
+              <a:t>[ 0.92026515 0.96799242 0.94034091 0.8967803 0.96382576]</a:t>
+            </a:r>
+            <a:r>
+              <a:rPr kumimoji="0" lang="ru-RU" altLang="ru-RU" sz="800" b="0" i="0" u="none" strike="noStrike" cap="none" normalizeH="0" baseline="0" smtClean="0">
+                <a:ln>
+                  <a:noFill/>
+                </a:ln>
+                <a:solidFill>
+                  <a:schemeClr val="tx1"/>
+                </a:solidFill>
+                <a:effectLst/>
+              </a:rPr>
+              <a:t> </a:t>
+            </a:r>
+            <a:endParaRPr kumimoji="0" lang="ru-RU" altLang="ru-RU" sz="1800" b="0" i="0" u="none" strike="noStrike" cap="none" normalizeH="0" baseline="0" smtClean="0">
+              <a:ln>
+                <a:noFill/>
+              </a:ln>
+              <a:solidFill>
+                <a:schemeClr val="tx1"/>
+              </a:solidFill>
+              <a:effectLst/>
+              <a:latin typeface="Arial" panose="020B0604020202020204" pitchFamily="34" charset="0"/>
+            </a:endParaRPr>
+          </a:p>
+        </p:txBody>
+      </p:sp>
+    </p:spTree>
+    <p:extLst>
+      <p:ext uri="{BB962C8B-B14F-4D97-AF65-F5344CB8AC3E}">
+        <p14:creationId xmlns:p14="http://schemas.microsoft.com/office/powerpoint/2010/main" val="2049748688"/>
+      </p:ext>
+    </p:extLst>
+  </p:cSld>
+  <p:clrMapOvr>
+    <a:masterClrMapping/>
+  </p:clrMapOvr>
+</p:sld>
+</file>
+
+<file path=ppt/slides/slide16.xml><?xml version="1.0" encoding="utf-8"?>
+<p:sld xmlns:a="http://schemas.openxmlformats.org/drawingml/2006/main" xmlns:r="http://schemas.openxmlformats.org/officeDocument/2006/relationships" xmlns:p="http://schemas.openxmlformats.org/presentationml/2006/main">
+  <p:cSld>
+    <p:spTree>
+      <p:nvGrpSpPr>
+        <p:cNvPr id="1" name=""/>
+        <p:cNvGrpSpPr/>
+        <p:nvPr/>
+      </p:nvGrpSpPr>
+      <p:grpSpPr>
+        <a:xfrm>
+          <a:off x="0" y="0"/>
+          <a:ext cx="0" cy="0"/>
+          <a:chOff x="0" y="0"/>
+          <a:chExt cx="0" cy="0"/>
+        </a:xfrm>
+      </p:grpSpPr>
+      <p:sp>
+        <p:nvSpPr>
           <p:cNvPr id="3" name="Content Placeholder 2"/>
           <p:cNvSpPr>
             <a:spLocks noGrp="1"/>
@@ -4978,7 +5639,7 @@
             </a:pPr>
             <a:r>
               <a:rPr lang="en-US" dirty="0" smtClean="0"/>
-              <a:t>Thank You!</a:t>
+              <a:t>Fin.</a:t>
             </a:r>
             <a:endParaRPr lang="ru-RU" dirty="0"/>
           </a:p>
@@ -5082,8 +5743,8 @@
         </p:nvSpPr>
         <p:spPr>
           <a:xfrm>
-            <a:off x="571500" y="2085975"/>
-            <a:ext cx="5019675" cy="4555093"/>
+            <a:off x="571500" y="1958975"/>
+            <a:ext cx="5019675" cy="4801314"/>
           </a:xfrm>
           <a:prstGeom prst="rect">
             <a:avLst/>
@@ -5109,7 +5770,7 @@
           <a:p>
             <a:r>
               <a:rPr lang="en-US" sz="1600" dirty="0" smtClean="0"/>
-              <a:t>Objective of this research was to build a classifier which would analyze data gathered from base stations around Moscow and would identify all ‘</a:t>
+              <a:t>Objective of this research was to build a classifier which would analyze path data gathered from telecom base stations around Moscow and would identify all ‘</a:t>
             </a:r>
             <a:r>
               <a:rPr lang="en-US" sz="1600" dirty="0" err="1" smtClean="0"/>
@@ -5117,7 +5778,7 @@
             </a:r>
             <a:r>
               <a:rPr lang="en-US" sz="1600" dirty="0" smtClean="0"/>
-              <a:t>’ that belongs to a particular user with the high probability. As the result we need to build a database with user id and all </a:t>
+              <a:t>’ that belongs to a particular user with the high probability. Purpose of this research is to build a database with user id and corresponding matching ‘</a:t>
             </a:r>
             <a:r>
               <a:rPr lang="en-US" sz="1600" dirty="0" err="1" smtClean="0"/>
@@ -5125,7 +5786,7 @@
             </a:r>
             <a:r>
               <a:rPr lang="en-US" sz="1600" dirty="0" smtClean="0"/>
-              <a:t> that belong to this user</a:t>
+              <a:t>’.</a:t>
             </a:r>
           </a:p>
           <a:p>
@@ -5148,7 +5809,7 @@
             </a:pPr>
             <a:r>
               <a:rPr lang="en-US" sz="1600" dirty="0" smtClean="0"/>
-              <a:t>Sample of the matching ‘</a:t>
+              <a:t>Sample with matching ‘</a:t>
             </a:r>
             <a:r>
               <a:rPr lang="en-US" sz="1600" dirty="0" err="1" smtClean="0"/>
@@ -5156,7 +5817,7 @@
             </a:r>
             <a:r>
               <a:rPr lang="en-US" sz="1600" dirty="0" smtClean="0"/>
-              <a:t>’ that belong to a particular users – train data</a:t>
+              <a:t>’ that belong to  particular users – train data</a:t>
             </a:r>
           </a:p>
           <a:p>
@@ -5174,7 +5835,7 @@
             </a:r>
             <a:r>
               <a:rPr lang="en-US" sz="1600" dirty="0" smtClean="0"/>
-              <a:t>’ and time of the user registration on the base station</a:t>
+              <a:t>’ and time of the user registration on the base stations during the day</a:t>
             </a:r>
           </a:p>
           <a:p>
@@ -5202,7 +5863,7 @@
             </a:pPr>
             <a:r>
               <a:rPr lang="en-US" sz="1600" dirty="0" smtClean="0"/>
-              <a:t>Dictionary for ever base station “event type” field</a:t>
+              <a:t>Dictionary with base station “event type” field description</a:t>
             </a:r>
           </a:p>
           <a:p>
@@ -5373,9 +6034,14 @@
               <a:buNone/>
             </a:pPr>
             <a:r>
-              <a:rPr lang="en-US" sz="1800" dirty="0" smtClean="0"/>
+              <a:rPr lang="en-US" sz="1800" dirty="0" smtClean="0">
+                <a:solidFill>
+                  <a:schemeClr val="accent6"/>
+                </a:solidFill>
+              </a:rPr>
               <a:t>Data consist of the following fields:</a:t>
             </a:r>
+            <a:endParaRPr lang="en-US" sz="1800" dirty="0" smtClean="0"/>
           </a:p>
           <a:p>
             <a:pPr marL="0" indent="0">
@@ -5387,47 +6053,6 @@
             <a:endParaRPr lang="en-US" sz="1800" dirty="0" smtClean="0"/>
           </a:p>
           <a:p>
-            <a:pPr marL="0" indent="0">
-              <a:spcBef>
-                <a:spcPts val="0"/>
-              </a:spcBef>
-              <a:buNone/>
-            </a:pPr>
-            <a:r>
-              <a:rPr lang="en-US" sz="1800" dirty="0" smtClean="0"/>
-              <a:t>- Lac </a:t>
-            </a:r>
-            <a:r>
-              <a:rPr lang="en-US" sz="1800" dirty="0" smtClean="0"/>
-              <a:t>and </a:t>
-            </a:r>
-            <a:r>
-              <a:rPr lang="en-US" sz="1800" dirty="0" err="1" smtClean="0"/>
-              <a:t>cid</a:t>
-            </a:r>
-            <a:r>
-              <a:rPr lang="en-US" sz="1800" dirty="0" smtClean="0"/>
-              <a:t> are base station </a:t>
-            </a:r>
-            <a:r>
-              <a:rPr lang="en-US" sz="1800" dirty="0" err="1" smtClean="0"/>
-              <a:t>group_id</a:t>
-            </a:r>
-            <a:r>
-              <a:rPr lang="en-US" sz="1800" dirty="0" smtClean="0"/>
-              <a:t> and </a:t>
-            </a:r>
-            <a:r>
-              <a:rPr lang="en-US" sz="1800" dirty="0" err="1" smtClean="0"/>
-              <a:t>unit_id</a:t>
-            </a:r>
-            <a:r>
-              <a:rPr lang="en-US" sz="1800" dirty="0" smtClean="0"/>
-              <a:t> correspondingly</a:t>
-            </a:r>
-            <a:endParaRPr lang="en-US" sz="1800" dirty="0" smtClean="0"/>
-          </a:p>
-          <a:p>
             <a:pPr>
               <a:spcBef>
                 <a:spcPts val="0"/>
@@ -5436,12 +6061,40 @@
               <a:buChar char="-"/>
             </a:pPr>
             <a:r>
+              <a:rPr lang="en-US" sz="1800" dirty="0" smtClean="0"/>
+              <a:t>Lac </a:t>
+            </a:r>
+            <a:r>
+              <a:rPr lang="en-US" sz="1800" dirty="0"/>
+              <a:t>and </a:t>
+            </a:r>
+            <a:r>
+              <a:rPr lang="en-US" sz="1800" dirty="0" err="1"/>
+              <a:t>cid</a:t>
+            </a:r>
+            <a:r>
+              <a:rPr lang="en-US" sz="1800" dirty="0"/>
+              <a:t> are base </a:t>
+            </a:r>
+            <a:r>
+              <a:rPr lang="en-US" sz="1800" dirty="0" smtClean="0"/>
+              <a:t>stations </a:t>
+            </a:r>
+            <a:r>
+              <a:rPr lang="en-US" sz="1800" dirty="0" err="1"/>
+              <a:t>group_id</a:t>
+            </a:r>
+            <a:r>
+              <a:rPr lang="en-US" sz="1800" dirty="0"/>
+              <a:t> and </a:t>
+            </a:r>
+            <a:r>
               <a:rPr lang="en-US" sz="1800" dirty="0" err="1" smtClean="0"/>
-              <a:t>msisdn</a:t>
+              <a:t>station_id</a:t>
             </a:r>
             <a:r>
               <a:rPr lang="en-US" sz="1800" dirty="0" smtClean="0"/>
-              <a:t> – unique identifier of a user</a:t>
+              <a:t> correspondingly</a:t>
             </a:r>
           </a:p>
           <a:p>
@@ -5454,11 +6107,11 @@
             </a:pPr>
             <a:r>
               <a:rPr lang="en-US" sz="1800" dirty="0" err="1" smtClean="0"/>
-              <a:t>Imei</a:t>
+              <a:t>msisdn</a:t>
             </a:r>
             <a:r>
               <a:rPr lang="en-US" sz="1800" dirty="0" smtClean="0"/>
-              <a:t> – identifier of the phone</a:t>
+              <a:t> – unique identifier of a user</a:t>
             </a:r>
           </a:p>
           <a:p>
@@ -5471,11 +6124,28 @@
             </a:pPr>
             <a:r>
               <a:rPr lang="en-US" sz="1800" dirty="0" err="1" smtClean="0"/>
+              <a:t>Imei</a:t>
+            </a:r>
+            <a:r>
+              <a:rPr lang="en-US" sz="1800" dirty="0" smtClean="0"/>
+              <a:t> – identifier of the user phone</a:t>
+            </a:r>
+          </a:p>
+          <a:p>
+            <a:pPr>
+              <a:spcBef>
+                <a:spcPts val="0"/>
+              </a:spcBef>
+              <a:buFontTx/>
+              <a:buChar char="-"/>
+            </a:pPr>
+            <a:r>
+              <a:rPr lang="en-US" sz="1800" dirty="0" err="1" smtClean="0"/>
               <a:t>Event_type</a:t>
             </a:r>
             <a:r>
               <a:rPr lang="en-US" sz="1800" dirty="0" smtClean="0"/>
-              <a:t> – type of the signal registered on the base station</a:t>
+              <a:t> – type of the signal registered on the base station (type of the event)</a:t>
             </a:r>
           </a:p>
           <a:p>
@@ -5582,7 +6252,7 @@
         </p:blipFill>
         <p:spPr>
           <a:xfrm>
-            <a:off x="5527400" y="1825625"/>
+            <a:off x="5467015" y="1825625"/>
             <a:ext cx="6418201" cy="3690938"/>
           </a:xfrm>
           <a:prstGeom prst="rect">
@@ -5707,7 +6377,7 @@
         <p:spPr>
           <a:xfrm>
             <a:off x="838199" y="1422399"/>
-            <a:ext cx="10810876" cy="1754326"/>
+            <a:ext cx="10810876" cy="2031325"/>
           </a:xfrm>
           <a:prstGeom prst="rect">
             <a:avLst/>
@@ -5744,7 +6414,15 @@
             </a:r>
             <a:r>
               <a:rPr lang="en-US" dirty="0" smtClean="0"/>
-              <a:t> modems usually have less data points vs phone data</a:t>
+              <a:t> modems usually have less data points (points corresponding to ‘</a:t>
+            </a:r>
+            <a:r>
+              <a:rPr lang="en-US" dirty="0" err="1" smtClean="0"/>
+              <a:t>msisdn</a:t>
+            </a:r>
+            <a:r>
+              <a:rPr lang="en-US" dirty="0" smtClean="0"/>
+              <a:t>’) vs phone data</a:t>
             </a:r>
           </a:p>
           <a:p>
@@ -5754,7 +6432,7 @@
             </a:pPr>
             <a:r>
               <a:rPr lang="en-US" dirty="0" smtClean="0"/>
-              <a:t>All phones are divided into two groups “Phone” and “Smartphone”, data analysis suggests that same device can be attributed to both groups (</a:t>
+              <a:t>All phones are divided into two groups “Phone” and “Smartphone”, later analysis suggests that same device can be attributed to both groups (</a:t>
             </a:r>
             <a:r>
               <a:rPr lang="en-US" dirty="0" err="1" smtClean="0"/>
@@ -5762,7 +6440,7 @@
             </a:r>
             <a:r>
               <a:rPr lang="en-US" dirty="0" smtClean="0"/>
-              <a:t> “Apple – </a:t>
+              <a:t> to both “Apple – </a:t>
             </a:r>
             <a:r>
               <a:rPr lang="en-US" dirty="0" err="1" smtClean="0"/>
@@ -5770,7 +6448,7 @@
             </a:r>
             <a:r>
               <a:rPr lang="en-US" dirty="0" smtClean="0"/>
-              <a:t> – phone” or “Apple – </a:t>
+              <a:t> – phone” and “Apple – </a:t>
             </a:r>
             <a:r>
               <a:rPr lang="en-US" dirty="0" err="1" smtClean="0"/>
@@ -5778,7 +6456,7 @@
             </a:r>
             <a:r>
               <a:rPr lang="en-US" dirty="0" smtClean="0"/>
-              <a:t> – Smartphone”); During modelling both groups will be merged together </a:t>
+              <a:t> – Smartphone”). This observation lead to merging together “Phone” and “Smartphone” groups.</a:t>
             </a:r>
           </a:p>
           <a:p>
@@ -5839,7 +6517,7 @@
           <a:p>
             <a:r>
               <a:rPr lang="en-US" sz="3600" dirty="0" smtClean="0"/>
-              <a:t>Visual analysis: number of unique </a:t>
+              <a:t>Visual analysis: number of unique ‘</a:t>
             </a:r>
             <a:r>
               <a:rPr lang="en-US" sz="3600" dirty="0" err="1" smtClean="0"/>
@@ -5847,7 +6525,7 @@
             </a:r>
             <a:r>
               <a:rPr lang="en-US" sz="3600" dirty="0" smtClean="0"/>
-              <a:t> for each base station</a:t>
+              <a:t>’ for each base station</a:t>
             </a:r>
             <a:endParaRPr lang="en-US" sz="3600" dirty="0"/>
           </a:p>
@@ -5939,7 +6617,7 @@
             </a:pPr>
             <a:r>
               <a:rPr lang="en-US" dirty="0" smtClean="0"/>
-              <a:t>We will define base station usage as number of unique </a:t>
+              <a:t>We will define base station usage as number of unique ‘</a:t>
             </a:r>
             <a:r>
               <a:rPr lang="en-US" dirty="0" err="1" smtClean="0"/>
@@ -5947,7 +6625,7 @@
             </a:r>
             <a:r>
               <a:rPr lang="en-US" dirty="0" smtClean="0"/>
-              <a:t> registered in this base station</a:t>
+              <a:t>’ registered in this base station</a:t>
             </a:r>
           </a:p>
           <a:p>
@@ -5957,7 +6635,7 @@
             </a:pPr>
             <a:r>
               <a:rPr lang="en-US" dirty="0" smtClean="0"/>
-              <a:t>Data suggests that most of the base stations were visited by less than five different ‘</a:t>
+              <a:t>Data shows that most of the base stations were visited by less than five different ‘</a:t>
             </a:r>
             <a:r>
               <a:rPr lang="en-US" dirty="0" err="1" smtClean="0"/>
@@ -6108,7 +6786,7 @@
             </a:r>
             <a:r>
               <a:rPr lang="en-US" dirty="0" smtClean="0"/>
-              <a:t>’ match if they have a lot of similar base stations</a:t>
+              <a:t>’ match if they’ve visited same base stations</a:t>
             </a:r>
           </a:p>
           <a:p>
@@ -6118,7 +6796,7 @@
             </a:pPr>
             <a:r>
               <a:rPr lang="en-US" dirty="0" smtClean="0"/>
-              <a:t>We can measure this similarities using several methods: </a:t>
+              <a:t>We can measure this similarities using several metrics: </a:t>
             </a:r>
             <a:r>
               <a:rPr lang="en-US" dirty="0" err="1" smtClean="0"/>
@@ -6496,10 +7174,6 @@
             </a:r>
           </a:p>
           <a:p>
-            <a:pPr marL="285750" indent="-285750">
-              <a:buFont typeface="Arial" panose="020B0604020202020204" pitchFamily="34" charset="0"/>
-              <a:buChar char="•"/>
-            </a:pPr>
             <a:endParaRPr lang="ru-RU" dirty="0"/>
           </a:p>
         </p:txBody>
@@ -6601,7 +7275,7 @@
             </a:r>
             <a:r>
               <a:rPr lang="en-US" dirty="0" smtClean="0"/>
-              <a:t> have less than 4 points and this points displaced from the track created by the second ‘</a:t>
+              <a:t> have less than 4 points and this points displaced from the track produced by the second ‘</a:t>
             </a:r>
             <a:r>
               <a:rPr lang="en-US" dirty="0" err="1" smtClean="0"/>

</xml_diff>